<commit_message>
Changes to Assessment ans Solution documents
</commit_message>
<xml_diff>
--- a/PnP Transformation Process/Samples/PnP Transformation - Solution Assessment Report - Contoso.pptx
+++ b/PnP Transformation Process/Samples/PnP Transformation - Solution Assessment Report - Contoso.pptx
@@ -30,13 +30,13 @@
     <p:sldId id="1466" r:id="rId24"/>
     <p:sldId id="1467" r:id="rId25"/>
     <p:sldId id="1468" r:id="rId26"/>
-    <p:sldId id="1460" r:id="rId27"/>
-    <p:sldId id="1469" r:id="rId28"/>
-    <p:sldId id="1470" r:id="rId29"/>
-    <p:sldId id="1496" r:id="rId30"/>
-    <p:sldId id="1497" r:id="rId31"/>
-    <p:sldId id="1498" r:id="rId32"/>
-    <p:sldId id="1500" r:id="rId33"/>
+    <p:sldId id="1500" r:id="rId27"/>
+    <p:sldId id="1460" r:id="rId28"/>
+    <p:sldId id="1469" r:id="rId29"/>
+    <p:sldId id="1470" r:id="rId30"/>
+    <p:sldId id="1496" r:id="rId31"/>
+    <p:sldId id="1497" r:id="rId32"/>
+    <p:sldId id="1498" r:id="rId33"/>
     <p:sldId id="1501" r:id="rId34"/>
     <p:sldId id="1461" r:id="rId35"/>
     <p:sldId id="1459" r:id="rId36"/>
@@ -388,7 +388,7 @@
           <a:p>
             <a:fld id="{DE219B1A-AE41-483B-A766-69B9363DDA6A}" type="datetimeFigureOut">
               <a:rPr lang="en-US" smtClean="0"/>
-              <a:t>5/28/2015</a:t>
+              <a:t>6/2/2015</a:t>
             </a:fld>
             <a:endParaRPr lang="en-US"/>
           </a:p>
@@ -597,7 +597,7 @@
           <a:p>
             <a:fld id="{D51B1278-D92B-4AF3-A9C1-71DD298190CE}" type="datetimeFigureOut">
               <a:rPr lang="en-US" smtClean="0"/>
-              <a:t>5/28/2015</a:t>
+              <a:t>6/2/2015</a:t>
             </a:fld>
             <a:endParaRPr lang="en-US"/>
           </a:p>
@@ -1042,7 +1042,7 @@
                 </a:solidFill>
               </a:rPr>
               <a:pPr/>
-              <a:t>5/28/2015</a:t>
+              <a:t>6/2/2015</a:t>
             </a:fld>
             <a:endParaRPr lang="en-US" dirty="0">
               <a:solidFill>
@@ -1275,9 +1275,9 @@
           <a:bodyPr/>
           <a:lstStyle/>
           <a:p>
-            <a:fld id="{4AE8C4F7-4397-4161-9F22-0B4AD96909C7}" type="datetime1">
+            <a:fld id="{D1138656-1104-4895-916A-3F46DB26BB9D}" type="datetime1">
               <a:rPr lang="en-US" smtClean="0"/>
-              <a:t>5/28/2015</a:t>
+              <a:t>6/2/2015</a:t>
             </a:fld>
             <a:endParaRPr lang="en-US"/>
           </a:p>
@@ -1300,7 +1300,7 @@
           <a:p>
             <a:fld id="{B4008EB6-D09E-4580-8CD6-DDB14511944F}" type="slidenum">
               <a:rPr lang="en-US" smtClean="0"/>
-              <a:t>20</a:t>
+              <a:t>19</a:t>
             </a:fld>
             <a:endParaRPr lang="en-US" dirty="0"/>
           </a:p>
@@ -1408,7 +1408,7 @@
     </p:spTree>
     <p:extLst>
       <p:ext uri="{BB962C8B-B14F-4D97-AF65-F5344CB8AC3E}">
-        <p14:creationId xmlns:p14="http://schemas.microsoft.com/office/powerpoint/2010/main" val="182120952"/>
+        <p14:creationId xmlns:p14="http://schemas.microsoft.com/office/powerpoint/2010/main" val="2087666507"/>
       </p:ext>
     </p:extLst>
   </p:cSld>
@@ -1483,7 +1483,7 @@
           <a:p>
             <a:fld id="{4AE8C4F7-4397-4161-9F22-0B4AD96909C7}" type="datetime1">
               <a:rPr lang="en-US" smtClean="0"/>
-              <a:t>5/28/2015</a:t>
+              <a:t>6/2/2015</a:t>
             </a:fld>
             <a:endParaRPr lang="en-US"/>
           </a:p>
@@ -1614,7 +1614,7 @@
     </p:spTree>
     <p:extLst>
       <p:ext uri="{BB962C8B-B14F-4D97-AF65-F5344CB8AC3E}">
-        <p14:creationId xmlns:p14="http://schemas.microsoft.com/office/powerpoint/2010/main" val="2114422433"/>
+        <p14:creationId xmlns:p14="http://schemas.microsoft.com/office/powerpoint/2010/main" val="182120952"/>
       </p:ext>
     </p:extLst>
   </p:cSld>
@@ -1689,7 +1689,7 @@
           <a:p>
             <a:fld id="{4AE8C4F7-4397-4161-9F22-0B4AD96909C7}" type="datetime1">
               <a:rPr lang="en-US" smtClean="0"/>
-              <a:t>5/28/2015</a:t>
+              <a:t>6/2/2015</a:t>
             </a:fld>
             <a:endParaRPr lang="en-US"/>
           </a:p>
@@ -1712,7 +1712,7 @@
           <a:p>
             <a:fld id="{B4008EB6-D09E-4580-8CD6-DDB14511944F}" type="slidenum">
               <a:rPr lang="en-US" smtClean="0"/>
-              <a:t>23</a:t>
+              <a:t>22</a:t>
             </a:fld>
             <a:endParaRPr lang="en-US" dirty="0"/>
           </a:p>
@@ -1820,7 +1820,7 @@
     </p:spTree>
     <p:extLst>
       <p:ext uri="{BB962C8B-B14F-4D97-AF65-F5344CB8AC3E}">
-        <p14:creationId xmlns:p14="http://schemas.microsoft.com/office/powerpoint/2010/main" val="1185253499"/>
+        <p14:creationId xmlns:p14="http://schemas.microsoft.com/office/powerpoint/2010/main" val="2114422433"/>
       </p:ext>
     </p:extLst>
   </p:cSld>
@@ -1893,9 +1893,9 @@
           <a:bodyPr/>
           <a:lstStyle/>
           <a:p>
-            <a:fld id="{D1138656-1104-4895-916A-3F46DB26BB9D}" type="datetime1">
+            <a:fld id="{4AE8C4F7-4397-4161-9F22-0B4AD96909C7}" type="datetime1">
               <a:rPr lang="en-US" smtClean="0"/>
-              <a:t>5/28/2015</a:t>
+              <a:t>6/2/2015</a:t>
             </a:fld>
             <a:endParaRPr lang="en-US"/>
           </a:p>
@@ -1918,7 +1918,7 @@
           <a:p>
             <a:fld id="{B4008EB6-D09E-4580-8CD6-DDB14511944F}" type="slidenum">
               <a:rPr lang="en-US" smtClean="0"/>
-              <a:t>25</a:t>
+              <a:t>24</a:t>
             </a:fld>
             <a:endParaRPr lang="en-US" dirty="0"/>
           </a:p>
@@ -2026,7 +2026,7 @@
     </p:spTree>
     <p:extLst>
       <p:ext uri="{BB962C8B-B14F-4D97-AF65-F5344CB8AC3E}">
-        <p14:creationId xmlns:p14="http://schemas.microsoft.com/office/powerpoint/2010/main" val="2087666507"/>
+        <p14:creationId xmlns:p14="http://schemas.microsoft.com/office/powerpoint/2010/main" val="1185253499"/>
       </p:ext>
     </p:extLst>
   </p:cSld>
@@ -2101,7 +2101,7 @@
           <a:p>
             <a:fld id="{D1138656-1104-4895-916A-3F46DB26BB9D}" type="datetime1">
               <a:rPr lang="en-US" smtClean="0"/>
-              <a:t>5/28/2015</a:t>
+              <a:t>6/2/2015</a:t>
             </a:fld>
             <a:endParaRPr lang="en-US"/>
           </a:p>
@@ -2307,7 +2307,7 @@
           <a:p>
             <a:fld id="{AA3AF75D-25C3-42E7-9971-69168E23937F}" type="datetime1">
               <a:rPr lang="en-US" smtClean="0"/>
-              <a:t>5/28/2015</a:t>
+              <a:t>6/2/2015</a:t>
             </a:fld>
             <a:endParaRPr lang="en-US"/>
           </a:p>
@@ -2513,7 +2513,7 @@
           <a:p>
             <a:fld id="{BE6AF0E1-8DCE-4BBE-B246-BFB736357904}" type="datetime1">
               <a:rPr lang="en-US" smtClean="0"/>
-              <a:t>5/28/2015</a:t>
+              <a:t>6/2/2015</a:t>
             </a:fld>
             <a:endParaRPr lang="en-US"/>
           </a:p>
@@ -2719,7 +2719,7 @@
           <a:p>
             <a:fld id="{AA3AF75D-25C3-42E7-9971-69168E23937F}" type="datetime1">
               <a:rPr lang="en-US" smtClean="0"/>
-              <a:t>5/28/2015</a:t>
+              <a:t>6/2/2015</a:t>
             </a:fld>
             <a:endParaRPr lang="en-US"/>
           </a:p>
@@ -2929,7 +2929,7 @@
           <a:p>
             <a:fld id="{309E6654-814A-4856-A67A-9683B5A2AE45}" type="datetime1">
               <a:rPr lang="en-US" smtClean="0"/>
-              <a:t>5/28/2015</a:t>
+              <a:t>6/2/2015</a:t>
             </a:fld>
             <a:endParaRPr lang="en-US"/>
           </a:p>
@@ -3135,7 +3135,7 @@
           <a:p>
             <a:fld id="{B8A7FB5A-0EC6-493F-BBA2-9886F4EE2DA7}" type="datetime1">
               <a:rPr lang="en-US" smtClean="0"/>
-              <a:t>5/28/2015</a:t>
+              <a:t>6/2/2015</a:t>
             </a:fld>
             <a:endParaRPr lang="en-US"/>
           </a:p>
@@ -3452,7 +3452,7 @@
           <a:p>
             <a:fld id="{CE1B21AF-5CDF-4A97-B0F4-5C0D3A9A2110}" type="datetime1">
               <a:rPr lang="en-US" smtClean="0"/>
-              <a:t>5/28/2015</a:t>
+              <a:t>6/2/2015</a:t>
             </a:fld>
             <a:endParaRPr lang="en-US"/>
           </a:p>
@@ -3910,7 +3910,7 @@
           <a:p>
             <a:fld id="{296C1CD7-3CE0-494C-9AEC-31D6728171B4}" type="datetime1">
               <a:rPr lang="en-US" smtClean="0"/>
-              <a:t>5/28/2015</a:t>
+              <a:t>6/2/2015</a:t>
             </a:fld>
             <a:endParaRPr lang="en-US"/>
           </a:p>
@@ -4244,7 +4244,7 @@
           <a:p>
             <a:fld id="{374D8680-9FDE-45BD-89DC-85FB6DA54DDA}" type="datetime1">
               <a:rPr lang="en-US" smtClean="0"/>
-              <a:t>5/28/2015</a:t>
+              <a:t>6/2/2015</a:t>
             </a:fld>
             <a:endParaRPr lang="en-US"/>
           </a:p>
@@ -4478,7 +4478,7 @@
           <a:p>
             <a:fld id="{E52A3622-CF2A-4CD0-83D5-292746669CDE}" type="datetime1">
               <a:rPr lang="en-US" smtClean="0"/>
-              <a:t>5/28/2015</a:t>
+              <a:t>6/2/2015</a:t>
             </a:fld>
             <a:endParaRPr lang="en-US" dirty="0"/>
           </a:p>
@@ -4684,7 +4684,7 @@
           <a:p>
             <a:fld id="{68473890-5369-4E69-B44C-90DD4CAB69AD}" type="datetime1">
               <a:rPr lang="en-US" smtClean="0"/>
-              <a:t>5/28/2015</a:t>
+              <a:t>6/2/2015</a:t>
             </a:fld>
             <a:endParaRPr lang="en-US"/>
           </a:p>
@@ -4886,19 +4886,11 @@
           <a:p>
             <a:r>
               <a:rPr lang="en-NZ" dirty="0" smtClean="0"/>
-              <a:t>From the </a:t>
-            </a:r>
-            <a:r>
-              <a:rPr lang="en-NZ" dirty="0" smtClean="0"/>
-              <a:t>kick-off</a:t>
+              <a:t>From the kick-off</a:t>
             </a:r>
             <a:r>
               <a:rPr lang="en-NZ" baseline="0" dirty="0" smtClean="0"/>
-              <a:t> </a:t>
-            </a:r>
-            <a:r>
-              <a:rPr lang="en-NZ" baseline="0" dirty="0" smtClean="0"/>
-              <a:t>meeting we have gathered that </a:t>
+              <a:t> meeting we have gathered that </a:t>
             </a:r>
             <a:r>
               <a:rPr lang="en-NZ" dirty="0" smtClean="0"/>
@@ -4942,7 +4934,7 @@
           <a:p>
             <a:fld id="{152427C8-1870-4D04-BF1C-4B85DC18AB6D}" type="datetime1">
               <a:rPr lang="en-US" smtClean="0"/>
-              <a:t>5/28/2015</a:t>
+              <a:t>6/2/2015</a:t>
             </a:fld>
             <a:endParaRPr lang="en-US"/>
           </a:p>
@@ -5156,7 +5148,7 @@
           <a:p>
             <a:fld id="{610543A5-0CF9-4E2E-A715-69AA16194555}" type="datetime1">
               <a:rPr lang="en-US" smtClean="0"/>
-              <a:t>5/28/2015</a:t>
+              <a:t>6/2/2015</a:t>
             </a:fld>
             <a:endParaRPr lang="en-US"/>
           </a:p>
@@ -5370,7 +5362,7 @@
           <a:p>
             <a:fld id="{719B440B-D65B-4D2A-9030-577938CDA5B7}" type="datetime1">
               <a:rPr lang="en-US" smtClean="0"/>
-              <a:t>5/28/2015</a:t>
+              <a:t>6/2/2015</a:t>
             </a:fld>
             <a:endParaRPr lang="en-US"/>
           </a:p>
@@ -19231,28 +19223,28 @@
                 <a:gridCol w="5965345">
                   <a:extLst>
                     <a:ext uri="{9D8B030D-6E8A-4147-A177-3AD203B41FA5}">
-                      <a16:colId xmlns="" xmlns:a16="http://schemas.microsoft.com/office/drawing/2014/main" val="20000"/>
+                      <a16:colId xmlns:a16="http://schemas.microsoft.com/office/drawing/2014/main" xmlns="" val="20000"/>
                     </a:ext>
                   </a:extLst>
                 </a:gridCol>
                 <a:gridCol w="568903">
                   <a:extLst>
                     <a:ext uri="{9D8B030D-6E8A-4147-A177-3AD203B41FA5}">
-                      <a16:colId xmlns="" xmlns:a16="http://schemas.microsoft.com/office/drawing/2014/main" val="20001"/>
+                      <a16:colId xmlns:a16="http://schemas.microsoft.com/office/drawing/2014/main" xmlns="" val="20001"/>
                     </a:ext>
                   </a:extLst>
                 </a:gridCol>
                 <a:gridCol w="520140">
                   <a:extLst>
                     <a:ext uri="{9D8B030D-6E8A-4147-A177-3AD203B41FA5}">
-                      <a16:colId xmlns="" xmlns:a16="http://schemas.microsoft.com/office/drawing/2014/main" val="20002"/>
+                      <a16:colId xmlns:a16="http://schemas.microsoft.com/office/drawing/2014/main" xmlns="" val="20002"/>
                     </a:ext>
                   </a:extLst>
                 </a:gridCol>
                 <a:gridCol w="520140">
                   <a:extLst>
                     <a:ext uri="{9D8B030D-6E8A-4147-A177-3AD203B41FA5}">
-                      <a16:colId xmlns="" xmlns:a16="http://schemas.microsoft.com/office/drawing/2014/main" val="2588272693"/>
+                      <a16:colId xmlns:a16="http://schemas.microsoft.com/office/drawing/2014/main" xmlns="" val="2588272693"/>
                     </a:ext>
                   </a:extLst>
                 </a:gridCol>
@@ -19358,7 +19350,7 @@
                 </a:tc>
                 <a:extLst>
                   <a:ext uri="{0D108BD9-81ED-4DB2-BD59-A6C34878D82A}">
-                    <a16:rowId xmlns="" xmlns:a16="http://schemas.microsoft.com/office/drawing/2014/main" val="10000"/>
+                    <a16:rowId xmlns:a16="http://schemas.microsoft.com/office/drawing/2014/main" xmlns="" val="10000"/>
                   </a:ext>
                 </a:extLst>
               </a:tr>
@@ -19475,7 +19467,7 @@
                 </a:tc>
                 <a:extLst>
                   <a:ext uri="{0D108BD9-81ED-4DB2-BD59-A6C34878D82A}">
-                    <a16:rowId xmlns="" xmlns:a16="http://schemas.microsoft.com/office/drawing/2014/main" val="10001"/>
+                    <a16:rowId xmlns:a16="http://schemas.microsoft.com/office/drawing/2014/main" xmlns="" val="10001"/>
                   </a:ext>
                 </a:extLst>
               </a:tr>
@@ -19597,7 +19589,7 @@
                 </a:tc>
                 <a:extLst>
                   <a:ext uri="{0D108BD9-81ED-4DB2-BD59-A6C34878D82A}">
-                    <a16:rowId xmlns="" xmlns:a16="http://schemas.microsoft.com/office/drawing/2014/main" val="10002"/>
+                    <a16:rowId xmlns:a16="http://schemas.microsoft.com/office/drawing/2014/main" xmlns="" val="10002"/>
                   </a:ext>
                 </a:extLst>
               </a:tr>
@@ -19719,7 +19711,7 @@
                 </a:tc>
                 <a:extLst>
                   <a:ext uri="{0D108BD9-81ED-4DB2-BD59-A6C34878D82A}">
-                    <a16:rowId xmlns="" xmlns:a16="http://schemas.microsoft.com/office/drawing/2014/main" val="10003"/>
+                    <a16:rowId xmlns:a16="http://schemas.microsoft.com/office/drawing/2014/main" xmlns="" val="10003"/>
                   </a:ext>
                 </a:extLst>
               </a:tr>
@@ -19841,7 +19833,7 @@
                 </a:tc>
                 <a:extLst>
                   <a:ext uri="{0D108BD9-81ED-4DB2-BD59-A6C34878D82A}">
-                    <a16:rowId xmlns="" xmlns:a16="http://schemas.microsoft.com/office/drawing/2014/main" val="10004"/>
+                    <a16:rowId xmlns:a16="http://schemas.microsoft.com/office/drawing/2014/main" xmlns="" val="10004"/>
                   </a:ext>
                 </a:extLst>
               </a:tr>
@@ -19963,7 +19955,7 @@
                 </a:tc>
                 <a:extLst>
                   <a:ext uri="{0D108BD9-81ED-4DB2-BD59-A6C34878D82A}">
-                    <a16:rowId xmlns="" xmlns:a16="http://schemas.microsoft.com/office/drawing/2014/main" val="10005"/>
+                    <a16:rowId xmlns:a16="http://schemas.microsoft.com/office/drawing/2014/main" xmlns="" val="10005"/>
                   </a:ext>
                 </a:extLst>
               </a:tr>
@@ -20085,7 +20077,7 @@
                 </a:tc>
                 <a:extLst>
                   <a:ext uri="{0D108BD9-81ED-4DB2-BD59-A6C34878D82A}">
-                    <a16:rowId xmlns="" xmlns:a16="http://schemas.microsoft.com/office/drawing/2014/main" val="10006"/>
+                    <a16:rowId xmlns:a16="http://schemas.microsoft.com/office/drawing/2014/main" xmlns="" val="10006"/>
                   </a:ext>
                 </a:extLst>
               </a:tr>
@@ -21227,28 +21219,28 @@
                 <a:gridCol w="5965345">
                   <a:extLst>
                     <a:ext uri="{9D8B030D-6E8A-4147-A177-3AD203B41FA5}">
-                      <a16:colId xmlns="" xmlns:a16="http://schemas.microsoft.com/office/drawing/2014/main" val="20000"/>
+                      <a16:colId xmlns:a16="http://schemas.microsoft.com/office/drawing/2014/main" xmlns="" val="20000"/>
                     </a:ext>
                   </a:extLst>
                 </a:gridCol>
                 <a:gridCol w="568903">
                   <a:extLst>
                     <a:ext uri="{9D8B030D-6E8A-4147-A177-3AD203B41FA5}">
-                      <a16:colId xmlns="" xmlns:a16="http://schemas.microsoft.com/office/drawing/2014/main" val="20001"/>
+                      <a16:colId xmlns:a16="http://schemas.microsoft.com/office/drawing/2014/main" xmlns="" val="20001"/>
                     </a:ext>
                   </a:extLst>
                 </a:gridCol>
                 <a:gridCol w="520140">
                   <a:extLst>
                     <a:ext uri="{9D8B030D-6E8A-4147-A177-3AD203B41FA5}">
-                      <a16:colId xmlns="" xmlns:a16="http://schemas.microsoft.com/office/drawing/2014/main" val="20002"/>
+                      <a16:colId xmlns:a16="http://schemas.microsoft.com/office/drawing/2014/main" xmlns="" val="20002"/>
                     </a:ext>
                   </a:extLst>
                 </a:gridCol>
                 <a:gridCol w="520140">
                   <a:extLst>
                     <a:ext uri="{9D8B030D-6E8A-4147-A177-3AD203B41FA5}">
-                      <a16:colId xmlns="" xmlns:a16="http://schemas.microsoft.com/office/drawing/2014/main" val="1173184688"/>
+                      <a16:colId xmlns:a16="http://schemas.microsoft.com/office/drawing/2014/main" xmlns="" val="1173184688"/>
                     </a:ext>
                   </a:extLst>
                 </a:gridCol>
@@ -21354,7 +21346,7 @@
                 </a:tc>
                 <a:extLst>
                   <a:ext uri="{0D108BD9-81ED-4DB2-BD59-A6C34878D82A}">
-                    <a16:rowId xmlns="" xmlns:a16="http://schemas.microsoft.com/office/drawing/2014/main" val="10000"/>
+                    <a16:rowId xmlns:a16="http://schemas.microsoft.com/office/drawing/2014/main" xmlns="" val="10000"/>
                   </a:ext>
                 </a:extLst>
               </a:tr>
@@ -21472,7 +21464,7 @@
                 </a:tc>
                 <a:extLst>
                   <a:ext uri="{0D108BD9-81ED-4DB2-BD59-A6C34878D82A}">
-                    <a16:rowId xmlns="" xmlns:a16="http://schemas.microsoft.com/office/drawing/2014/main" val="10002"/>
+                    <a16:rowId xmlns:a16="http://schemas.microsoft.com/office/drawing/2014/main" xmlns="" val="10002"/>
                   </a:ext>
                 </a:extLst>
               </a:tr>
@@ -21595,7 +21587,7 @@
                 </a:tc>
                 <a:extLst>
                   <a:ext uri="{0D108BD9-81ED-4DB2-BD59-A6C34878D82A}">
-                    <a16:rowId xmlns="" xmlns:a16="http://schemas.microsoft.com/office/drawing/2014/main" val="10003"/>
+                    <a16:rowId xmlns:a16="http://schemas.microsoft.com/office/drawing/2014/main" xmlns="" val="10003"/>
                   </a:ext>
                 </a:extLst>
               </a:tr>
@@ -21719,7 +21711,7 @@
                 </a:tc>
                 <a:extLst>
                   <a:ext uri="{0D108BD9-81ED-4DB2-BD59-A6C34878D82A}">
-                    <a16:rowId xmlns="" xmlns:a16="http://schemas.microsoft.com/office/drawing/2014/main" val="10004"/>
+                    <a16:rowId xmlns:a16="http://schemas.microsoft.com/office/drawing/2014/main" xmlns="" val="10004"/>
                   </a:ext>
                 </a:extLst>
               </a:tr>
@@ -21859,7 +21851,7 @@
                 </a:tc>
                 <a:extLst>
                   <a:ext uri="{0D108BD9-81ED-4DB2-BD59-A6C34878D82A}">
-                    <a16:rowId xmlns="" xmlns:a16="http://schemas.microsoft.com/office/drawing/2014/main" val="10005"/>
+                    <a16:rowId xmlns:a16="http://schemas.microsoft.com/office/drawing/2014/main" xmlns="" val="10005"/>
                   </a:ext>
                 </a:extLst>
               </a:tr>
@@ -22912,26 +22904,61 @@
             <p:ph type="title"/>
           </p:nvPr>
         </p:nvSpPr>
-        <p:spPr/>
+        <p:spPr>
+          <a:xfrm>
+            <a:off x="3173505" y="992992"/>
+            <a:ext cx="8494619" cy="747897"/>
+          </a:xfrm>
+        </p:spPr>
         <p:txBody>
           <a:bodyPr anchor="ctr"/>
           <a:lstStyle/>
           <a:p>
             <a:r>
               <a:rPr lang="nl-BE" dirty="0" smtClean="0"/>
-              <a:t>Branding </a:t>
+              <a:t>Safety News Rollups</a:t>
             </a:r>
             <a:br>
               <a:rPr lang="nl-BE" dirty="0" smtClean="0"/>
             </a:br>
             <a:r>
-              <a:rPr lang="en-US" sz="3600" dirty="0" err="1">
+              <a:rPr lang="en-US" sz="3600" dirty="0" err="1" smtClean="0">
                 <a:solidFill>
                   <a:schemeClr val="accent1"/>
                 </a:solidFill>
               </a:rPr>
-              <a:t>contoso.sharepoint.branding.wsp</a:t>
-            </a:r>
+              <a:t>contoso.sharepoint.safetynews.wsp</a:t>
+            </a:r>
+            <a:r>
+              <a:rPr lang="en-US" sz="3600" dirty="0">
+                <a:solidFill>
+                  <a:schemeClr val="accent1"/>
+                </a:solidFill>
+              </a:rPr>
+              <a:t/>
+            </a:r>
+            <a:br>
+              <a:rPr lang="en-US" sz="3600" dirty="0">
+                <a:solidFill>
+                  <a:schemeClr val="accent1"/>
+                </a:solidFill>
+              </a:rPr>
+            </a:br>
+            <a:r>
+              <a:rPr lang="en-US" sz="3600" dirty="0">
+                <a:solidFill>
+                  <a:schemeClr val="accent1"/>
+                </a:solidFill>
+              </a:rPr>
+              <a:t/>
+            </a:r>
+            <a:br>
+              <a:rPr lang="en-US" sz="3600" dirty="0">
+                <a:solidFill>
+                  <a:schemeClr val="accent1"/>
+                </a:solidFill>
+              </a:rPr>
+            </a:br>
             <a:endParaRPr lang="nl-BE" sz="3600" dirty="0">
               <a:solidFill>
                 <a:schemeClr val="accent1"/>
@@ -22952,7 +22979,7 @@
         </p:nvSpPr>
         <p:spPr>
           <a:xfrm>
-            <a:off x="3173506" y="1447799"/>
+            <a:off x="3173505" y="2238374"/>
             <a:ext cx="8494619" cy="4619626"/>
           </a:xfrm>
         </p:spPr>
@@ -22961,119 +22988,47 @@
           <a:lstStyle/>
           <a:p>
             <a:r>
-              <a:rPr lang="en-US" dirty="0"/>
-              <a:t>High level requirements:</a:t>
-            </a:r>
+              <a:rPr lang="en-US" dirty="0" smtClean="0"/>
+              <a:t>Current Implementation:</a:t>
+            </a:r>
+            <a:endParaRPr lang="en-US" dirty="0"/>
           </a:p>
           <a:p>
             <a:pPr lvl="1"/>
             <a:r>
               <a:rPr lang="en-US" sz="1800" dirty="0" smtClean="0"/>
-              <a:t>Typical </a:t>
+              <a:t>The custom web part has been designed to:</a:t>
+            </a:r>
+            <a:endParaRPr lang="en-US" sz="1800" dirty="0"/>
+          </a:p>
+          <a:p>
+            <a:pPr lvl="2"/>
+            <a:r>
+              <a:rPr lang="en-US" sz="1800" dirty="0" smtClean="0"/>
+              <a:t>Roll </a:t>
+            </a:r>
+            <a:r>
+              <a:rPr lang="en-US" sz="1800" dirty="0" smtClean="0"/>
+              <a:t>up </a:t>
             </a:r>
             <a:r>
               <a:rPr lang="en-US" sz="1800" dirty="0"/>
-              <a:t>Intranet features:</a:t>
+              <a:t>s</a:t>
+            </a:r>
+            <a:r>
+              <a:rPr lang="en-US" sz="1800" dirty="0" smtClean="0"/>
+              <a:t>afety news items from various sites and sub-sites</a:t>
             </a:r>
           </a:p>
           <a:p>
             <a:pPr lvl="2"/>
             <a:r>
-              <a:rPr lang="en-US" sz="1800" dirty="0"/>
-              <a:t>Custom web controls + page layouts </a:t>
-            </a:r>
-            <a:endParaRPr lang="en-US" sz="1800" dirty="0" smtClean="0"/>
-          </a:p>
-          <a:p>
-            <a:pPr lvl="2"/>
-            <a:r>
               <a:rPr lang="en-US" sz="1800" dirty="0" smtClean="0"/>
-              <a:t>Custom </a:t>
-            </a:r>
-            <a:r>
-              <a:rPr lang="en-US" sz="1800" dirty="0"/>
-              <a:t>branding (master page + CSS)</a:t>
-            </a:r>
-          </a:p>
-          <a:p>
-            <a:pPr lvl="2"/>
-            <a:r>
-              <a:rPr lang="en-US" sz="1800" dirty="0"/>
-              <a:t>Social features (commenting, tag cloud)</a:t>
-            </a:r>
-          </a:p>
-          <a:p>
-            <a:pPr lvl="2"/>
-            <a:r>
-              <a:rPr lang="en-US" sz="1800" dirty="0"/>
-              <a:t>Language specific search center site collections</a:t>
-            </a:r>
-          </a:p>
-          <a:p>
-            <a:pPr lvl="2"/>
-            <a:r>
-              <a:rPr lang="en-US" sz="1800" dirty="0"/>
-              <a:t>Custom navigation</a:t>
-            </a:r>
-          </a:p>
-          <a:p>
-            <a:pPr lvl="2"/>
+              <a:t>Provide </a:t>
+            </a:r>
             <a:r>
               <a:rPr lang="en-US" sz="1800" dirty="0" smtClean="0"/>
-              <a:t>User Alerts</a:t>
-            </a:r>
-            <a:endParaRPr lang="en-US" sz="1800" dirty="0"/>
-          </a:p>
-          <a:p>
-            <a:pPr lvl="2"/>
-            <a:r>
-              <a:rPr lang="en-US" sz="1800" dirty="0" smtClean="0"/>
-              <a:t>Custom web </a:t>
-            </a:r>
-            <a:r>
-              <a:rPr lang="en-US" sz="1800" dirty="0"/>
-              <a:t>parts / </a:t>
-            </a:r>
-            <a:r>
-              <a:rPr lang="en-US" sz="1800" dirty="0" smtClean="0"/>
-              <a:t>controls</a:t>
-            </a:r>
-            <a:endParaRPr lang="en-US" sz="1800" dirty="0"/>
-          </a:p>
-          <a:p>
-            <a:pPr lvl="3"/>
-            <a:r>
-              <a:rPr lang="en-US" sz="1600" dirty="0"/>
-              <a:t>Share price, world clock, weather, emergency information, image rotator</a:t>
-            </a:r>
-          </a:p>
-          <a:p>
-            <a:pPr lvl="1"/>
-            <a:r>
-              <a:rPr lang="en-US" sz="1800" dirty="0" smtClean="0"/>
-              <a:t>Other intranet </a:t>
-            </a:r>
-            <a:r>
-              <a:rPr lang="en-US" sz="1800" dirty="0"/>
-              <a:t>features:</a:t>
-            </a:r>
-          </a:p>
-          <a:p>
-            <a:pPr lvl="2"/>
-            <a:r>
-              <a:rPr lang="en-US" sz="1800" dirty="0"/>
-              <a:t>Site provisioning for collaborative sites</a:t>
-            </a:r>
-          </a:p>
-          <a:p>
-            <a:pPr lvl="2"/>
-            <a:r>
-              <a:rPr lang="en-US" sz="1800" dirty="0"/>
-              <a:t>Team site metadata </a:t>
-            </a:r>
-            <a:r>
-              <a:rPr lang="en-US" sz="1800" dirty="0" smtClean="0"/>
-              <a:t>editing</a:t>
+              <a:t>a mobile friendly view of the news item when accessed from mobile devices.</a:t>
             </a:r>
             <a:endParaRPr lang="en-US" sz="1800" dirty="0"/>
           </a:p>
@@ -23325,7 +23280,19 @@
             </a:lvl9pPr>
           </a:lstStyle>
           <a:p>
-            <a:endParaRPr lang="en-US" dirty="0" smtClean="0"/>
+            <a:endParaRPr lang="en-US" dirty="0" smtClean="0">
+              <a:gradFill>
+                <a:gsLst>
+                  <a:gs pos="1250">
+                    <a:srgbClr val="797A7D"/>
+                  </a:gs>
+                  <a:gs pos="100000">
+                    <a:srgbClr val="797A7D"/>
+                  </a:gs>
+                </a:gsLst>
+                <a:lin ang="5400000" scaled="0"/>
+              </a:gradFill>
+            </a:endParaRPr>
           </a:p>
         </p:txBody>
       </p:sp>
@@ -23338,7 +23305,7 @@
           <p:nvPr>
             <p:extLst>
               <p:ext uri="{D42A27DB-BD31-4B8C-83A1-F6EECF244321}">
-                <p14:modId xmlns:p14="http://schemas.microsoft.com/office/powerpoint/2010/main" val="2701059414"/>
+                <p14:modId xmlns:p14="http://schemas.microsoft.com/office/powerpoint/2010/main" val="1818622909"/>
               </p:ext>
             </p:extLst>
           </p:nvPr>
@@ -23357,7 +23324,7 @@
                 <a:gridCol w="2373524">
                   <a:extLst>
                     <a:ext uri="{9D8B030D-6E8A-4147-A177-3AD203B41FA5}">
-                      <a16:colId xmlns:a16="http://schemas.microsoft.com/office/drawing/2014/main" xmlns="" val="20000"/>
+                      <a16:colId xmlns="" xmlns:a16="http://schemas.microsoft.com/office/drawing/2014/main" val="20000"/>
                     </a:ext>
                   </a:extLst>
                 </a:gridCol>
@@ -23370,8 +23337,8 @@
                     <a:p>
                       <a:pPr algn="ctr"/>
                       <a:r>
-                        <a:rPr lang="en-US" b="1" i="0" dirty="0" smtClean="0"/>
-                        <a:t>Branding</a:t>
+                        <a:rPr lang="en-US" b="1" i="0" smtClean="0"/>
+                        <a:t>Safety News</a:t>
                       </a:r>
                       <a:endParaRPr lang="nl-BE" b="1" i="0" dirty="0"/>
                     </a:p>
@@ -23420,7 +23387,7 @@
                 </a:tc>
                 <a:extLst>
                   <a:ext uri="{0D108BD9-81ED-4DB2-BD59-A6C34878D82A}">
-                    <a16:rowId xmlns:a16="http://schemas.microsoft.com/office/drawing/2014/main" xmlns="" val="10000"/>
+                    <a16:rowId xmlns="" xmlns:a16="http://schemas.microsoft.com/office/drawing/2014/main" val="10000"/>
                   </a:ext>
                 </a:extLst>
               </a:tr>
@@ -23481,7 +23448,7 @@
                 </a:tc>
                 <a:extLst>
                   <a:ext uri="{0D108BD9-81ED-4DB2-BD59-A6C34878D82A}">
-                    <a16:rowId xmlns:a16="http://schemas.microsoft.com/office/drawing/2014/main" xmlns="" val="10001"/>
+                    <a16:rowId xmlns="" xmlns:a16="http://schemas.microsoft.com/office/drawing/2014/main" val="10001"/>
                   </a:ext>
                 </a:extLst>
               </a:tr>
@@ -23545,13 +23512,13 @@
                       <a:tailEnd type="none" w="med" len="med"/>
                     </a:lnB>
                     <a:solidFill>
-                      <a:schemeClr val="accent2"/>
+                      <a:srgbClr val="00B050"/>
                     </a:solidFill>
                   </a:tcPr>
                 </a:tc>
                 <a:extLst>
                   <a:ext uri="{0D108BD9-81ED-4DB2-BD59-A6C34878D82A}">
-                    <a16:rowId xmlns:a16="http://schemas.microsoft.com/office/drawing/2014/main" xmlns="" val="10002"/>
+                    <a16:rowId xmlns="" xmlns:a16="http://schemas.microsoft.com/office/drawing/2014/main" val="10002"/>
                   </a:ext>
                 </a:extLst>
               </a:tr>
@@ -23629,7 +23596,7 @@
                 </a:tc>
                 <a:extLst>
                   <a:ext uri="{0D108BD9-81ED-4DB2-BD59-A6C34878D82A}">
-                    <a16:rowId xmlns:a16="http://schemas.microsoft.com/office/drawing/2014/main" xmlns="" val="10007"/>
+                    <a16:rowId xmlns="" xmlns:a16="http://schemas.microsoft.com/office/drawing/2014/main" val="10007"/>
                   </a:ext>
                 </a:extLst>
               </a:tr>
@@ -23646,7 +23613,7 @@
           <p:nvPr/>
         </p:nvPicPr>
         <p:blipFill>
-          <a:blip r:embed="rId2">
+          <a:blip r:embed="rId3">
             <a:extLst>
               <a:ext uri="{28A0092B-C50C-407E-A947-70E740481C1C}">
                 <a14:useLocalDpi xmlns:a14="http://schemas.microsoft.com/office/drawing/2010/main" val="0"/>
@@ -23678,10 +23645,185 @@
           </a:extLst>
         </p:spPr>
       </p:pic>
+      <p:sp>
+        <p:nvSpPr>
+          <p:cNvPr id="8" name="Rectangle 7"/>
+          <p:cNvSpPr/>
+          <p:nvPr/>
+        </p:nvSpPr>
+        <p:spPr>
+          <a:xfrm>
+            <a:off x="3173504" y="4083892"/>
+            <a:ext cx="8494619" cy="1545038"/>
+          </a:xfrm>
+          <a:prstGeom prst="rect">
+            <a:avLst/>
+          </a:prstGeom>
+        </p:spPr>
+        <p:txBody>
+          <a:bodyPr wrap="square">
+            <a:spAutoFit/>
+          </a:bodyPr>
+          <a:lstStyle/>
+          <a:p>
+            <a:pPr marL="284163" lvl="0" indent="-284163">
+              <a:lnSpc>
+                <a:spcPct val="90000"/>
+              </a:lnSpc>
+              <a:spcBef>
+                <a:spcPct val="20000"/>
+              </a:spcBef>
+              <a:buSzPct val="80000"/>
+              <a:buFont typeface="Wingdings" pitchFamily="2" charset="2"/>
+              <a:buChar char=""/>
+            </a:pPr>
+            <a:r>
+              <a:rPr lang="en-US" sz="3600" spc="-70" dirty="0" smtClean="0">
+                <a:solidFill>
+                  <a:srgbClr val="EB3C00"/>
+                </a:solidFill>
+                <a:latin typeface="Segoe UI Light"/>
+              </a:rPr>
+              <a:t>Migration</a:t>
+            </a:r>
+          </a:p>
+          <a:p>
+            <a:pPr marL="517525" lvl="1" indent="-233363">
+              <a:lnSpc>
+                <a:spcPct val="90000"/>
+              </a:lnSpc>
+              <a:spcBef>
+                <a:spcPct val="20000"/>
+              </a:spcBef>
+              <a:buSzPct val="90000"/>
+              <a:buFont typeface="Wingdings" pitchFamily="2" charset="2"/>
+              <a:buChar char=""/>
+            </a:pPr>
+            <a:r>
+              <a:rPr lang="en-US" sz="2000" dirty="0" smtClean="0">
+                <a:gradFill>
+                  <a:gsLst>
+                    <a:gs pos="1250">
+                      <a:srgbClr val="797A7D"/>
+                    </a:gs>
+                    <a:gs pos="100000">
+                      <a:srgbClr val="797A7D"/>
+                    </a:gs>
+                  </a:gsLst>
+                  <a:lin ang="5400000" scaled="0"/>
+                </a:gradFill>
+              </a:rPr>
+              <a:t>The safety news can be published as announcements within Yammer.</a:t>
+            </a:r>
+          </a:p>
+          <a:p>
+            <a:pPr marL="517525" lvl="1" indent="-233363">
+              <a:lnSpc>
+                <a:spcPct val="90000"/>
+              </a:lnSpc>
+              <a:spcBef>
+                <a:spcPct val="20000"/>
+              </a:spcBef>
+              <a:buSzPct val="90000"/>
+              <a:buFont typeface="Wingdings" pitchFamily="2" charset="2"/>
+              <a:buChar char=""/>
+            </a:pPr>
+            <a:r>
+              <a:rPr lang="en-US" sz="2000" dirty="0" smtClean="0">
+                <a:gradFill>
+                  <a:gsLst>
+                    <a:gs pos="1250">
+                      <a:srgbClr val="797A7D"/>
+                    </a:gs>
+                    <a:gs pos="100000">
+                      <a:srgbClr val="797A7D"/>
+                    </a:gs>
+                  </a:gsLst>
+                  <a:lin ang="5400000" scaled="0"/>
+                </a:gradFill>
+              </a:rPr>
+              <a:t>The Yammer embedded code can replace the custom safety news web part.</a:t>
+            </a:r>
+          </a:p>
+        </p:txBody>
+      </p:sp>
+      <p:sp>
+        <p:nvSpPr>
+          <p:cNvPr id="5" name="Rectangle 4"/>
+          <p:cNvSpPr/>
+          <p:nvPr/>
+        </p:nvSpPr>
+        <p:spPr>
+          <a:xfrm>
+            <a:off x="3173505" y="5792802"/>
+            <a:ext cx="6092825" cy="929485"/>
+          </a:xfrm>
+          <a:prstGeom prst="rect">
+            <a:avLst/>
+          </a:prstGeom>
+        </p:spPr>
+        <p:txBody>
+          <a:bodyPr>
+            <a:spAutoFit/>
+          </a:bodyPr>
+          <a:lstStyle/>
+          <a:p>
+            <a:pPr marL="284163" lvl="0" indent="-284163">
+              <a:lnSpc>
+                <a:spcPct val="90000"/>
+              </a:lnSpc>
+              <a:spcBef>
+                <a:spcPct val="20000"/>
+              </a:spcBef>
+              <a:buSzPct val="80000"/>
+              <a:buFont typeface="Wingdings" pitchFamily="2" charset="2"/>
+              <a:buChar char=""/>
+            </a:pPr>
+            <a:r>
+              <a:rPr lang="en-US" sz="3600" spc="-70" dirty="0">
+                <a:solidFill>
+                  <a:srgbClr val="EB3C00"/>
+                </a:solidFill>
+                <a:latin typeface="Segoe UI Light"/>
+              </a:rPr>
+              <a:t>Challenges</a:t>
+            </a:r>
+          </a:p>
+          <a:p>
+            <a:pPr marL="517525" lvl="1" indent="-233363">
+              <a:lnSpc>
+                <a:spcPct val="90000"/>
+              </a:lnSpc>
+              <a:spcBef>
+                <a:spcPct val="20000"/>
+              </a:spcBef>
+              <a:buSzPct val="90000"/>
+              <a:buFont typeface="Wingdings" pitchFamily="2" charset="2"/>
+              <a:buChar char=""/>
+            </a:pPr>
+            <a:r>
+              <a:rPr lang="en-US" sz="2000" dirty="0">
+                <a:gradFill>
+                  <a:gsLst>
+                    <a:gs pos="1250">
+                      <a:srgbClr val="797A7D"/>
+                    </a:gs>
+                    <a:gs pos="100000">
+                      <a:srgbClr val="797A7D"/>
+                    </a:gs>
+                  </a:gsLst>
+                  <a:lin ang="5400000" scaled="0"/>
+                </a:gradFill>
+              </a:rPr>
+              <a:t>None</a:t>
+            </a:r>
+          </a:p>
+        </p:txBody>
+      </p:sp>
     </p:spTree>
     <p:extLst>
       <p:ext uri="{BB962C8B-B14F-4D97-AF65-F5344CB8AC3E}">
-        <p14:creationId xmlns:p14="http://schemas.microsoft.com/office/powerpoint/2010/main" val="2817907372"/>
+        <p14:creationId xmlns:p14="http://schemas.microsoft.com/office/powerpoint/2010/main" val="994721949"/>
       </p:ext>
     </p:extLst>
   </p:cSld>
@@ -23839,14 +23981,29 @@
         </p:nvSpPr>
         <p:spPr/>
         <p:txBody>
-          <a:bodyPr/>
+          <a:bodyPr anchor="ctr"/>
           <a:lstStyle/>
           <a:p>
             <a:r>
               <a:rPr lang="nl-BE" dirty="0" smtClean="0"/>
-              <a:t>Branding</a:t>
-            </a:r>
-            <a:endParaRPr lang="nl-BE" dirty="0"/>
+              <a:t>Branding </a:t>
+            </a:r>
+            <a:br>
+              <a:rPr lang="nl-BE" dirty="0" smtClean="0"/>
+            </a:br>
+            <a:r>
+              <a:rPr lang="en-US" sz="3600" dirty="0" err="1">
+                <a:solidFill>
+                  <a:schemeClr val="accent1"/>
+                </a:solidFill>
+              </a:rPr>
+              <a:t>contoso.sharepoint.branding.wsp</a:t>
+            </a:r>
+            <a:endParaRPr lang="nl-BE" sz="3600" dirty="0">
+              <a:solidFill>
+                <a:schemeClr val="accent1"/>
+              </a:solidFill>
+            </a:endParaRPr>
           </a:p>
         </p:txBody>
       </p:sp>
@@ -23862,7 +24019,7 @@
         </p:nvSpPr>
         <p:spPr>
           <a:xfrm>
-            <a:off x="3173505" y="1290753"/>
+            <a:off x="3173506" y="1447799"/>
             <a:ext cx="8494619" cy="4619626"/>
           </a:xfrm>
         </p:spPr>
@@ -23872,52 +24029,119 @@
           <a:p>
             <a:r>
               <a:rPr lang="en-US" dirty="0" smtClean="0"/>
-              <a:t>Migration</a:t>
+              <a:t>Current Implementation:</a:t>
             </a:r>
             <a:endParaRPr lang="en-US" dirty="0"/>
           </a:p>
           <a:p>
             <a:pPr lvl="1"/>
             <a:r>
-              <a:rPr lang="en-US" dirty="0" smtClean="0"/>
-              <a:t>Light </a:t>
-            </a:r>
-            <a:r>
-              <a:rPr lang="en-US" dirty="0"/>
-              <a:t>Branding can be achieved using Office 365 themes.</a:t>
+              <a:rPr lang="en-US" sz="1800" dirty="0" smtClean="0"/>
+              <a:t>The branding solution provides the following features:</a:t>
+            </a:r>
+            <a:endParaRPr lang="en-US" sz="1800" dirty="0"/>
+          </a:p>
+          <a:p>
+            <a:pPr lvl="2"/>
+            <a:r>
+              <a:rPr lang="en-US" sz="1800" dirty="0" smtClean="0"/>
+              <a:t>Custom web </a:t>
+            </a:r>
+            <a:r>
+              <a:rPr lang="en-US" sz="1800" dirty="0"/>
+              <a:t>controls + page layouts </a:t>
+            </a:r>
+            <a:endParaRPr lang="en-US" sz="1800" dirty="0" smtClean="0"/>
+          </a:p>
+          <a:p>
+            <a:pPr lvl="2"/>
+            <a:r>
+              <a:rPr lang="en-US" sz="1800" dirty="0" smtClean="0"/>
+              <a:t>Custom </a:t>
+            </a:r>
+            <a:r>
+              <a:rPr lang="en-US" sz="1800" dirty="0"/>
+              <a:t>branding (master page + CSS)</a:t>
+            </a:r>
+          </a:p>
+          <a:p>
+            <a:pPr lvl="2"/>
+            <a:r>
+              <a:rPr lang="en-US" sz="1800" dirty="0"/>
+              <a:t>Social features (commenting, tag cloud)</a:t>
+            </a:r>
+          </a:p>
+          <a:p>
+            <a:pPr lvl="2"/>
+            <a:r>
+              <a:rPr lang="en-US" sz="1800" dirty="0" smtClean="0"/>
+              <a:t>Custom </a:t>
+            </a:r>
+            <a:r>
+              <a:rPr lang="en-US" sz="1800" dirty="0"/>
+              <a:t>navigation</a:t>
+            </a:r>
+          </a:p>
+          <a:p>
+            <a:pPr lvl="2"/>
+            <a:r>
+              <a:rPr lang="en-US" sz="1800" dirty="0" smtClean="0"/>
+              <a:t>Custom </a:t>
+            </a:r>
+            <a:r>
+              <a:rPr lang="en-US" sz="1800" dirty="0" smtClean="0"/>
+              <a:t>web </a:t>
+            </a:r>
+            <a:r>
+              <a:rPr lang="en-US" sz="1800" dirty="0"/>
+              <a:t>parts / </a:t>
+            </a:r>
+            <a:r>
+              <a:rPr lang="en-US" sz="1800" dirty="0" smtClean="0"/>
+              <a:t>controls</a:t>
+            </a:r>
+            <a:endParaRPr lang="en-US" sz="1800" dirty="0"/>
+          </a:p>
+          <a:p>
+            <a:pPr lvl="3"/>
+            <a:r>
+              <a:rPr lang="en-US" sz="1600" dirty="0"/>
+              <a:t>Share price, world clock, weather, emergency information, image rotator</a:t>
             </a:r>
           </a:p>
           <a:p>
             <a:pPr lvl="1"/>
             <a:r>
-              <a:rPr lang="en-US" dirty="0"/>
-              <a:t>Medium branding on master page can be achieved through the use of alternate CSS.</a:t>
-            </a:r>
-          </a:p>
-          <a:p>
-            <a:pPr lvl="1"/>
-            <a:r>
-              <a:rPr lang="en-US" dirty="0">
-                <a:hlinkClick r:id="rId3"/>
-              </a:rPr>
-              <a:t>SP Color tool</a:t>
-            </a:r>
-            <a:r>
-              <a:rPr lang="en-US" dirty="0"/>
-              <a:t> provides color palette functionality for use with SharePoint designs. </a:t>
-            </a:r>
-            <a:endParaRPr lang="en-US" dirty="0" smtClean="0"/>
-          </a:p>
-          <a:p>
-            <a:pPr lvl="1"/>
-            <a:r>
-              <a:rPr lang="en-US" dirty="0" smtClean="0"/>
-              <a:t>Use out of the box structural navigation</a:t>
-            </a:r>
-          </a:p>
-          <a:p>
-            <a:pPr lvl="1"/>
-            <a:endParaRPr lang="en-US" dirty="0"/>
+              <a:rPr lang="en-US" sz="1800" dirty="0" smtClean="0"/>
+              <a:t>Other intranet </a:t>
+            </a:r>
+            <a:r>
+              <a:rPr lang="en-US" sz="1800" dirty="0"/>
+              <a:t>features:</a:t>
+            </a:r>
+          </a:p>
+          <a:p>
+            <a:pPr lvl="2"/>
+            <a:r>
+              <a:rPr lang="en-US" sz="1800" dirty="0"/>
+              <a:t>Site provisioning for collaborative </a:t>
+            </a:r>
+            <a:r>
+              <a:rPr lang="en-US" sz="1800" dirty="0" smtClean="0"/>
+              <a:t>sites</a:t>
+            </a:r>
+          </a:p>
+          <a:p>
+            <a:pPr lvl="2"/>
+            <a:r>
+              <a:rPr lang="en-US" sz="1800" dirty="0" err="1" smtClean="0"/>
+              <a:t>MySite</a:t>
+            </a:r>
+            <a:r>
+              <a:rPr lang="en-US" sz="1800" dirty="0" smtClean="0"/>
+              <a:t> customizations</a:t>
+            </a:r>
+            <a:endParaRPr lang="en-US" sz="1800" dirty="0"/>
           </a:p>
         </p:txBody>
       </p:sp>
@@ -24180,7 +24404,7 @@
           <p:nvPr>
             <p:extLst>
               <p:ext uri="{D42A27DB-BD31-4B8C-83A1-F6EECF244321}">
-                <p14:modId xmlns:p14="http://schemas.microsoft.com/office/powerpoint/2010/main" val="3354339755"/>
+                <p14:modId xmlns:p14="http://schemas.microsoft.com/office/powerpoint/2010/main" val="2701059414"/>
               </p:ext>
             </p:extLst>
           </p:nvPr>
@@ -24199,7 +24423,7 @@
                 <a:gridCol w="2373524">
                   <a:extLst>
                     <a:ext uri="{9D8B030D-6E8A-4147-A177-3AD203B41FA5}">
-                      <a16:colId xmlns:a16="http://schemas.microsoft.com/office/drawing/2014/main" xmlns="" val="20000"/>
+                      <a16:colId xmlns="" xmlns:a16="http://schemas.microsoft.com/office/drawing/2014/main" val="20000"/>
                     </a:ext>
                   </a:extLst>
                 </a:gridCol>
@@ -24262,7 +24486,7 @@
                 </a:tc>
                 <a:extLst>
                   <a:ext uri="{0D108BD9-81ED-4DB2-BD59-A6C34878D82A}">
-                    <a16:rowId xmlns:a16="http://schemas.microsoft.com/office/drawing/2014/main" xmlns="" val="10000"/>
+                    <a16:rowId xmlns="" xmlns:a16="http://schemas.microsoft.com/office/drawing/2014/main" val="10000"/>
                   </a:ext>
                 </a:extLst>
               </a:tr>
@@ -24323,7 +24547,7 @@
                 </a:tc>
                 <a:extLst>
                   <a:ext uri="{0D108BD9-81ED-4DB2-BD59-A6C34878D82A}">
-                    <a16:rowId xmlns:a16="http://schemas.microsoft.com/office/drawing/2014/main" xmlns="" val="10001"/>
+                    <a16:rowId xmlns="" xmlns:a16="http://schemas.microsoft.com/office/drawing/2014/main" val="10001"/>
                   </a:ext>
                 </a:extLst>
               </a:tr>
@@ -24393,7 +24617,7 @@
                 </a:tc>
                 <a:extLst>
                   <a:ext uri="{0D108BD9-81ED-4DB2-BD59-A6C34878D82A}">
-                    <a16:rowId xmlns:a16="http://schemas.microsoft.com/office/drawing/2014/main" xmlns="" val="10002"/>
+                    <a16:rowId xmlns="" xmlns:a16="http://schemas.microsoft.com/office/drawing/2014/main" val="10002"/>
                   </a:ext>
                 </a:extLst>
               </a:tr>
@@ -24471,7 +24695,7 @@
                 </a:tc>
                 <a:extLst>
                   <a:ext uri="{0D108BD9-81ED-4DB2-BD59-A6C34878D82A}">
-                    <a16:rowId xmlns:a16="http://schemas.microsoft.com/office/drawing/2014/main" xmlns="" val="10007"/>
+                    <a16:rowId xmlns="" xmlns:a16="http://schemas.microsoft.com/office/drawing/2014/main" val="10007"/>
                   </a:ext>
                 </a:extLst>
               </a:tr>
@@ -24488,7 +24712,7 @@
           <p:nvPr/>
         </p:nvPicPr>
         <p:blipFill>
-          <a:blip r:embed="rId4">
+          <a:blip r:embed="rId2">
             <a:extLst>
               <a:ext uri="{28A0092B-C50C-407E-A947-70E740481C1C}">
                 <a14:useLocalDpi xmlns:a14="http://schemas.microsoft.com/office/drawing/2010/main" val="0"/>
@@ -24523,7 +24747,7 @@
     </p:spTree>
     <p:extLst>
       <p:ext uri="{BB962C8B-B14F-4D97-AF65-F5344CB8AC3E}">
-        <p14:creationId xmlns:p14="http://schemas.microsoft.com/office/powerpoint/2010/main" val="3018069866"/>
+        <p14:creationId xmlns:p14="http://schemas.microsoft.com/office/powerpoint/2010/main" val="2817907372"/>
       </p:ext>
     </p:extLst>
   </p:cSld>
@@ -24604,25 +24828,52 @@
           <a:lstStyle/>
           <a:p>
             <a:r>
+              <a:rPr lang="en-US" dirty="0" smtClean="0"/>
+              <a:t>Migration</a:t>
+            </a:r>
+            <a:endParaRPr lang="en-US" dirty="0"/>
+          </a:p>
+          <a:p>
+            <a:pPr lvl="1"/>
+            <a:r>
+              <a:rPr lang="en-US" dirty="0" smtClean="0"/>
+              <a:t>Light </a:t>
+            </a:r>
+            <a:r>
               <a:rPr lang="en-US" dirty="0"/>
-              <a:t>Challenges:</a:t>
+              <a:t>Branding can be achieved using Office 365 themes.</a:t>
             </a:r>
           </a:p>
           <a:p>
             <a:pPr lvl="1"/>
             <a:r>
               <a:rPr lang="en-US" dirty="0"/>
-              <a:t>The many list definitions for the project sites will have a big migration impact (will take time to process)</a:t>
+              <a:t>Medium branding on master page can be achieved through the use of alternate CSS.</a:t>
             </a:r>
           </a:p>
           <a:p>
             <a:pPr lvl="1"/>
             <a:r>
+              <a:rPr lang="en-US" dirty="0">
+                <a:hlinkClick r:id="rId3"/>
+              </a:rPr>
+              <a:t>SP Color tool</a:t>
+            </a:r>
+            <a:r>
               <a:rPr lang="en-US" dirty="0"/>
-              <a:t>Need to update all existing sites (branding) and pages (new page layouts) which will require proper tooling </a:t>
-            </a:r>
-          </a:p>
-          <a:p>
+              <a:t> provides color palette functionality for use with SharePoint designs. </a:t>
+            </a:r>
+            <a:endParaRPr lang="en-US" dirty="0" smtClean="0"/>
+          </a:p>
+          <a:p>
+            <a:pPr lvl="1"/>
+            <a:r>
+              <a:rPr lang="en-US" dirty="0" smtClean="0"/>
+              <a:t>Use out of the box structural navigation</a:t>
+            </a:r>
+          </a:p>
+          <a:p>
+            <a:pPr lvl="1"/>
             <a:endParaRPr lang="en-US" dirty="0"/>
           </a:p>
         </p:txBody>
@@ -24886,7 +25137,7 @@
           <p:nvPr>
             <p:extLst>
               <p:ext uri="{D42A27DB-BD31-4B8C-83A1-F6EECF244321}">
-                <p14:modId xmlns:p14="http://schemas.microsoft.com/office/powerpoint/2010/main" val="1302890150"/>
+                <p14:modId xmlns:p14="http://schemas.microsoft.com/office/powerpoint/2010/main" val="3354339755"/>
               </p:ext>
             </p:extLst>
           </p:nvPr>
@@ -24905,7 +25156,7 @@
                 <a:gridCol w="2373524">
                   <a:extLst>
                     <a:ext uri="{9D8B030D-6E8A-4147-A177-3AD203B41FA5}">
-                      <a16:colId xmlns:a16="http://schemas.microsoft.com/office/drawing/2014/main" xmlns="" val="20000"/>
+                      <a16:colId xmlns="" xmlns:a16="http://schemas.microsoft.com/office/drawing/2014/main" val="20000"/>
                     </a:ext>
                   </a:extLst>
                 </a:gridCol>
@@ -24968,7 +25219,7 @@
                 </a:tc>
                 <a:extLst>
                   <a:ext uri="{0D108BD9-81ED-4DB2-BD59-A6C34878D82A}">
-                    <a16:rowId xmlns:a16="http://schemas.microsoft.com/office/drawing/2014/main" xmlns="" val="10000"/>
+                    <a16:rowId xmlns="" xmlns:a16="http://schemas.microsoft.com/office/drawing/2014/main" val="10000"/>
                   </a:ext>
                 </a:extLst>
               </a:tr>
@@ -25029,7 +25280,7 @@
                 </a:tc>
                 <a:extLst>
                   <a:ext uri="{0D108BD9-81ED-4DB2-BD59-A6C34878D82A}">
-                    <a16:rowId xmlns:a16="http://schemas.microsoft.com/office/drawing/2014/main" xmlns="" val="10001"/>
+                    <a16:rowId xmlns="" xmlns:a16="http://schemas.microsoft.com/office/drawing/2014/main" val="10001"/>
                   </a:ext>
                 </a:extLst>
               </a:tr>
@@ -25099,7 +25350,7 @@
                 </a:tc>
                 <a:extLst>
                   <a:ext uri="{0D108BD9-81ED-4DB2-BD59-A6C34878D82A}">
-                    <a16:rowId xmlns:a16="http://schemas.microsoft.com/office/drawing/2014/main" xmlns="" val="10002"/>
+                    <a16:rowId xmlns="" xmlns:a16="http://schemas.microsoft.com/office/drawing/2014/main" val="10002"/>
                   </a:ext>
                 </a:extLst>
               </a:tr>
@@ -25177,7 +25428,7 @@
                 </a:tc>
                 <a:extLst>
                   <a:ext uri="{0D108BD9-81ED-4DB2-BD59-A6C34878D82A}">
-                    <a16:rowId xmlns:a16="http://schemas.microsoft.com/office/drawing/2014/main" xmlns="" val="10007"/>
+                    <a16:rowId xmlns="" xmlns:a16="http://schemas.microsoft.com/office/drawing/2014/main" val="10007"/>
                   </a:ext>
                 </a:extLst>
               </a:tr>
@@ -25194,7 +25445,7 @@
           <p:nvPr/>
         </p:nvPicPr>
         <p:blipFill>
-          <a:blip r:embed="rId3">
+          <a:blip r:embed="rId4">
             <a:extLst>
               <a:ext uri="{28A0092B-C50C-407E-A947-70E740481C1C}">
                 <a14:useLocalDpi xmlns:a14="http://schemas.microsoft.com/office/drawing/2010/main" val="0"/>
@@ -25229,7 +25480,7 @@
     </p:spTree>
     <p:extLst>
       <p:ext uri="{BB962C8B-B14F-4D97-AF65-F5344CB8AC3E}">
-        <p14:creationId xmlns:p14="http://schemas.microsoft.com/office/powerpoint/2010/main" val="4239080423"/>
+        <p14:creationId xmlns:p14="http://schemas.microsoft.com/office/powerpoint/2010/main" val="3018069866"/>
       </p:ext>
     </p:extLst>
   </p:cSld>
@@ -25283,41 +25534,9 @@
           <a:p>
             <a:r>
               <a:rPr lang="nl-BE" dirty="0" smtClean="0"/>
-              <a:t>Provisioning</a:t>
-            </a:r>
-            <a:br>
-              <a:rPr lang="nl-BE" dirty="0" smtClean="0"/>
-            </a:br>
-            <a:r>
-              <a:rPr lang="en-US" sz="3600" dirty="0" err="1">
-                <a:solidFill>
-                  <a:schemeClr val="accent1"/>
-                </a:solidFill>
-              </a:rPr>
-              <a:t>contoso.sharepoint.provisioning.wsp</a:t>
-            </a:r>
-            <a:r>
-              <a:rPr lang="en-US" sz="6000" dirty="0">
-                <a:solidFill>
-                  <a:schemeClr val="accent1"/>
-                </a:solidFill>
-                <a:latin typeface="Calibri" panose="020F0502020204030204" pitchFamily="34" charset="0"/>
-              </a:rPr>
-              <a:t/>
-            </a:r>
-            <a:br>
-              <a:rPr lang="en-US" sz="6000" dirty="0">
-                <a:solidFill>
-                  <a:schemeClr val="accent1"/>
-                </a:solidFill>
-                <a:latin typeface="Calibri" panose="020F0502020204030204" pitchFamily="34" charset="0"/>
-              </a:rPr>
-            </a:br>
-            <a:endParaRPr lang="nl-BE" dirty="0">
-              <a:solidFill>
-                <a:schemeClr val="accent1"/>
-              </a:solidFill>
-            </a:endParaRPr>
+              <a:t>Branding</a:t>
+            </a:r>
+            <a:endParaRPr lang="nl-BE" dirty="0"/>
           </a:p>
         </p:txBody>
       </p:sp>
@@ -25333,7 +25552,7 @@
         </p:nvSpPr>
         <p:spPr>
           <a:xfrm>
-            <a:off x="3173505" y="1752599"/>
+            <a:off x="3173505" y="1290753"/>
             <a:ext cx="8494619" cy="4619626"/>
           </a:xfrm>
         </p:spPr>
@@ -25343,73 +25562,25 @@
           <a:p>
             <a:r>
               <a:rPr lang="en-US" dirty="0"/>
-              <a:t>High level requirements:</a:t>
+              <a:t>Challenges:</a:t>
             </a:r>
           </a:p>
           <a:p>
             <a:pPr lvl="1"/>
             <a:r>
-              <a:rPr lang="en-US" sz="1800" dirty="0" smtClean="0"/>
-              <a:t>Typical </a:t>
-            </a:r>
-            <a:r>
-              <a:rPr lang="en-US" sz="1800" dirty="0"/>
-              <a:t>Intranet features:</a:t>
-            </a:r>
-          </a:p>
-          <a:p>
-            <a:pPr lvl="2"/>
-            <a:r>
-              <a:rPr lang="en-US" sz="1800" dirty="0" smtClean="0"/>
-              <a:t>Prevent some custom actions</a:t>
-            </a:r>
-          </a:p>
-          <a:p>
-            <a:pPr lvl="2"/>
-            <a:r>
-              <a:rPr lang="en-US" sz="1800" dirty="0"/>
-              <a:t>Prevents the creation of </a:t>
-            </a:r>
-            <a:r>
-              <a:rPr lang="en-US" sz="1800" dirty="0" err="1" smtClean="0"/>
-              <a:t>subsites</a:t>
-            </a:r>
-            <a:endParaRPr lang="en-US" sz="1800" dirty="0" smtClean="0"/>
-          </a:p>
-          <a:p>
-            <a:pPr lvl="2"/>
-            <a:r>
-              <a:rPr lang="en-US" sz="1800" dirty="0" smtClean="0"/>
-              <a:t>Hide </a:t>
-            </a:r>
-            <a:r>
-              <a:rPr lang="en-US" sz="1800" dirty="0"/>
-              <a:t>Sites and </a:t>
-            </a:r>
-            <a:r>
-              <a:rPr lang="en-US" sz="1800" dirty="0" err="1" smtClean="0"/>
-              <a:t>WorkSpaces</a:t>
-            </a:r>
-            <a:r>
-              <a:rPr lang="en-US" sz="1800" dirty="0" smtClean="0"/>
-              <a:t> </a:t>
-            </a:r>
-          </a:p>
-          <a:p>
-            <a:pPr lvl="2"/>
-            <a:r>
-              <a:rPr lang="en-US" sz="1800" dirty="0" smtClean="0"/>
-              <a:t>Manage </a:t>
-            </a:r>
-            <a:r>
-              <a:rPr lang="en-US" sz="1800" dirty="0"/>
-              <a:t>Site </a:t>
-            </a:r>
-            <a:r>
-              <a:rPr lang="en-US" sz="1800" dirty="0" smtClean="0"/>
-              <a:t>Features</a:t>
-            </a:r>
-            <a:endParaRPr lang="en-US" sz="1800" dirty="0"/>
+              <a:rPr lang="en-US" dirty="0"/>
+              <a:t>The many list definitions for the project sites will have a big migration impact (will take time to process)</a:t>
+            </a:r>
+          </a:p>
+          <a:p>
+            <a:pPr lvl="1"/>
+            <a:r>
+              <a:rPr lang="en-US" dirty="0"/>
+              <a:t>Need to update all existing sites (branding) and pages (new page layouts) which will require proper tooling </a:t>
+            </a:r>
+          </a:p>
+          <a:p>
+            <a:endParaRPr lang="en-US" dirty="0"/>
           </a:p>
         </p:txBody>
       </p:sp>
@@ -25672,7 +25843,7 @@
           <p:nvPr>
             <p:extLst>
               <p:ext uri="{D42A27DB-BD31-4B8C-83A1-F6EECF244321}">
-                <p14:modId xmlns:p14="http://schemas.microsoft.com/office/powerpoint/2010/main" val="642078531"/>
+                <p14:modId xmlns:p14="http://schemas.microsoft.com/office/powerpoint/2010/main" val="1302890150"/>
               </p:ext>
             </p:extLst>
           </p:nvPr>
@@ -25691,7 +25862,7 @@
                 <a:gridCol w="2373524">
                   <a:extLst>
                     <a:ext uri="{9D8B030D-6E8A-4147-A177-3AD203B41FA5}">
-                      <a16:colId xmlns:a16="http://schemas.microsoft.com/office/drawing/2014/main" xmlns="" val="20000"/>
+                      <a16:colId xmlns="" xmlns:a16="http://schemas.microsoft.com/office/drawing/2014/main" val="20000"/>
                     </a:ext>
                   </a:extLst>
                 </a:gridCol>
@@ -25754,7 +25925,7 @@
                 </a:tc>
                 <a:extLst>
                   <a:ext uri="{0D108BD9-81ED-4DB2-BD59-A6C34878D82A}">
-                    <a16:rowId xmlns:a16="http://schemas.microsoft.com/office/drawing/2014/main" xmlns="" val="10000"/>
+                    <a16:rowId xmlns="" xmlns:a16="http://schemas.microsoft.com/office/drawing/2014/main" val="10000"/>
                   </a:ext>
                 </a:extLst>
               </a:tr>
@@ -25815,7 +25986,7 @@
                 </a:tc>
                 <a:extLst>
                   <a:ext uri="{0D108BD9-81ED-4DB2-BD59-A6C34878D82A}">
-                    <a16:rowId xmlns:a16="http://schemas.microsoft.com/office/drawing/2014/main" xmlns="" val="10001"/>
+                    <a16:rowId xmlns="" xmlns:a16="http://schemas.microsoft.com/office/drawing/2014/main" val="10001"/>
                   </a:ext>
                 </a:extLst>
               </a:tr>
@@ -25885,7 +26056,7 @@
                 </a:tc>
                 <a:extLst>
                   <a:ext uri="{0D108BD9-81ED-4DB2-BD59-A6C34878D82A}">
-                    <a16:rowId xmlns:a16="http://schemas.microsoft.com/office/drawing/2014/main" xmlns="" val="10002"/>
+                    <a16:rowId xmlns="" xmlns:a16="http://schemas.microsoft.com/office/drawing/2014/main" val="10002"/>
                   </a:ext>
                 </a:extLst>
               </a:tr>
@@ -25963,7 +26134,7 @@
                 </a:tc>
                 <a:extLst>
                   <a:ext uri="{0D108BD9-81ED-4DB2-BD59-A6C34878D82A}">
-                    <a16:rowId xmlns:a16="http://schemas.microsoft.com/office/drawing/2014/main" xmlns="" val="10007"/>
+                    <a16:rowId xmlns="" xmlns:a16="http://schemas.microsoft.com/office/drawing/2014/main" val="10007"/>
                   </a:ext>
                 </a:extLst>
               </a:tr>
@@ -25980,7 +26151,7 @@
           <p:nvPr/>
         </p:nvPicPr>
         <p:blipFill>
-          <a:blip r:embed="rId2">
+          <a:blip r:embed="rId3">
             <a:extLst>
               <a:ext uri="{28A0092B-C50C-407E-A947-70E740481C1C}">
                 <a14:useLocalDpi xmlns:a14="http://schemas.microsoft.com/office/drawing/2010/main" val="0"/>
@@ -26015,7 +26186,7 @@
     </p:spTree>
     <p:extLst>
       <p:ext uri="{BB962C8B-B14F-4D97-AF65-F5344CB8AC3E}">
-        <p14:creationId xmlns:p14="http://schemas.microsoft.com/office/powerpoint/2010/main" val="821868080"/>
+        <p14:creationId xmlns:p14="http://schemas.microsoft.com/office/powerpoint/2010/main" val="4239080423"/>
       </p:ext>
     </p:extLst>
   </p:cSld>
@@ -26068,9 +26239,42 @@
           <a:lstStyle/>
           <a:p>
             <a:r>
-              <a:rPr lang="nl-BE" dirty="0"/>
+              <a:rPr lang="nl-BE" dirty="0" smtClean="0"/>
               <a:t>Provisioning</a:t>
             </a:r>
+            <a:br>
+              <a:rPr lang="nl-BE" dirty="0" smtClean="0"/>
+            </a:br>
+            <a:r>
+              <a:rPr lang="en-US" sz="3600" dirty="0" err="1">
+                <a:solidFill>
+                  <a:schemeClr val="accent1"/>
+                </a:solidFill>
+              </a:rPr>
+              <a:t>contoso.sharepoint.provisioning.wsp</a:t>
+            </a:r>
+            <a:r>
+              <a:rPr lang="en-US" sz="6000" dirty="0">
+                <a:solidFill>
+                  <a:schemeClr val="accent1"/>
+                </a:solidFill>
+                <a:latin typeface="Calibri" panose="020F0502020204030204" pitchFamily="34" charset="0"/>
+              </a:rPr>
+              <a:t/>
+            </a:r>
+            <a:br>
+              <a:rPr lang="en-US" sz="6000" dirty="0">
+                <a:solidFill>
+                  <a:schemeClr val="accent1"/>
+                </a:solidFill>
+                <a:latin typeface="Calibri" panose="020F0502020204030204" pitchFamily="34" charset="0"/>
+              </a:rPr>
+            </a:br>
+            <a:endParaRPr lang="nl-BE" dirty="0">
+              <a:solidFill>
+                <a:schemeClr val="accent1"/>
+              </a:solidFill>
+            </a:endParaRPr>
           </a:p>
         </p:txBody>
       </p:sp>
@@ -26086,7 +26290,7 @@
         </p:nvSpPr>
         <p:spPr>
           <a:xfrm>
-            <a:off x="3173505" y="1290753"/>
+            <a:off x="3173505" y="1752599"/>
             <a:ext cx="8494619" cy="4619626"/>
           </a:xfrm>
         </p:spPr>
@@ -26096,35 +26300,91 @@
           <a:p>
             <a:r>
               <a:rPr lang="en-US" dirty="0" smtClean="0"/>
-              <a:t>Migration</a:t>
+              <a:t>Current implementation:</a:t>
             </a:r>
             <a:endParaRPr lang="en-US" dirty="0"/>
           </a:p>
           <a:p>
             <a:pPr lvl="1"/>
             <a:r>
-              <a:rPr lang="en-US" dirty="0" smtClean="0"/>
-              <a:t>Client side object model (jQuery) can be used to hide custom actions</a:t>
-            </a:r>
-          </a:p>
-          <a:p>
-            <a:pPr lvl="1"/>
-            <a:r>
-              <a:rPr lang="en-US" dirty="0" smtClean="0"/>
-              <a:t>Remote provisioning technique using App Model</a:t>
-            </a:r>
-          </a:p>
-          <a:p>
-            <a:pPr lvl="1"/>
-            <a:endParaRPr lang="en-US" dirty="0" smtClean="0"/>
-          </a:p>
-          <a:p>
-            <a:pPr lvl="1"/>
-            <a:endParaRPr lang="en-US" dirty="0" smtClean="0"/>
-          </a:p>
-          <a:p>
-            <a:pPr lvl="1"/>
-            <a:endParaRPr lang="en-US" dirty="0"/>
+              <a:rPr lang="en-US" sz="1800" dirty="0" smtClean="0"/>
+              <a:t>The existing farm solution has been designed to:</a:t>
+            </a:r>
+            <a:endParaRPr lang="en-US" sz="1800" dirty="0"/>
+          </a:p>
+          <a:p>
+            <a:pPr lvl="2"/>
+            <a:r>
+              <a:rPr lang="en-US" sz="1800" dirty="0" smtClean="0"/>
+              <a:t>Prevent custom user actions</a:t>
+            </a:r>
+            <a:endParaRPr lang="en-US" sz="1800" dirty="0" smtClean="0"/>
+          </a:p>
+          <a:p>
+            <a:pPr lvl="2"/>
+            <a:r>
+              <a:rPr lang="en-US" sz="1800" dirty="0" smtClean="0"/>
+              <a:t>Prevent </a:t>
+            </a:r>
+            <a:r>
+              <a:rPr lang="en-US" sz="1800" dirty="0"/>
+              <a:t>the </a:t>
+            </a:r>
+            <a:r>
+              <a:rPr lang="en-US" sz="1800" dirty="0" smtClean="0"/>
+              <a:t>users from using certain site templates </a:t>
+            </a:r>
+          </a:p>
+          <a:p>
+            <a:pPr lvl="2"/>
+            <a:r>
+              <a:rPr lang="en-US" sz="1800" dirty="0" smtClean="0"/>
+              <a:t>Allows users to create sub sites through electronic requests</a:t>
+            </a:r>
+            <a:endParaRPr lang="en-US" sz="1800" dirty="0" smtClean="0"/>
+          </a:p>
+          <a:p>
+            <a:pPr lvl="2"/>
+            <a:r>
+              <a:rPr lang="en-US" sz="1800" dirty="0" smtClean="0"/>
+              <a:t>Hides the sites requested by other users</a:t>
+            </a:r>
+            <a:endParaRPr lang="en-US" sz="1800" dirty="0" smtClean="0"/>
+          </a:p>
+          <a:p>
+            <a:pPr lvl="2"/>
+            <a:r>
+              <a:rPr lang="en-US" sz="1800" dirty="0" smtClean="0"/>
+              <a:t>Allows auto activation of some site </a:t>
+            </a:r>
+            <a:r>
+              <a:rPr lang="en-US" sz="1800" dirty="0" smtClean="0"/>
+              <a:t>f</a:t>
+            </a:r>
+            <a:r>
+              <a:rPr lang="en-US" sz="1800" dirty="0" smtClean="0"/>
+              <a:t>eatures during site provision</a:t>
+            </a:r>
+          </a:p>
+          <a:p>
+            <a:pPr lvl="2"/>
+            <a:r>
+              <a:rPr lang="en-US" sz="1800" dirty="0" smtClean="0"/>
+              <a:t>My Sites </a:t>
+            </a:r>
+            <a:r>
+              <a:rPr lang="en-US" sz="1800" dirty="0"/>
+              <a:t>are </a:t>
+            </a:r>
+            <a:r>
+              <a:rPr lang="en-US" sz="1800" dirty="0" smtClean="0"/>
+              <a:t>set to expire </a:t>
+            </a:r>
+            <a:r>
+              <a:rPr lang="en-US" sz="1800" dirty="0"/>
+              <a:t>after one year</a:t>
+            </a:r>
+            <a:endParaRPr lang="en-US" sz="1800" dirty="0"/>
           </a:p>
         </p:txBody>
       </p:sp>
@@ -26387,7 +26647,7 @@
           <p:nvPr>
             <p:extLst>
               <p:ext uri="{D42A27DB-BD31-4B8C-83A1-F6EECF244321}">
-                <p14:modId xmlns:p14="http://schemas.microsoft.com/office/powerpoint/2010/main" val="3520774442"/>
+                <p14:modId xmlns:p14="http://schemas.microsoft.com/office/powerpoint/2010/main" val="2946021627"/>
               </p:ext>
             </p:extLst>
           </p:nvPr>
@@ -26406,7 +26666,7 @@
                 <a:gridCol w="2373524">
                   <a:extLst>
                     <a:ext uri="{9D8B030D-6E8A-4147-A177-3AD203B41FA5}">
-                      <a16:colId xmlns:a16="http://schemas.microsoft.com/office/drawing/2014/main" xmlns="" val="20000"/>
+                      <a16:colId xmlns="" xmlns:a16="http://schemas.microsoft.com/office/drawing/2014/main" val="20000"/>
                     </a:ext>
                   </a:extLst>
                 </a:gridCol>
@@ -26420,7 +26680,7 @@
                       <a:pPr algn="ctr"/>
                       <a:r>
                         <a:rPr lang="en-US" b="1" i="0" dirty="0" smtClean="0"/>
-                        <a:t>Branding</a:t>
+                        <a:t>Provisioning</a:t>
                       </a:r>
                       <a:endParaRPr lang="nl-BE" b="1" i="0" dirty="0"/>
                     </a:p>
@@ -26469,7 +26729,7 @@
                 </a:tc>
                 <a:extLst>
                   <a:ext uri="{0D108BD9-81ED-4DB2-BD59-A6C34878D82A}">
-                    <a16:rowId xmlns:a16="http://schemas.microsoft.com/office/drawing/2014/main" xmlns="" val="10000"/>
+                    <a16:rowId xmlns="" xmlns:a16="http://schemas.microsoft.com/office/drawing/2014/main" val="10000"/>
                   </a:ext>
                 </a:extLst>
               </a:tr>
@@ -26530,7 +26790,7 @@
                 </a:tc>
                 <a:extLst>
                   <a:ext uri="{0D108BD9-81ED-4DB2-BD59-A6C34878D82A}">
-                    <a16:rowId xmlns:a16="http://schemas.microsoft.com/office/drawing/2014/main" xmlns="" val="10001"/>
+                    <a16:rowId xmlns="" xmlns:a16="http://schemas.microsoft.com/office/drawing/2014/main" val="10001"/>
                   </a:ext>
                 </a:extLst>
               </a:tr>
@@ -26600,7 +26860,7 @@
                 </a:tc>
                 <a:extLst>
                   <a:ext uri="{0D108BD9-81ED-4DB2-BD59-A6C34878D82A}">
-                    <a16:rowId xmlns:a16="http://schemas.microsoft.com/office/drawing/2014/main" xmlns="" val="10002"/>
+                    <a16:rowId xmlns="" xmlns:a16="http://schemas.microsoft.com/office/drawing/2014/main" val="10002"/>
                   </a:ext>
                 </a:extLst>
               </a:tr>
@@ -26678,7 +26938,7 @@
                 </a:tc>
                 <a:extLst>
                   <a:ext uri="{0D108BD9-81ED-4DB2-BD59-A6C34878D82A}">
-                    <a16:rowId xmlns:a16="http://schemas.microsoft.com/office/drawing/2014/main" xmlns="" val="10007"/>
+                    <a16:rowId xmlns="" xmlns:a16="http://schemas.microsoft.com/office/drawing/2014/main" val="10007"/>
                   </a:ext>
                 </a:extLst>
               </a:tr>
@@ -26695,7 +26955,7 @@
           <p:nvPr/>
         </p:nvPicPr>
         <p:blipFill>
-          <a:blip r:embed="rId3">
+          <a:blip r:embed="rId2">
             <a:extLst>
               <a:ext uri="{28A0092B-C50C-407E-A947-70E740481C1C}">
                 <a14:useLocalDpi xmlns:a14="http://schemas.microsoft.com/office/drawing/2010/main" val="0"/>
@@ -26727,9 +26987,177 @@
           </a:extLst>
         </p:spPr>
       </p:pic>
+    </p:spTree>
+    <p:extLst>
+      <p:ext uri="{BB962C8B-B14F-4D97-AF65-F5344CB8AC3E}">
+        <p14:creationId xmlns:p14="http://schemas.microsoft.com/office/powerpoint/2010/main" val="821868080"/>
+      </p:ext>
+    </p:extLst>
+  </p:cSld>
+  <p:clrMapOvr>
+    <a:masterClrMapping/>
+  </p:clrMapOvr>
+  <p:transition>
+    <p:fade/>
+  </p:transition>
+  <p:timing>
+    <p:tnLst>
+      <p:par>
+        <p:cTn id="1" dur="indefinite" restart="never" nodeType="tmRoot"/>
+      </p:par>
+    </p:tnLst>
+  </p:timing>
+</p:sld>
+</file>
+
+<file path=ppt/slides/slide24.xml><?xml version="1.0" encoding="utf-8"?>
+<p:sld xmlns:a="http://schemas.openxmlformats.org/drawingml/2006/main" xmlns:r="http://schemas.openxmlformats.org/officeDocument/2006/relationships" xmlns:p="http://schemas.openxmlformats.org/presentationml/2006/main">
+  <p:cSld>
+    <p:spTree>
+      <p:nvGrpSpPr>
+        <p:cNvPr id="1" name=""/>
+        <p:cNvGrpSpPr/>
+        <p:nvPr/>
+      </p:nvGrpSpPr>
+      <p:grpSpPr>
+        <a:xfrm>
+          <a:off x="0" y="0"/>
+          <a:ext cx="0" cy="0"/>
+          <a:chOff x="0" y="0"/>
+          <a:chExt cx="0" cy="0"/>
+        </a:xfrm>
+      </p:grpSpPr>
       <p:sp>
         <p:nvSpPr>
-          <p:cNvPr id="8" name="Text Placeholder 10"/>
+          <p:cNvPr id="2" name="Title 1"/>
+          <p:cNvSpPr>
+            <a:spLocks noGrp="1"/>
+          </p:cNvSpPr>
+          <p:nvPr>
+            <p:ph type="title"/>
+          </p:nvPr>
+        </p:nvSpPr>
+        <p:spPr/>
+        <p:txBody>
+          <a:bodyPr/>
+          <a:lstStyle/>
+          <a:p>
+            <a:r>
+              <a:rPr lang="nl-BE" dirty="0"/>
+              <a:t>Provisioning</a:t>
+            </a:r>
+          </a:p>
+        </p:txBody>
+      </p:sp>
+      <p:sp>
+        <p:nvSpPr>
+          <p:cNvPr id="11" name="Text Placeholder 10"/>
+          <p:cNvSpPr>
+            <a:spLocks noGrp="1"/>
+          </p:cNvSpPr>
+          <p:nvPr>
+            <p:ph type="body" sz="quarter" idx="10"/>
+          </p:nvPr>
+        </p:nvSpPr>
+        <p:spPr>
+          <a:xfrm>
+            <a:off x="3173505" y="1290753"/>
+            <a:ext cx="8494619" cy="4619626"/>
+          </a:xfrm>
+        </p:spPr>
+        <p:txBody>
+          <a:bodyPr/>
+          <a:lstStyle/>
+          <a:p>
+            <a:r>
+              <a:rPr lang="en-US" dirty="0" smtClean="0"/>
+              <a:t>Migration</a:t>
+            </a:r>
+            <a:endParaRPr lang="en-US" dirty="0"/>
+          </a:p>
+          <a:p>
+            <a:pPr lvl="1"/>
+            <a:r>
+              <a:rPr lang="en-US" dirty="0" smtClean="0"/>
+              <a:t>Client side object model (jQuery) can be used to hide custom actions</a:t>
+            </a:r>
+          </a:p>
+          <a:p>
+            <a:pPr lvl="1"/>
+            <a:r>
+              <a:rPr lang="en-US" dirty="0" smtClean="0"/>
+              <a:t>Remote provisioning technique </a:t>
+            </a:r>
+            <a:r>
+              <a:rPr lang="en-US" dirty="0" smtClean="0"/>
+              <a:t>can be used to create sites using </a:t>
+            </a:r>
+            <a:r>
+              <a:rPr lang="en-US" dirty="0" smtClean="0"/>
+              <a:t>App </a:t>
+            </a:r>
+            <a:r>
+              <a:rPr lang="en-US" dirty="0" smtClean="0"/>
+              <a:t>Model.</a:t>
+            </a:r>
+          </a:p>
+          <a:p>
+            <a:pPr lvl="1"/>
+            <a:r>
+              <a:rPr lang="en-US" dirty="0" smtClean="0"/>
+              <a:t>Site </a:t>
+            </a:r>
+            <a:r>
+              <a:rPr lang="en-US" dirty="0"/>
+              <a:t>provisioning work can be done using an </a:t>
+            </a:r>
+            <a:r>
+              <a:rPr lang="en-US" b="1" dirty="0"/>
+              <a:t>App Event Receiver</a:t>
+            </a:r>
+            <a:endParaRPr lang="en-US" dirty="0" smtClean="0"/>
+          </a:p>
+          <a:p>
+            <a:pPr lvl="1"/>
+            <a:r>
+              <a:rPr lang="en-US" dirty="0"/>
+              <a:t>Redirection </a:t>
+            </a:r>
+            <a:r>
+              <a:rPr lang="en-US" dirty="0" smtClean="0"/>
+              <a:t>on site creation page may </a:t>
+            </a:r>
+            <a:r>
+              <a:rPr lang="en-US" dirty="0"/>
+              <a:t>be implemented through a </a:t>
+            </a:r>
+            <a:r>
+              <a:rPr lang="en-US" b="1" dirty="0"/>
+              <a:t>Custom Action</a:t>
+            </a:r>
+            <a:endParaRPr lang="en-US" dirty="0"/>
+          </a:p>
+          <a:p>
+            <a:pPr lvl="1"/>
+            <a:endParaRPr lang="en-US" dirty="0" smtClean="0"/>
+          </a:p>
+          <a:p>
+            <a:pPr lvl="1"/>
+            <a:endParaRPr lang="en-US" dirty="0" smtClean="0"/>
+          </a:p>
+          <a:p>
+            <a:pPr lvl="1"/>
+            <a:endParaRPr lang="en-US" dirty="0" smtClean="0"/>
+          </a:p>
+          <a:p>
+            <a:pPr lvl="1"/>
+            <a:endParaRPr lang="en-US" dirty="0"/>
+          </a:p>
+        </p:txBody>
+      </p:sp>
+      <p:sp>
+        <p:nvSpPr>
+          <p:cNvPr id="4" name="Text Placeholder 6"/>
           <p:cNvSpPr txBox="1">
             <a:spLocks/>
           </p:cNvSpPr>
@@ -26737,19 +27165,17 @@
         </p:nvSpPr>
         <p:spPr>
           <a:xfrm>
-            <a:off x="3173505" y="3004507"/>
-            <a:ext cx="8494619" cy="1098879"/>
+            <a:off x="3173505" y="1243404"/>
+            <a:ext cx="8494619" cy="2043636"/>
           </a:xfrm>
           <a:prstGeom prst="rect">
             <a:avLst/>
           </a:prstGeom>
         </p:spPr>
         <p:txBody>
-          <a:bodyPr vert="horz" lIns="0" tIns="0" rIns="0" bIns="0" rtlCol="0">
-            <a:noAutofit/>
-          </a:bodyPr>
+          <a:bodyPr/>
           <a:lstStyle>
-            <a:lvl1pPr marL="284163" marR="0" indent="-284163" algn="l" defTabSz="914363" rtl="0" eaLnBrk="1" fontAlgn="auto" latinLnBrk="0" hangingPunct="1">
+            <a:lvl1pPr marL="339725" marR="0" indent="-339725" algn="l" defTabSz="914363" rtl="0" eaLnBrk="1" fontAlgn="auto" latinLnBrk="0" hangingPunct="1">
               <a:lnSpc>
                 <a:spcPct val="90000"/>
               </a:lnSpc>
@@ -26761,19 +27187,27 @@
               </a:spcAft>
               <a:buClrTx/>
               <a:buSzPct val="80000"/>
-              <a:buFont typeface="Wingdings" pitchFamily="2" charset="2"/>
-              <a:buChar char=""/>
+              <a:buFont typeface="Arial" pitchFamily="34" charset="0"/>
+              <a:buChar char="•"/>
               <a:tabLst/>
               <a:defRPr sz="3600" kern="1200" spc="-70" baseline="0">
-                <a:solidFill>
-                  <a:schemeClr val="tx2"/>
-                </a:solidFill>
+                <a:gradFill>
+                  <a:gsLst>
+                    <a:gs pos="1250">
+                      <a:schemeClr val="bg2"/>
+                    </a:gs>
+                    <a:gs pos="100000">
+                      <a:schemeClr val="bg2"/>
+                    </a:gs>
+                  </a:gsLst>
+                  <a:lin ang="5400000" scaled="0"/>
+                </a:gradFill>
                 <a:latin typeface="+mj-lt"/>
                 <a:ea typeface="+mn-ea"/>
                 <a:cs typeface="+mn-cs"/>
               </a:defRPr>
             </a:lvl1pPr>
-            <a:lvl2pPr marL="517525" marR="0" indent="-233363" algn="l" defTabSz="914363" rtl="0" eaLnBrk="1" fontAlgn="auto" latinLnBrk="0" hangingPunct="1">
+            <a:lvl2pPr marL="573088" marR="0" indent="-233363" algn="l" defTabSz="914363" rtl="0" eaLnBrk="1" fontAlgn="auto" latinLnBrk="0" hangingPunct="1">
               <a:lnSpc>
                 <a:spcPct val="90000"/>
               </a:lnSpc>
@@ -26786,9 +27220,9 @@
               <a:buClrTx/>
               <a:buSzPct val="90000"/>
               <a:buFont typeface="Wingdings" pitchFamily="2" charset="2"/>
-              <a:buChar char=""/>
+              <a:buChar char=""/>
               <a:tabLst/>
-              <a:defRPr sz="2000" kern="1200" spc="0" baseline="0">
+              <a:defRPr sz="2400" kern="1200" spc="0" baseline="0">
                 <a:gradFill>
                   <a:gsLst>
                     <a:gs pos="1250">
@@ -26805,7 +27239,7 @@
                 <a:cs typeface="+mn-cs"/>
               </a:defRPr>
             </a:lvl2pPr>
-            <a:lvl3pPr marL="741363" marR="0" indent="-223838" algn="l" defTabSz="914363" rtl="0" eaLnBrk="1" fontAlgn="auto" latinLnBrk="0" hangingPunct="1">
+            <a:lvl3pPr marL="798513" marR="0" indent="-225425" algn="l" defTabSz="914363" rtl="0" eaLnBrk="1" fontAlgn="auto" latinLnBrk="0" hangingPunct="1">
               <a:lnSpc>
                 <a:spcPct val="90000"/>
               </a:lnSpc>
@@ -26818,9 +27252,11 @@
               <a:buClrTx/>
               <a:buSzPct val="90000"/>
               <a:buFont typeface="Wingdings" pitchFamily="2" charset="2"/>
-              <a:buChar char=""/>
-              <a:tabLst/>
-              <a:defRPr sz="2000" kern="1200" spc="0" baseline="0">
+              <a:buChar char=""/>
+              <a:tabLst>
+                <a:tab pos="798513" algn="l"/>
+              </a:tabLst>
+              <a:defRPr sz="2400" kern="1200" spc="0" baseline="0">
                 <a:gradFill>
                   <a:gsLst>
                     <a:gs pos="1250">
@@ -26837,7 +27273,7 @@
                 <a:cs typeface="+mn-cs"/>
               </a:defRPr>
             </a:lvl3pPr>
-            <a:lvl4pPr marL="914400" marR="0" indent="-173038" algn="l" defTabSz="914363" rtl="0" eaLnBrk="1" fontAlgn="auto" latinLnBrk="0" hangingPunct="1">
+            <a:lvl4pPr marL="1030288" marR="0" indent="-231775" algn="l" defTabSz="914363" rtl="0" eaLnBrk="1" fontAlgn="auto" latinLnBrk="0" hangingPunct="1">
               <a:lnSpc>
                 <a:spcPct val="90000"/>
               </a:lnSpc>
@@ -26850,9 +27286,9 @@
               <a:buClrTx/>
               <a:buSzPct val="90000"/>
               <a:buFont typeface="Wingdings" pitchFamily="2" charset="2"/>
-              <a:buChar char=""/>
+              <a:buChar char=""/>
               <a:tabLst/>
-              <a:defRPr sz="1800" kern="1200" spc="0" baseline="0">
+              <a:defRPr sz="2000" kern="1200" spc="0" baseline="0">
                 <a:gradFill>
                   <a:gsLst>
                     <a:gs pos="1250">
@@ -26869,7 +27305,7 @@
                 <a:cs typeface="+mn-cs"/>
               </a:defRPr>
             </a:lvl4pPr>
-            <a:lvl5pPr marL="1087438" marR="0" indent="-173038" algn="l" defTabSz="914363" rtl="0" eaLnBrk="1" fontAlgn="auto" latinLnBrk="0" hangingPunct="1">
+            <a:lvl5pPr marL="1255713" marR="0" indent="-225425" algn="l" defTabSz="914363" rtl="0" eaLnBrk="1" fontAlgn="auto" latinLnBrk="0" hangingPunct="1">
               <a:lnSpc>
                 <a:spcPct val="90000"/>
               </a:lnSpc>
@@ -26882,9 +27318,11 @@
               <a:buClrTx/>
               <a:buSzPct val="90000"/>
               <a:buFont typeface="Wingdings" pitchFamily="2" charset="2"/>
-              <a:buChar char=""/>
-              <a:tabLst/>
-              <a:defRPr sz="1800" kern="1200" spc="0" baseline="0">
+              <a:buChar char=""/>
+              <a:tabLst>
+                <a:tab pos="1255713" algn="l"/>
+              </a:tabLst>
+              <a:defRPr sz="2000" kern="1200" spc="0" baseline="0">
                 <a:gradFill>
                   <a:gsLst>
                     <a:gs pos="1250">
@@ -26963,480 +27401,6 @@
             </a:lvl9pPr>
           </a:lstStyle>
           <a:p>
-            <a:r>
-              <a:rPr lang="en-US" smtClean="0"/>
-              <a:t>Challenges:</a:t>
-            </a:r>
-          </a:p>
-          <a:p>
-            <a:r>
-              <a:rPr lang="en-US" sz="2000" spc="0" smtClean="0">
-                <a:gradFill>
-                  <a:gsLst>
-                    <a:gs pos="1250">
-                      <a:schemeClr val="bg2"/>
-                    </a:gs>
-                    <a:gs pos="100000">
-                      <a:schemeClr val="bg2"/>
-                    </a:gs>
-                  </a:gsLst>
-                  <a:lin ang="5400000" scaled="0"/>
-                </a:gradFill>
-                <a:latin typeface="+mn-lt"/>
-              </a:rPr>
-              <a:t>None</a:t>
-            </a:r>
-            <a:endParaRPr lang="en-US" sz="2000" spc="0" dirty="0">
-              <a:gradFill>
-                <a:gsLst>
-                  <a:gs pos="1250">
-                    <a:schemeClr val="bg2"/>
-                  </a:gs>
-                  <a:gs pos="100000">
-                    <a:schemeClr val="bg2"/>
-                  </a:gs>
-                </a:gsLst>
-                <a:lin ang="5400000" scaled="0"/>
-              </a:gradFill>
-              <a:latin typeface="+mn-lt"/>
-            </a:endParaRPr>
-          </a:p>
-        </p:txBody>
-      </p:sp>
-    </p:spTree>
-    <p:extLst>
-      <p:ext uri="{BB962C8B-B14F-4D97-AF65-F5344CB8AC3E}">
-        <p14:creationId xmlns:p14="http://schemas.microsoft.com/office/powerpoint/2010/main" val="2389646485"/>
-      </p:ext>
-    </p:extLst>
-  </p:cSld>
-  <p:clrMapOvr>
-    <a:masterClrMapping/>
-  </p:clrMapOvr>
-  <p:transition>
-    <p:fade/>
-  </p:transition>
-  <p:timing>
-    <p:tnLst>
-      <p:par>
-        <p:cTn id="1" dur="indefinite" restart="never" nodeType="tmRoot"/>
-      </p:par>
-    </p:tnLst>
-  </p:timing>
-</p:sld>
-</file>
-
-<file path=ppt/slides/slide24.xml><?xml version="1.0" encoding="utf-8"?>
-<p:sld xmlns:a="http://schemas.openxmlformats.org/drawingml/2006/main" xmlns:r="http://schemas.openxmlformats.org/officeDocument/2006/relationships" xmlns:p="http://schemas.openxmlformats.org/presentationml/2006/main">
-  <p:cSld>
-    <p:spTree>
-      <p:nvGrpSpPr>
-        <p:cNvPr id="1" name=""/>
-        <p:cNvGrpSpPr/>
-        <p:nvPr/>
-      </p:nvGrpSpPr>
-      <p:grpSpPr>
-        <a:xfrm>
-          <a:off x="0" y="0"/>
-          <a:ext cx="0" cy="0"/>
-          <a:chOff x="0" y="0"/>
-          <a:chExt cx="0" cy="0"/>
-        </a:xfrm>
-      </p:grpSpPr>
-      <p:sp>
-        <p:nvSpPr>
-          <p:cNvPr id="2" name="Title 1"/>
-          <p:cNvSpPr>
-            <a:spLocks noGrp="1"/>
-          </p:cNvSpPr>
-          <p:nvPr>
-            <p:ph type="title"/>
-          </p:nvPr>
-        </p:nvSpPr>
-        <p:spPr/>
-        <p:txBody>
-          <a:bodyPr/>
-          <a:lstStyle/>
-          <a:p>
-            <a:pPr lvl="0" fontAlgn="b">
-              <a:lnSpc>
-                <a:spcPct val="100000"/>
-              </a:lnSpc>
-              <a:spcBef>
-                <a:spcPts val="0"/>
-              </a:spcBef>
-            </a:pPr>
-            <a:r>
-              <a:rPr lang="nl-BE" dirty="0" smtClean="0"/>
-              <a:t>Records Management</a:t>
-            </a:r>
-            <a:br>
-              <a:rPr lang="nl-BE" dirty="0" smtClean="0"/>
-            </a:br>
-            <a:r>
-              <a:rPr lang="en-US" sz="3600" dirty="0" err="1">
-                <a:solidFill>
-                  <a:schemeClr val="accent1"/>
-                </a:solidFill>
-              </a:rPr>
-              <a:t>contoso.sharepoint.docretention.wsp</a:t>
-            </a:r>
-            <a:r>
-              <a:rPr lang="en-US" sz="2000" spc="0" dirty="0" smtClean="0">
-                <a:ln>
-                  <a:noFill/>
-                </a:ln>
-                <a:solidFill>
-                  <a:srgbClr val="000000"/>
-                </a:solidFill>
-                <a:latin typeface="Segoe UI"/>
-                <a:cs typeface="+mn-cs"/>
-              </a:rPr>
-              <a:t/>
-            </a:r>
-            <a:br>
-              <a:rPr lang="en-US" sz="2000" spc="0" dirty="0" smtClean="0">
-                <a:ln>
-                  <a:noFill/>
-                </a:ln>
-                <a:solidFill>
-                  <a:srgbClr val="000000"/>
-                </a:solidFill>
-                <a:latin typeface="Segoe UI"/>
-                <a:cs typeface="+mn-cs"/>
-              </a:rPr>
-            </a:br>
-            <a:r>
-              <a:rPr lang="en-US" sz="2400" spc="0" dirty="0">
-                <a:ln>
-                  <a:noFill/>
-                </a:ln>
-                <a:solidFill>
-                  <a:srgbClr val="000000"/>
-                </a:solidFill>
-                <a:latin typeface="Calibri" panose="020F0502020204030204" pitchFamily="34" charset="0"/>
-                <a:cs typeface="+mn-cs"/>
-              </a:rPr>
-              <a:t/>
-            </a:r>
-            <a:br>
-              <a:rPr lang="en-US" sz="2400" spc="0" dirty="0">
-                <a:ln>
-                  <a:noFill/>
-                </a:ln>
-                <a:solidFill>
-                  <a:srgbClr val="000000"/>
-                </a:solidFill>
-                <a:latin typeface="Calibri" panose="020F0502020204030204" pitchFamily="34" charset="0"/>
-                <a:cs typeface="+mn-cs"/>
-              </a:rPr>
-            </a:br>
-            <a:endParaRPr lang="nl-BE" dirty="0"/>
-          </a:p>
-        </p:txBody>
-      </p:sp>
-      <p:sp>
-        <p:nvSpPr>
-          <p:cNvPr id="11" name="Text Placeholder 10"/>
-          <p:cNvSpPr>
-            <a:spLocks noGrp="1"/>
-          </p:cNvSpPr>
-          <p:nvPr>
-            <p:ph type="body" sz="quarter" idx="10"/>
-          </p:nvPr>
-        </p:nvSpPr>
-        <p:spPr>
-          <a:xfrm>
-            <a:off x="3228369" y="1701900"/>
-            <a:ext cx="8494619" cy="1585140"/>
-          </a:xfrm>
-        </p:spPr>
-        <p:txBody>
-          <a:bodyPr/>
-          <a:lstStyle/>
-          <a:p>
-            <a:r>
-              <a:rPr lang="en-US" dirty="0"/>
-              <a:t>High level requirements:</a:t>
-            </a:r>
-          </a:p>
-          <a:p>
-            <a:pPr lvl="1"/>
-            <a:r>
-              <a:rPr lang="en-US" sz="1800" dirty="0" smtClean="0"/>
-              <a:t>Typical </a:t>
-            </a:r>
-            <a:r>
-              <a:rPr lang="en-US" sz="1800" dirty="0"/>
-              <a:t>Intranet features:</a:t>
-            </a:r>
-          </a:p>
-          <a:p>
-            <a:pPr lvl="2"/>
-            <a:r>
-              <a:rPr lang="en-US" sz="1800" dirty="0" smtClean="0"/>
-              <a:t>Send notification emails when policies are due for revision.</a:t>
-            </a:r>
-          </a:p>
-          <a:p>
-            <a:pPr lvl="2"/>
-            <a:r>
-              <a:rPr lang="en-US" sz="1800" dirty="0" smtClean="0"/>
-              <a:t>Delete records that are more than 5 years old.</a:t>
-            </a:r>
-          </a:p>
-          <a:p>
-            <a:pPr lvl="2"/>
-            <a:endParaRPr lang="en-US" sz="1800" dirty="0"/>
-          </a:p>
-        </p:txBody>
-      </p:sp>
-      <p:sp>
-        <p:nvSpPr>
-          <p:cNvPr id="4" name="Text Placeholder 6"/>
-          <p:cNvSpPr txBox="1">
-            <a:spLocks/>
-          </p:cNvSpPr>
-          <p:nvPr/>
-        </p:nvSpPr>
-        <p:spPr>
-          <a:xfrm>
-            <a:off x="3173505" y="1243404"/>
-            <a:ext cx="8494619" cy="2043636"/>
-          </a:xfrm>
-          <a:prstGeom prst="rect">
-            <a:avLst/>
-          </a:prstGeom>
-        </p:spPr>
-        <p:txBody>
-          <a:bodyPr/>
-          <a:lstStyle>
-            <a:lvl1pPr marL="339725" marR="0" indent="-339725" algn="l" defTabSz="914363" rtl="0" eaLnBrk="1" fontAlgn="auto" latinLnBrk="0" hangingPunct="1">
-              <a:lnSpc>
-                <a:spcPct val="90000"/>
-              </a:lnSpc>
-              <a:spcBef>
-                <a:spcPct val="20000"/>
-              </a:spcBef>
-              <a:spcAft>
-                <a:spcPts val="0"/>
-              </a:spcAft>
-              <a:buClrTx/>
-              <a:buSzPct val="80000"/>
-              <a:buFont typeface="Arial" pitchFamily="34" charset="0"/>
-              <a:buChar char="•"/>
-              <a:tabLst/>
-              <a:defRPr sz="3600" kern="1200" spc="-70" baseline="0">
-                <a:gradFill>
-                  <a:gsLst>
-                    <a:gs pos="1250">
-                      <a:schemeClr val="bg2"/>
-                    </a:gs>
-                    <a:gs pos="100000">
-                      <a:schemeClr val="bg2"/>
-                    </a:gs>
-                  </a:gsLst>
-                  <a:lin ang="5400000" scaled="0"/>
-                </a:gradFill>
-                <a:latin typeface="+mj-lt"/>
-                <a:ea typeface="+mn-ea"/>
-                <a:cs typeface="+mn-cs"/>
-              </a:defRPr>
-            </a:lvl1pPr>
-            <a:lvl2pPr marL="573088" marR="0" indent="-233363" algn="l" defTabSz="914363" rtl="0" eaLnBrk="1" fontAlgn="auto" latinLnBrk="0" hangingPunct="1">
-              <a:lnSpc>
-                <a:spcPct val="90000"/>
-              </a:lnSpc>
-              <a:spcBef>
-                <a:spcPct val="20000"/>
-              </a:spcBef>
-              <a:spcAft>
-                <a:spcPts val="0"/>
-              </a:spcAft>
-              <a:buClrTx/>
-              <a:buSzPct val="90000"/>
-              <a:buFont typeface="Wingdings" pitchFamily="2" charset="2"/>
-              <a:buChar char=""/>
-              <a:tabLst/>
-              <a:defRPr sz="2400" kern="1200" spc="0" baseline="0">
-                <a:gradFill>
-                  <a:gsLst>
-                    <a:gs pos="1250">
-                      <a:schemeClr val="bg2"/>
-                    </a:gs>
-                    <a:gs pos="100000">
-                      <a:schemeClr val="bg2"/>
-                    </a:gs>
-                  </a:gsLst>
-                  <a:lin ang="5400000" scaled="0"/>
-                </a:gradFill>
-                <a:latin typeface="+mn-lt"/>
-                <a:ea typeface="+mn-ea"/>
-                <a:cs typeface="+mn-cs"/>
-              </a:defRPr>
-            </a:lvl2pPr>
-            <a:lvl3pPr marL="798513" marR="0" indent="-225425" algn="l" defTabSz="914363" rtl="0" eaLnBrk="1" fontAlgn="auto" latinLnBrk="0" hangingPunct="1">
-              <a:lnSpc>
-                <a:spcPct val="90000"/>
-              </a:lnSpc>
-              <a:spcBef>
-                <a:spcPct val="20000"/>
-              </a:spcBef>
-              <a:spcAft>
-                <a:spcPts val="0"/>
-              </a:spcAft>
-              <a:buClrTx/>
-              <a:buSzPct val="90000"/>
-              <a:buFont typeface="Wingdings" pitchFamily="2" charset="2"/>
-              <a:buChar char=""/>
-              <a:tabLst>
-                <a:tab pos="798513" algn="l"/>
-              </a:tabLst>
-              <a:defRPr sz="2400" kern="1200" spc="0" baseline="0">
-                <a:gradFill>
-                  <a:gsLst>
-                    <a:gs pos="1250">
-                      <a:schemeClr val="bg2"/>
-                    </a:gs>
-                    <a:gs pos="100000">
-                      <a:schemeClr val="bg2"/>
-                    </a:gs>
-                  </a:gsLst>
-                  <a:lin ang="5400000" scaled="0"/>
-                </a:gradFill>
-                <a:latin typeface="+mn-lt"/>
-                <a:ea typeface="+mn-ea"/>
-                <a:cs typeface="+mn-cs"/>
-              </a:defRPr>
-            </a:lvl3pPr>
-            <a:lvl4pPr marL="1030288" marR="0" indent="-231775" algn="l" defTabSz="914363" rtl="0" eaLnBrk="1" fontAlgn="auto" latinLnBrk="0" hangingPunct="1">
-              <a:lnSpc>
-                <a:spcPct val="90000"/>
-              </a:lnSpc>
-              <a:spcBef>
-                <a:spcPct val="20000"/>
-              </a:spcBef>
-              <a:spcAft>
-                <a:spcPts val="0"/>
-              </a:spcAft>
-              <a:buClrTx/>
-              <a:buSzPct val="90000"/>
-              <a:buFont typeface="Wingdings" pitchFamily="2" charset="2"/>
-              <a:buChar char=""/>
-              <a:tabLst/>
-              <a:defRPr sz="2000" kern="1200" spc="0" baseline="0">
-                <a:gradFill>
-                  <a:gsLst>
-                    <a:gs pos="1250">
-                      <a:schemeClr val="bg2"/>
-                    </a:gs>
-                    <a:gs pos="100000">
-                      <a:schemeClr val="bg2"/>
-                    </a:gs>
-                  </a:gsLst>
-                  <a:lin ang="5400000" scaled="0"/>
-                </a:gradFill>
-                <a:latin typeface="+mn-lt"/>
-                <a:ea typeface="+mn-ea"/>
-                <a:cs typeface="+mn-cs"/>
-              </a:defRPr>
-            </a:lvl4pPr>
-            <a:lvl5pPr marL="1255713" marR="0" indent="-225425" algn="l" defTabSz="914363" rtl="0" eaLnBrk="1" fontAlgn="auto" latinLnBrk="0" hangingPunct="1">
-              <a:lnSpc>
-                <a:spcPct val="90000"/>
-              </a:lnSpc>
-              <a:spcBef>
-                <a:spcPct val="20000"/>
-              </a:spcBef>
-              <a:spcAft>
-                <a:spcPts val="0"/>
-              </a:spcAft>
-              <a:buClrTx/>
-              <a:buSzPct val="90000"/>
-              <a:buFont typeface="Wingdings" pitchFamily="2" charset="2"/>
-              <a:buChar char=""/>
-              <a:tabLst>
-                <a:tab pos="1255713" algn="l"/>
-              </a:tabLst>
-              <a:defRPr sz="2000" kern="1200" spc="0" baseline="0">
-                <a:gradFill>
-                  <a:gsLst>
-                    <a:gs pos="1250">
-                      <a:schemeClr val="bg2"/>
-                    </a:gs>
-                    <a:gs pos="100000">
-                      <a:schemeClr val="bg2"/>
-                    </a:gs>
-                  </a:gsLst>
-                  <a:lin ang="5400000" scaled="0"/>
-                </a:gradFill>
-                <a:latin typeface="+mn-lt"/>
-                <a:ea typeface="+mn-ea"/>
-                <a:cs typeface="+mn-cs"/>
-              </a:defRPr>
-            </a:lvl5pPr>
-            <a:lvl6pPr marL="2514499" indent="-228591" algn="l" defTabSz="914363" rtl="0" eaLnBrk="1" latinLnBrk="0" hangingPunct="1">
-              <a:spcBef>
-                <a:spcPct val="20000"/>
-              </a:spcBef>
-              <a:buFont typeface="Arial" pitchFamily="34" charset="0"/>
-              <a:buChar char="•"/>
-              <a:defRPr sz="2000" kern="1200">
-                <a:solidFill>
-                  <a:schemeClr val="tx1"/>
-                </a:solidFill>
-                <a:latin typeface="+mn-lt"/>
-                <a:ea typeface="+mn-ea"/>
-                <a:cs typeface="+mn-cs"/>
-              </a:defRPr>
-            </a:lvl6pPr>
-            <a:lvl7pPr marL="2971681" indent="-228591" algn="l" defTabSz="914363" rtl="0" eaLnBrk="1" latinLnBrk="0" hangingPunct="1">
-              <a:spcBef>
-                <a:spcPct val="20000"/>
-              </a:spcBef>
-              <a:buFont typeface="Arial" pitchFamily="34" charset="0"/>
-              <a:buChar char="•"/>
-              <a:defRPr sz="2000" kern="1200">
-                <a:solidFill>
-                  <a:schemeClr val="tx1"/>
-                </a:solidFill>
-                <a:latin typeface="+mn-lt"/>
-                <a:ea typeface="+mn-ea"/>
-                <a:cs typeface="+mn-cs"/>
-              </a:defRPr>
-            </a:lvl7pPr>
-            <a:lvl8pPr marL="3428863" indent="-228591" algn="l" defTabSz="914363" rtl="0" eaLnBrk="1" latinLnBrk="0" hangingPunct="1">
-              <a:spcBef>
-                <a:spcPct val="20000"/>
-              </a:spcBef>
-              <a:buFont typeface="Arial" pitchFamily="34" charset="0"/>
-              <a:buChar char="•"/>
-              <a:defRPr sz="2000" kern="1200">
-                <a:solidFill>
-                  <a:schemeClr val="tx1"/>
-                </a:solidFill>
-                <a:latin typeface="+mn-lt"/>
-                <a:ea typeface="+mn-ea"/>
-                <a:cs typeface="+mn-cs"/>
-              </a:defRPr>
-            </a:lvl8pPr>
-            <a:lvl9pPr marL="3886045" indent="-228591" algn="l" defTabSz="914363" rtl="0" eaLnBrk="1" latinLnBrk="0" hangingPunct="1">
-              <a:spcBef>
-                <a:spcPct val="20000"/>
-              </a:spcBef>
-              <a:buFont typeface="Arial" pitchFamily="34" charset="0"/>
-              <a:buChar char="•"/>
-              <a:defRPr sz="2000" kern="1200">
-                <a:solidFill>
-                  <a:schemeClr val="tx1"/>
-                </a:solidFill>
-                <a:latin typeface="+mn-lt"/>
-                <a:ea typeface="+mn-ea"/>
-                <a:cs typeface="+mn-cs"/>
-              </a:defRPr>
-            </a:lvl9pPr>
-          </a:lstStyle>
-          <a:p>
             <a:endParaRPr lang="en-US" dirty="0" smtClean="0"/>
           </a:p>
         </p:txBody>
@@ -27450,7 +27414,7 @@
           <p:nvPr>
             <p:extLst>
               <p:ext uri="{D42A27DB-BD31-4B8C-83A1-F6EECF244321}">
-                <p14:modId xmlns:p14="http://schemas.microsoft.com/office/powerpoint/2010/main" val="1652844271"/>
+                <p14:modId xmlns:p14="http://schemas.microsoft.com/office/powerpoint/2010/main" val="3045352822"/>
               </p:ext>
             </p:extLst>
           </p:nvPr>
@@ -27469,7 +27433,7 @@
                 <a:gridCol w="2373524">
                   <a:extLst>
                     <a:ext uri="{9D8B030D-6E8A-4147-A177-3AD203B41FA5}">
-                      <a16:colId xmlns:a16="http://schemas.microsoft.com/office/drawing/2014/main" xmlns="" val="20000"/>
+                      <a16:colId xmlns="" xmlns:a16="http://schemas.microsoft.com/office/drawing/2014/main" val="20000"/>
                     </a:ext>
                   </a:extLst>
                 </a:gridCol>
@@ -27483,7 +27447,7 @@
                       <a:pPr algn="ctr"/>
                       <a:r>
                         <a:rPr lang="en-US" b="1" i="0" dirty="0" smtClean="0"/>
-                        <a:t>Branding</a:t>
+                        <a:t>Provisioning</a:t>
                       </a:r>
                       <a:endParaRPr lang="nl-BE" b="1" i="0" dirty="0"/>
                     </a:p>
@@ -27532,7 +27496,7 @@
                 </a:tc>
                 <a:extLst>
                   <a:ext uri="{0D108BD9-81ED-4DB2-BD59-A6C34878D82A}">
-                    <a16:rowId xmlns:a16="http://schemas.microsoft.com/office/drawing/2014/main" xmlns="" val="10000"/>
+                    <a16:rowId xmlns="" xmlns:a16="http://schemas.microsoft.com/office/drawing/2014/main" val="10000"/>
                   </a:ext>
                 </a:extLst>
               </a:tr>
@@ -27593,7 +27557,7 @@
                 </a:tc>
                 <a:extLst>
                   <a:ext uri="{0D108BD9-81ED-4DB2-BD59-A6C34878D82A}">
-                    <a16:rowId xmlns:a16="http://schemas.microsoft.com/office/drawing/2014/main" xmlns="" val="10001"/>
+                    <a16:rowId xmlns="" xmlns:a16="http://schemas.microsoft.com/office/drawing/2014/main" val="10001"/>
                   </a:ext>
                 </a:extLst>
               </a:tr>
@@ -27663,7 +27627,7 @@
                 </a:tc>
                 <a:extLst>
                   <a:ext uri="{0D108BD9-81ED-4DB2-BD59-A6C34878D82A}">
-                    <a16:rowId xmlns:a16="http://schemas.microsoft.com/office/drawing/2014/main" xmlns="" val="10002"/>
+                    <a16:rowId xmlns="" xmlns:a16="http://schemas.microsoft.com/office/drawing/2014/main" val="10002"/>
                   </a:ext>
                 </a:extLst>
               </a:tr>
@@ -27741,7 +27705,7 @@
                 </a:tc>
                 <a:extLst>
                   <a:ext uri="{0D108BD9-81ED-4DB2-BD59-A6C34878D82A}">
-                    <a16:rowId xmlns:a16="http://schemas.microsoft.com/office/drawing/2014/main" xmlns="" val="10007"/>
+                    <a16:rowId xmlns="" xmlns:a16="http://schemas.microsoft.com/office/drawing/2014/main" val="10007"/>
                   </a:ext>
                 </a:extLst>
               </a:tr>
@@ -27758,7 +27722,7 @@
           <p:nvPr/>
         </p:nvPicPr>
         <p:blipFill>
-          <a:blip r:embed="rId2">
+          <a:blip r:embed="rId3">
             <a:extLst>
               <a:ext uri="{28A0092B-C50C-407E-A947-70E740481C1C}">
                 <a14:useLocalDpi xmlns:a14="http://schemas.microsoft.com/office/drawing/2010/main" val="0"/>
@@ -27800,8 +27764,8 @@
         </p:nvSpPr>
         <p:spPr>
           <a:xfrm>
-            <a:off x="3283233" y="3287040"/>
-            <a:ext cx="8494619" cy="3341925"/>
+            <a:off x="3173505" y="4049270"/>
+            <a:ext cx="8494619" cy="1098879"/>
           </a:xfrm>
           <a:prstGeom prst="rect">
             <a:avLst/>
@@ -28028,108 +27992,48 @@
           <a:p>
             <a:r>
               <a:rPr lang="en-US" dirty="0" smtClean="0"/>
-              <a:t>Migration</a:t>
-            </a:r>
-          </a:p>
-          <a:p>
-            <a:pPr lvl="1"/>
-            <a:r>
-              <a:rPr lang="en-US" dirty="0" smtClean="0"/>
-              <a:t>Business </a:t>
-            </a:r>
-            <a:r>
-              <a:rPr lang="en-US" dirty="0"/>
-              <a:t>logic could be factored to one or more </a:t>
-            </a:r>
-            <a:r>
-              <a:rPr lang="en-US" b="1" dirty="0" err="1"/>
-              <a:t>oData</a:t>
-            </a:r>
-            <a:r>
-              <a:rPr lang="en-US" b="1" dirty="0"/>
-              <a:t> Web </a:t>
-            </a:r>
-            <a:r>
-              <a:rPr lang="en-US" b="1" dirty="0" smtClean="0"/>
-              <a:t>Services</a:t>
-            </a:r>
-          </a:p>
-          <a:p>
-            <a:pPr lvl="1"/>
-            <a:r>
-              <a:rPr lang="en-US" dirty="0" smtClean="0"/>
-              <a:t>Use SharePoint’s record center functionality.</a:t>
-            </a:r>
-          </a:p>
-          <a:p>
-            <a:pPr lvl="1"/>
-            <a:endParaRPr lang="en-US" dirty="0" smtClean="0"/>
-          </a:p>
-          <a:p>
-            <a:r>
-              <a:rPr lang="en-US" dirty="0" smtClean="0"/>
-              <a:t>Challenges</a:t>
-            </a:r>
-            <a:endParaRPr lang="en-US" dirty="0"/>
-          </a:p>
-          <a:p>
-            <a:pPr lvl="1"/>
-            <a:r>
-              <a:rPr lang="en-US" dirty="0"/>
-              <a:t>Although SharePoint 2013 </a:t>
-            </a:r>
-            <a:r>
-              <a:rPr lang="en-US" dirty="0" smtClean="0"/>
-              <a:t>is backwards </a:t>
-            </a:r>
-            <a:r>
-              <a:rPr lang="en-US" dirty="0"/>
-              <a:t>compatible with 2010 workflows, the </a:t>
-            </a:r>
-            <a:r>
-              <a:rPr lang="en-US" dirty="0" smtClean="0"/>
-              <a:t>call to </a:t>
-            </a:r>
-            <a:r>
-              <a:rPr lang="en-US" dirty="0"/>
-              <a:t>HTTP Web Service action is only available </a:t>
-            </a:r>
-            <a:r>
-              <a:rPr lang="en-US" dirty="0" smtClean="0"/>
-              <a:t>for workflows </a:t>
-            </a:r>
-            <a:r>
-              <a:rPr lang="en-US" dirty="0"/>
-              <a:t>built </a:t>
-            </a:r>
-            <a:r>
-              <a:rPr lang="en-US" dirty="0" smtClean="0"/>
-              <a:t>using SharePoint </a:t>
-            </a:r>
-            <a:r>
-              <a:rPr lang="en-US" dirty="0"/>
-              <a:t>2013 declarative workflows</a:t>
-            </a:r>
-            <a:r>
-              <a:rPr lang="en-US" dirty="0" smtClean="0"/>
-              <a:t> </a:t>
-            </a:r>
-            <a:endParaRPr lang="en-US" dirty="0"/>
-          </a:p>
-          <a:p>
-            <a:pPr lvl="1"/>
-            <a:endParaRPr lang="en-US" dirty="0" smtClean="0"/>
-          </a:p>
-          <a:p>
-            <a:pPr lvl="1"/>
-            <a:endParaRPr lang="en-US" dirty="0"/>
+              <a:t>Challenges:</a:t>
+            </a:r>
+          </a:p>
+          <a:p>
+            <a:r>
+              <a:rPr lang="en-US" sz="2000" spc="0" dirty="0" smtClean="0">
+                <a:gradFill>
+                  <a:gsLst>
+                    <a:gs pos="1250">
+                      <a:schemeClr val="bg2"/>
+                    </a:gs>
+                    <a:gs pos="100000">
+                      <a:schemeClr val="bg2"/>
+                    </a:gs>
+                  </a:gsLst>
+                  <a:lin ang="5400000" scaled="0"/>
+                </a:gradFill>
+                <a:latin typeface="+mn-lt"/>
+              </a:rPr>
+              <a:t>Some site provisioning requirements might require an externally hosted web job on azure leveraging CSOM.</a:t>
+            </a:r>
+            <a:endParaRPr lang="en-US" sz="2000" spc="0" dirty="0">
+              <a:gradFill>
+                <a:gsLst>
+                  <a:gs pos="1250">
+                    <a:schemeClr val="bg2"/>
+                  </a:gs>
+                  <a:gs pos="100000">
+                    <a:schemeClr val="bg2"/>
+                  </a:gs>
+                </a:gsLst>
+                <a:lin ang="5400000" scaled="0"/>
+              </a:gradFill>
+              <a:latin typeface="+mn-lt"/>
+            </a:endParaRPr>
           </a:p>
         </p:txBody>
       </p:sp>
     </p:spTree>
     <p:extLst>
       <p:ext uri="{BB962C8B-B14F-4D97-AF65-F5344CB8AC3E}">
-        <p14:creationId xmlns:p14="http://schemas.microsoft.com/office/powerpoint/2010/main" val="1840351170"/>
+        <p14:creationId xmlns:p14="http://schemas.microsoft.com/office/powerpoint/2010/main" val="2389646485"/>
       </p:ext>
     </p:extLst>
   </p:cSld>
@@ -28176,66 +28080,85 @@
             <p:ph type="title"/>
           </p:nvPr>
         </p:nvSpPr>
-        <p:spPr>
-          <a:xfrm>
-            <a:off x="3173505" y="992992"/>
-            <a:ext cx="8494619" cy="747897"/>
-          </a:xfrm>
-        </p:spPr>
+        <p:spPr/>
         <p:txBody>
-          <a:bodyPr anchor="ctr"/>
+          <a:bodyPr/>
           <a:lstStyle/>
           <a:p>
+            <a:pPr lvl="0" fontAlgn="b">
+              <a:lnSpc>
+                <a:spcPct val="100000"/>
+              </a:lnSpc>
+              <a:spcBef>
+                <a:spcPts val="0"/>
+              </a:spcBef>
+            </a:pPr>
             <a:r>
               <a:rPr lang="nl-BE" dirty="0" smtClean="0"/>
-              <a:t>Safety News Rollups</a:t>
+              <a:t>Records Management</a:t>
             </a:r>
             <a:br>
               <a:rPr lang="nl-BE" dirty="0" smtClean="0"/>
             </a:br>
             <a:r>
-              <a:rPr lang="en-US" sz="3600" dirty="0" err="1" smtClean="0">
+              <a:rPr lang="en-US" sz="3600" dirty="0" err="1">
                 <a:solidFill>
                   <a:schemeClr val="accent1"/>
                 </a:solidFill>
               </a:rPr>
-              <a:t>contoso.sharepoint.safetynews.wsp</a:t>
-            </a:r>
-            <a:r>
-              <a:rPr lang="en-US" sz="3600" dirty="0">
+              <a:t>contoso.sharepoint.docretention.wsp</a:t>
+            </a:r>
+            <a:r>
+              <a:rPr lang="en-US" sz="2000" spc="0" dirty="0" smtClean="0">
+                <a:ln>
+                  <a:noFill/>
+                </a:ln>
                 <a:solidFill>
-                  <a:schemeClr val="accent1"/>
+                  <a:srgbClr val="000000"/>
                 </a:solidFill>
+                <a:latin typeface="Segoe UI"/>
+                <a:cs typeface="+mn-cs"/>
               </a:rPr>
               <a:t/>
             </a:r>
             <a:br>
-              <a:rPr lang="en-US" sz="3600" dirty="0">
+              <a:rPr lang="en-US" sz="2000" spc="0" dirty="0" smtClean="0">
+                <a:ln>
+                  <a:noFill/>
+                </a:ln>
                 <a:solidFill>
-                  <a:schemeClr val="accent1"/>
+                  <a:srgbClr val="000000"/>
                 </a:solidFill>
+                <a:latin typeface="Segoe UI"/>
+                <a:cs typeface="+mn-cs"/>
               </a:rPr>
             </a:br>
             <a:r>
-              <a:rPr lang="en-US" sz="3600" dirty="0">
+              <a:rPr lang="en-US" sz="2400" spc="0" dirty="0">
+                <a:ln>
+                  <a:noFill/>
+                </a:ln>
                 <a:solidFill>
-                  <a:schemeClr val="accent1"/>
+                  <a:srgbClr val="000000"/>
                 </a:solidFill>
+                <a:latin typeface="Calibri" panose="020F0502020204030204" pitchFamily="34" charset="0"/>
+                <a:cs typeface="+mn-cs"/>
               </a:rPr>
               <a:t/>
             </a:r>
             <a:br>
-              <a:rPr lang="en-US" sz="3600" dirty="0">
+              <a:rPr lang="en-US" sz="2400" spc="0" dirty="0">
+                <a:ln>
+                  <a:noFill/>
+                </a:ln>
                 <a:solidFill>
-                  <a:schemeClr val="accent1"/>
+                  <a:srgbClr val="000000"/>
                 </a:solidFill>
+                <a:latin typeface="Calibri" panose="020F0502020204030204" pitchFamily="34" charset="0"/>
+                <a:cs typeface="+mn-cs"/>
               </a:rPr>
             </a:br>
-            <a:endParaRPr lang="nl-BE" sz="3600" dirty="0">
-              <a:solidFill>
-                <a:schemeClr val="accent1"/>
-              </a:solidFill>
-            </a:endParaRPr>
+            <a:endParaRPr lang="nl-BE" dirty="0"/>
           </a:p>
         </p:txBody>
       </p:sp>
@@ -28251,8 +28174,8 @@
         </p:nvSpPr>
         <p:spPr>
           <a:xfrm>
-            <a:off x="3173505" y="2238374"/>
-            <a:ext cx="8494619" cy="4619626"/>
+            <a:off x="3173504" y="1701900"/>
+            <a:ext cx="8494619" cy="1585140"/>
           </a:xfrm>
         </p:spPr>
         <p:txBody>
@@ -28260,42 +28183,63 @@
           <a:lstStyle/>
           <a:p>
             <a:r>
-              <a:rPr lang="en-US" dirty="0"/>
-              <a:t>High level requirements:</a:t>
-            </a:r>
+              <a:rPr lang="en-US" dirty="0" smtClean="0"/>
+              <a:t>Current Implementation:</a:t>
+            </a:r>
+            <a:endParaRPr lang="en-US" dirty="0"/>
           </a:p>
           <a:p>
             <a:pPr lvl="1"/>
             <a:r>
               <a:rPr lang="en-US" sz="1800" dirty="0" smtClean="0"/>
-              <a:t>Typical </a:t>
-            </a:r>
-            <a:r>
-              <a:rPr lang="en-US" sz="1800" dirty="0"/>
-              <a:t>Intranet features:</a:t>
-            </a:r>
+              <a:t>The farm solution does the following:</a:t>
+            </a:r>
+            <a:endParaRPr lang="en-US" sz="1800" dirty="0"/>
           </a:p>
           <a:p>
             <a:pPr lvl="2"/>
             <a:r>
               <a:rPr lang="en-US" sz="1800" dirty="0" smtClean="0"/>
-              <a:t>Rolls up </a:t>
-            </a:r>
-            <a:r>
-              <a:rPr lang="en-US" sz="1800" dirty="0"/>
-              <a:t>s</a:t>
+              <a:t>Sends </a:t>
             </a:r>
             <a:r>
               <a:rPr lang="en-US" sz="1800" dirty="0" smtClean="0"/>
-              <a:t>afety news items from various sites and sub-sites</a:t>
+              <a:t>notification emails when policies are due for revision.</a:t>
             </a:r>
           </a:p>
           <a:p>
             <a:pPr lvl="2"/>
             <a:r>
               <a:rPr lang="en-US" sz="1800" dirty="0" smtClean="0"/>
-              <a:t>Providing a mobile friendly view of the news item when accessed from mobile devices.</a:t>
-            </a:r>
+              <a:t>Deletes </a:t>
+            </a:r>
+            <a:r>
+              <a:rPr lang="en-US" sz="1800" dirty="0" smtClean="0"/>
+              <a:t>records that are more than </a:t>
+            </a:r>
+            <a:r>
+              <a:rPr lang="en-US" sz="1800" dirty="0" smtClean="0"/>
+              <a:t>7 </a:t>
+            </a:r>
+            <a:r>
+              <a:rPr lang="en-US" sz="1800" dirty="0" smtClean="0"/>
+              <a:t>years old</a:t>
+            </a:r>
+            <a:r>
+              <a:rPr lang="en-US" sz="1800" dirty="0" smtClean="0"/>
+              <a:t>.</a:t>
+            </a:r>
+          </a:p>
+          <a:p>
+            <a:pPr lvl="2"/>
+            <a:r>
+              <a:rPr lang="en-US" sz="1800" dirty="0" smtClean="0"/>
+              <a:t>Action taken on expiring documents is logged for audit purposes.</a:t>
+            </a:r>
+            <a:endParaRPr lang="en-US" sz="1800" dirty="0" smtClean="0"/>
+          </a:p>
+          <a:p>
+            <a:pPr lvl="2"/>
             <a:endParaRPr lang="en-US" sz="1800" dirty="0"/>
           </a:p>
         </p:txBody>
@@ -28546,19 +28490,7 @@
             </a:lvl9pPr>
           </a:lstStyle>
           <a:p>
-            <a:endParaRPr lang="en-US" dirty="0" smtClean="0">
-              <a:gradFill>
-                <a:gsLst>
-                  <a:gs pos="1250">
-                    <a:srgbClr val="797A7D"/>
-                  </a:gs>
-                  <a:gs pos="100000">
-                    <a:srgbClr val="797A7D"/>
-                  </a:gs>
-                </a:gsLst>
-                <a:lin ang="5400000" scaled="0"/>
-              </a:gradFill>
-            </a:endParaRPr>
+            <a:endParaRPr lang="en-US" dirty="0" smtClean="0"/>
           </a:p>
         </p:txBody>
       </p:sp>
@@ -28571,7 +28503,7 @@
           <p:nvPr>
             <p:extLst>
               <p:ext uri="{D42A27DB-BD31-4B8C-83A1-F6EECF244321}">
-                <p14:modId xmlns:p14="http://schemas.microsoft.com/office/powerpoint/2010/main" val="2396600157"/>
+                <p14:modId xmlns:p14="http://schemas.microsoft.com/office/powerpoint/2010/main" val="2314770695"/>
               </p:ext>
             </p:extLst>
           </p:nvPr>
@@ -28590,7 +28522,7 @@
                 <a:gridCol w="2373524">
                   <a:extLst>
                     <a:ext uri="{9D8B030D-6E8A-4147-A177-3AD203B41FA5}">
-                      <a16:colId xmlns:a16="http://schemas.microsoft.com/office/drawing/2014/main" xmlns="" val="20000"/>
+                      <a16:colId xmlns="" xmlns:a16="http://schemas.microsoft.com/office/drawing/2014/main" val="20000"/>
                     </a:ext>
                   </a:extLst>
                 </a:gridCol>
@@ -28604,7 +28536,7 @@
                       <a:pPr algn="ctr"/>
                       <a:r>
                         <a:rPr lang="en-US" b="1" i="0" dirty="0" smtClean="0"/>
-                        <a:t>Branding</a:t>
+                        <a:t>Rec Management</a:t>
                       </a:r>
                       <a:endParaRPr lang="nl-BE" b="1" i="0" dirty="0"/>
                     </a:p>
@@ -28653,7 +28585,7 @@
                 </a:tc>
                 <a:extLst>
                   <a:ext uri="{0D108BD9-81ED-4DB2-BD59-A6C34878D82A}">
-                    <a16:rowId xmlns:a16="http://schemas.microsoft.com/office/drawing/2014/main" xmlns="" val="10000"/>
+                    <a16:rowId xmlns="" xmlns:a16="http://schemas.microsoft.com/office/drawing/2014/main" val="10000"/>
                   </a:ext>
                 </a:extLst>
               </a:tr>
@@ -28714,7 +28646,7 @@
                 </a:tc>
                 <a:extLst>
                   <a:ext uri="{0D108BD9-81ED-4DB2-BD59-A6C34878D82A}">
-                    <a16:rowId xmlns:a16="http://schemas.microsoft.com/office/drawing/2014/main" xmlns="" val="10001"/>
+                    <a16:rowId xmlns="" xmlns:a16="http://schemas.microsoft.com/office/drawing/2014/main" val="10001"/>
                   </a:ext>
                 </a:extLst>
               </a:tr>
@@ -28778,13 +28710,13 @@
                       <a:tailEnd type="none" w="med" len="med"/>
                     </a:lnB>
                     <a:solidFill>
-                      <a:srgbClr val="00B050"/>
+                      <a:schemeClr val="accent2"/>
                     </a:solidFill>
                   </a:tcPr>
                 </a:tc>
                 <a:extLst>
                   <a:ext uri="{0D108BD9-81ED-4DB2-BD59-A6C34878D82A}">
-                    <a16:rowId xmlns:a16="http://schemas.microsoft.com/office/drawing/2014/main" xmlns="" val="10002"/>
+                    <a16:rowId xmlns="" xmlns:a16="http://schemas.microsoft.com/office/drawing/2014/main" val="10002"/>
                   </a:ext>
                 </a:extLst>
               </a:tr>
@@ -28862,7 +28794,7 @@
                 </a:tc>
                 <a:extLst>
                   <a:ext uri="{0D108BD9-81ED-4DB2-BD59-A6C34878D82A}">
-                    <a16:rowId xmlns:a16="http://schemas.microsoft.com/office/drawing/2014/main" xmlns="" val="10007"/>
+                    <a16:rowId xmlns="" xmlns:a16="http://schemas.microsoft.com/office/drawing/2014/main" val="10007"/>
                   </a:ext>
                 </a:extLst>
               </a:tr>
@@ -28879,7 +28811,7 @@
           <p:nvPr/>
         </p:nvPicPr>
         <p:blipFill>
-          <a:blip r:embed="rId3">
+          <a:blip r:embed="rId2">
             <a:extLst>
               <a:ext uri="{28A0092B-C50C-407E-A947-70E740481C1C}">
                 <a14:useLocalDpi xmlns:a14="http://schemas.microsoft.com/office/drawing/2010/main" val="0"/>
@@ -28913,340 +28845,7 @@
       </p:pic>
       <p:sp>
         <p:nvSpPr>
-          <p:cNvPr id="8" name="Rectangle 7"/>
-          <p:cNvSpPr/>
-          <p:nvPr/>
-        </p:nvSpPr>
-        <p:spPr>
-          <a:xfrm>
-            <a:off x="3173504" y="4083892"/>
-            <a:ext cx="8494619" cy="1545038"/>
-          </a:xfrm>
-          <a:prstGeom prst="rect">
-            <a:avLst/>
-          </a:prstGeom>
-        </p:spPr>
-        <p:txBody>
-          <a:bodyPr wrap="square">
-            <a:spAutoFit/>
-          </a:bodyPr>
-          <a:lstStyle/>
-          <a:p>
-            <a:pPr marL="284163" lvl="0" indent="-284163">
-              <a:lnSpc>
-                <a:spcPct val="90000"/>
-              </a:lnSpc>
-              <a:spcBef>
-                <a:spcPct val="20000"/>
-              </a:spcBef>
-              <a:buSzPct val="80000"/>
-              <a:buFont typeface="Wingdings" pitchFamily="2" charset="2"/>
-              <a:buChar char=""/>
-            </a:pPr>
-            <a:r>
-              <a:rPr lang="en-US" sz="3600" spc="-70" dirty="0" smtClean="0">
-                <a:solidFill>
-                  <a:srgbClr val="EB3C00"/>
-                </a:solidFill>
-                <a:latin typeface="Segoe UI Light"/>
-              </a:rPr>
-              <a:t>Migration</a:t>
-            </a:r>
-          </a:p>
-          <a:p>
-            <a:pPr marL="517525" lvl="1" indent="-233363">
-              <a:lnSpc>
-                <a:spcPct val="90000"/>
-              </a:lnSpc>
-              <a:spcBef>
-                <a:spcPct val="20000"/>
-              </a:spcBef>
-              <a:buSzPct val="90000"/>
-              <a:buFont typeface="Wingdings" pitchFamily="2" charset="2"/>
-              <a:buChar char=""/>
-            </a:pPr>
-            <a:r>
-              <a:rPr lang="en-US" sz="2000" dirty="0" smtClean="0">
-                <a:gradFill>
-                  <a:gsLst>
-                    <a:gs pos="1250">
-                      <a:srgbClr val="797A7D"/>
-                    </a:gs>
-                    <a:gs pos="100000">
-                      <a:srgbClr val="797A7D"/>
-                    </a:gs>
-                  </a:gsLst>
-                  <a:lin ang="5400000" scaled="0"/>
-                </a:gradFill>
-              </a:rPr>
-              <a:t>The safety news can be published as announcements within Yammer.</a:t>
-            </a:r>
-          </a:p>
-          <a:p>
-            <a:pPr marL="517525" lvl="1" indent="-233363">
-              <a:lnSpc>
-                <a:spcPct val="90000"/>
-              </a:lnSpc>
-              <a:spcBef>
-                <a:spcPct val="20000"/>
-              </a:spcBef>
-              <a:buSzPct val="90000"/>
-              <a:buFont typeface="Wingdings" pitchFamily="2" charset="2"/>
-              <a:buChar char=""/>
-            </a:pPr>
-            <a:r>
-              <a:rPr lang="en-US" sz="2000" dirty="0" smtClean="0">
-                <a:gradFill>
-                  <a:gsLst>
-                    <a:gs pos="1250">
-                      <a:srgbClr val="797A7D"/>
-                    </a:gs>
-                    <a:gs pos="100000">
-                      <a:srgbClr val="797A7D"/>
-                    </a:gs>
-                  </a:gsLst>
-                  <a:lin ang="5400000" scaled="0"/>
-                </a:gradFill>
-              </a:rPr>
-              <a:t>The Yammer embedded code can replace the custom safety news web part.</a:t>
-            </a:r>
-          </a:p>
-        </p:txBody>
-      </p:sp>
-      <p:sp>
-        <p:nvSpPr>
-          <p:cNvPr id="5" name="Rectangle 4"/>
-          <p:cNvSpPr/>
-          <p:nvPr/>
-        </p:nvSpPr>
-        <p:spPr>
-          <a:xfrm>
-            <a:off x="3173505" y="5792802"/>
-            <a:ext cx="6092825" cy="929485"/>
-          </a:xfrm>
-          <a:prstGeom prst="rect">
-            <a:avLst/>
-          </a:prstGeom>
-        </p:spPr>
-        <p:txBody>
-          <a:bodyPr>
-            <a:spAutoFit/>
-          </a:bodyPr>
-          <a:lstStyle/>
-          <a:p>
-            <a:pPr marL="284163" lvl="0" indent="-284163">
-              <a:lnSpc>
-                <a:spcPct val="90000"/>
-              </a:lnSpc>
-              <a:spcBef>
-                <a:spcPct val="20000"/>
-              </a:spcBef>
-              <a:buSzPct val="80000"/>
-              <a:buFont typeface="Wingdings" pitchFamily="2" charset="2"/>
-              <a:buChar char=""/>
-            </a:pPr>
-            <a:r>
-              <a:rPr lang="en-US" sz="3600" spc="-70" dirty="0">
-                <a:solidFill>
-                  <a:srgbClr val="EB3C00"/>
-                </a:solidFill>
-                <a:latin typeface="Segoe UI Light"/>
-              </a:rPr>
-              <a:t>Challenges</a:t>
-            </a:r>
-          </a:p>
-          <a:p>
-            <a:pPr marL="517525" lvl="1" indent="-233363">
-              <a:lnSpc>
-                <a:spcPct val="90000"/>
-              </a:lnSpc>
-              <a:spcBef>
-                <a:spcPct val="20000"/>
-              </a:spcBef>
-              <a:buSzPct val="90000"/>
-              <a:buFont typeface="Wingdings" pitchFamily="2" charset="2"/>
-              <a:buChar char=""/>
-            </a:pPr>
-            <a:r>
-              <a:rPr lang="en-US" sz="2000" dirty="0">
-                <a:gradFill>
-                  <a:gsLst>
-                    <a:gs pos="1250">
-                      <a:srgbClr val="797A7D"/>
-                    </a:gs>
-                    <a:gs pos="100000">
-                      <a:srgbClr val="797A7D"/>
-                    </a:gs>
-                  </a:gsLst>
-                  <a:lin ang="5400000" scaled="0"/>
-                </a:gradFill>
-              </a:rPr>
-              <a:t>None</a:t>
-            </a:r>
-          </a:p>
-        </p:txBody>
-      </p:sp>
-    </p:spTree>
-    <p:extLst>
-      <p:ext uri="{BB962C8B-B14F-4D97-AF65-F5344CB8AC3E}">
-        <p14:creationId xmlns:p14="http://schemas.microsoft.com/office/powerpoint/2010/main" val="994721949"/>
-      </p:ext>
-    </p:extLst>
-  </p:cSld>
-  <p:clrMapOvr>
-    <a:masterClrMapping/>
-  </p:clrMapOvr>
-  <p:transition>
-    <p:fade/>
-  </p:transition>
-  <p:timing>
-    <p:tnLst>
-      <p:par>
-        <p:cTn id="1" dur="indefinite" restart="never" nodeType="tmRoot"/>
-      </p:par>
-    </p:tnLst>
-  </p:timing>
-</p:sld>
-</file>
-
-<file path=ppt/slides/slide26.xml><?xml version="1.0" encoding="utf-8"?>
-<p:sld xmlns:a="http://schemas.openxmlformats.org/drawingml/2006/main" xmlns:r="http://schemas.openxmlformats.org/officeDocument/2006/relationships" xmlns:p="http://schemas.openxmlformats.org/presentationml/2006/main">
-  <p:cSld>
-    <p:spTree>
-      <p:nvGrpSpPr>
-        <p:cNvPr id="1" name=""/>
-        <p:cNvGrpSpPr/>
-        <p:nvPr/>
-      </p:nvGrpSpPr>
-      <p:grpSpPr>
-        <a:xfrm>
-          <a:off x="0" y="0"/>
-          <a:ext cx="0" cy="0"/>
-          <a:chOff x="0" y="0"/>
-          <a:chExt cx="0" cy="0"/>
-        </a:xfrm>
-      </p:grpSpPr>
-      <p:sp>
-        <p:nvSpPr>
-          <p:cNvPr id="2" name="Title 1"/>
-          <p:cNvSpPr>
-            <a:spLocks noGrp="1"/>
-          </p:cNvSpPr>
-          <p:nvPr>
-            <p:ph type="title"/>
-          </p:nvPr>
-        </p:nvSpPr>
-        <p:spPr>
-          <a:xfrm>
-            <a:off x="3173505" y="992992"/>
-            <a:ext cx="8494619" cy="747897"/>
-          </a:xfrm>
-        </p:spPr>
-        <p:txBody>
-          <a:bodyPr anchor="ctr"/>
-          <a:lstStyle/>
-          <a:p>
-            <a:r>
-              <a:rPr lang="nl-BE" dirty="0" smtClean="0"/>
-              <a:t>News notifications</a:t>
-            </a:r>
-            <a:br>
-              <a:rPr lang="nl-BE" dirty="0" smtClean="0"/>
-            </a:br>
-            <a:r>
-              <a:rPr lang="en-US" sz="3600" dirty="0" err="1" smtClean="0">
-                <a:solidFill>
-                  <a:schemeClr val="accent1"/>
-                </a:solidFill>
-              </a:rPr>
-              <a:t>contoso.sharepoint.newsalerts.wsp</a:t>
-            </a:r>
-            <a:r>
-              <a:rPr lang="en-US" sz="3600" dirty="0">
-                <a:solidFill>
-                  <a:schemeClr val="accent1"/>
-                </a:solidFill>
-              </a:rPr>
-              <a:t/>
-            </a:r>
-            <a:br>
-              <a:rPr lang="en-US" sz="3600" dirty="0">
-                <a:solidFill>
-                  <a:schemeClr val="accent1"/>
-                </a:solidFill>
-              </a:rPr>
-            </a:br>
-            <a:r>
-              <a:rPr lang="en-US" sz="3600" dirty="0">
-                <a:solidFill>
-                  <a:schemeClr val="accent1"/>
-                </a:solidFill>
-              </a:rPr>
-              <a:t/>
-            </a:r>
-            <a:br>
-              <a:rPr lang="en-US" sz="3600" dirty="0">
-                <a:solidFill>
-                  <a:schemeClr val="accent1"/>
-                </a:solidFill>
-              </a:rPr>
-            </a:br>
-            <a:endParaRPr lang="nl-BE" sz="3600" dirty="0">
-              <a:solidFill>
-                <a:schemeClr val="accent1"/>
-              </a:solidFill>
-            </a:endParaRPr>
-          </a:p>
-        </p:txBody>
-      </p:sp>
-      <p:sp>
-        <p:nvSpPr>
-          <p:cNvPr id="11" name="Text Placeholder 10"/>
-          <p:cNvSpPr>
-            <a:spLocks noGrp="1"/>
-          </p:cNvSpPr>
-          <p:nvPr>
-            <p:ph type="body" sz="quarter" idx="10"/>
-          </p:nvPr>
-        </p:nvSpPr>
-        <p:spPr>
-          <a:xfrm>
-            <a:off x="3173505" y="2238374"/>
-            <a:ext cx="8494619" cy="4619626"/>
-          </a:xfrm>
-        </p:spPr>
-        <p:txBody>
-          <a:bodyPr/>
-          <a:lstStyle/>
-          <a:p>
-            <a:r>
-              <a:rPr lang="en-US" dirty="0"/>
-              <a:t>High level requirements:</a:t>
-            </a:r>
-          </a:p>
-          <a:p>
-            <a:pPr lvl="1"/>
-            <a:r>
-              <a:rPr lang="en-US" sz="1800" dirty="0" smtClean="0"/>
-              <a:t>Typical </a:t>
-            </a:r>
-            <a:r>
-              <a:rPr lang="en-US" sz="1800" dirty="0"/>
-              <a:t>Intranet features:</a:t>
-            </a:r>
-          </a:p>
-          <a:p>
-            <a:pPr lvl="2"/>
-            <a:r>
-              <a:rPr lang="en-US" sz="1800" dirty="0" smtClean="0"/>
-              <a:t>Sends notification when a “featured” news article is added</a:t>
-            </a:r>
-          </a:p>
-        </p:txBody>
-      </p:sp>
-      <p:sp>
-        <p:nvSpPr>
-          <p:cNvPr id="4" name="Text Placeholder 6"/>
+          <p:cNvPr id="8" name="Text Placeholder 10"/>
           <p:cNvSpPr txBox="1">
             <a:spLocks/>
           </p:cNvSpPr>
@@ -29254,17 +28853,19 @@
         </p:nvSpPr>
         <p:spPr>
           <a:xfrm>
-            <a:off x="3173505" y="1243404"/>
-            <a:ext cx="8494619" cy="2043636"/>
+            <a:off x="3228369" y="3516075"/>
+            <a:ext cx="8494619" cy="3341925"/>
           </a:xfrm>
           <a:prstGeom prst="rect">
             <a:avLst/>
           </a:prstGeom>
         </p:spPr>
         <p:txBody>
-          <a:bodyPr/>
+          <a:bodyPr vert="horz" lIns="0" tIns="0" rIns="0" bIns="0" rtlCol="0">
+            <a:noAutofit/>
+          </a:bodyPr>
           <a:lstStyle>
-            <a:lvl1pPr marL="339725" marR="0" indent="-339725" algn="l" defTabSz="914363" rtl="0" eaLnBrk="1" fontAlgn="auto" latinLnBrk="0" hangingPunct="1">
+            <a:lvl1pPr marL="284163" marR="0" indent="-284163" algn="l" defTabSz="914363" rtl="0" eaLnBrk="1" fontAlgn="auto" latinLnBrk="0" hangingPunct="1">
               <a:lnSpc>
                 <a:spcPct val="90000"/>
               </a:lnSpc>
@@ -29276,27 +28877,19 @@
               </a:spcAft>
               <a:buClrTx/>
               <a:buSzPct val="80000"/>
-              <a:buFont typeface="Arial" pitchFamily="34" charset="0"/>
-              <a:buChar char="•"/>
+              <a:buFont typeface="Wingdings" pitchFamily="2" charset="2"/>
+              <a:buChar char=""/>
               <a:tabLst/>
               <a:defRPr sz="3600" kern="1200" spc="-70" baseline="0">
-                <a:gradFill>
-                  <a:gsLst>
-                    <a:gs pos="1250">
-                      <a:schemeClr val="bg2"/>
-                    </a:gs>
-                    <a:gs pos="100000">
-                      <a:schemeClr val="bg2"/>
-                    </a:gs>
-                  </a:gsLst>
-                  <a:lin ang="5400000" scaled="0"/>
-                </a:gradFill>
+                <a:solidFill>
+                  <a:schemeClr val="tx2"/>
+                </a:solidFill>
                 <a:latin typeface="+mj-lt"/>
                 <a:ea typeface="+mn-ea"/>
                 <a:cs typeface="+mn-cs"/>
               </a:defRPr>
             </a:lvl1pPr>
-            <a:lvl2pPr marL="573088" marR="0" indent="-233363" algn="l" defTabSz="914363" rtl="0" eaLnBrk="1" fontAlgn="auto" latinLnBrk="0" hangingPunct="1">
+            <a:lvl2pPr marL="517525" marR="0" indent="-233363" algn="l" defTabSz="914363" rtl="0" eaLnBrk="1" fontAlgn="auto" latinLnBrk="0" hangingPunct="1">
               <a:lnSpc>
                 <a:spcPct val="90000"/>
               </a:lnSpc>
@@ -29309,9 +28902,9 @@
               <a:buClrTx/>
               <a:buSzPct val="90000"/>
               <a:buFont typeface="Wingdings" pitchFamily="2" charset="2"/>
-              <a:buChar char=""/>
+              <a:buChar char=""/>
               <a:tabLst/>
-              <a:defRPr sz="2400" kern="1200" spc="0" baseline="0">
+              <a:defRPr sz="2000" kern="1200" spc="0" baseline="0">
                 <a:gradFill>
                   <a:gsLst>
                     <a:gs pos="1250">
@@ -29328,7 +28921,7 @@
                 <a:cs typeface="+mn-cs"/>
               </a:defRPr>
             </a:lvl2pPr>
-            <a:lvl3pPr marL="798513" marR="0" indent="-225425" algn="l" defTabSz="914363" rtl="0" eaLnBrk="1" fontAlgn="auto" latinLnBrk="0" hangingPunct="1">
+            <a:lvl3pPr marL="741363" marR="0" indent="-223838" algn="l" defTabSz="914363" rtl="0" eaLnBrk="1" fontAlgn="auto" latinLnBrk="0" hangingPunct="1">
               <a:lnSpc>
                 <a:spcPct val="90000"/>
               </a:lnSpc>
@@ -29341,11 +28934,9 @@
               <a:buClrTx/>
               <a:buSzPct val="90000"/>
               <a:buFont typeface="Wingdings" pitchFamily="2" charset="2"/>
-              <a:buChar char=""/>
-              <a:tabLst>
-                <a:tab pos="798513" algn="l"/>
-              </a:tabLst>
-              <a:defRPr sz="2400" kern="1200" spc="0" baseline="0">
+              <a:buChar char=""/>
+              <a:tabLst/>
+              <a:defRPr sz="2000" kern="1200" spc="0" baseline="0">
                 <a:gradFill>
                   <a:gsLst>
                     <a:gs pos="1250">
@@ -29362,7 +28953,7 @@
                 <a:cs typeface="+mn-cs"/>
               </a:defRPr>
             </a:lvl3pPr>
-            <a:lvl4pPr marL="1030288" marR="0" indent="-231775" algn="l" defTabSz="914363" rtl="0" eaLnBrk="1" fontAlgn="auto" latinLnBrk="0" hangingPunct="1">
+            <a:lvl4pPr marL="914400" marR="0" indent="-173038" algn="l" defTabSz="914363" rtl="0" eaLnBrk="1" fontAlgn="auto" latinLnBrk="0" hangingPunct="1">
               <a:lnSpc>
                 <a:spcPct val="90000"/>
               </a:lnSpc>
@@ -29375,9 +28966,9 @@
               <a:buClrTx/>
               <a:buSzPct val="90000"/>
               <a:buFont typeface="Wingdings" pitchFamily="2" charset="2"/>
-              <a:buChar char=""/>
+              <a:buChar char=""/>
               <a:tabLst/>
-              <a:defRPr sz="2000" kern="1200" spc="0" baseline="0">
+              <a:defRPr sz="1800" kern="1200" spc="0" baseline="0">
                 <a:gradFill>
                   <a:gsLst>
                     <a:gs pos="1250">
@@ -29394,7 +28985,7 @@
                 <a:cs typeface="+mn-cs"/>
               </a:defRPr>
             </a:lvl4pPr>
-            <a:lvl5pPr marL="1255713" marR="0" indent="-225425" algn="l" defTabSz="914363" rtl="0" eaLnBrk="1" fontAlgn="auto" latinLnBrk="0" hangingPunct="1">
+            <a:lvl5pPr marL="1087438" marR="0" indent="-173038" algn="l" defTabSz="914363" rtl="0" eaLnBrk="1" fontAlgn="auto" latinLnBrk="0" hangingPunct="1">
               <a:lnSpc>
                 <a:spcPct val="90000"/>
               </a:lnSpc>
@@ -29407,11 +28998,9 @@
               <a:buClrTx/>
               <a:buSzPct val="90000"/>
               <a:buFont typeface="Wingdings" pitchFamily="2" charset="2"/>
-              <a:buChar char=""/>
-              <a:tabLst>
-                <a:tab pos="1255713" algn="l"/>
-              </a:tabLst>
-              <a:defRPr sz="2000" kern="1200" spc="0" baseline="0">
+              <a:buChar char=""/>
+              <a:tabLst/>
+              <a:defRPr sz="1800" kern="1200" spc="0" baseline="0">
                 <a:gradFill>
                   <a:gsLst>
                     <a:gs pos="1250">
@@ -29490,6 +29079,509 @@
             </a:lvl9pPr>
           </a:lstStyle>
           <a:p>
+            <a:r>
+              <a:rPr lang="en-US" dirty="0" smtClean="0"/>
+              <a:t>Migration</a:t>
+            </a:r>
+          </a:p>
+          <a:p>
+            <a:pPr lvl="1"/>
+            <a:r>
+              <a:rPr lang="en-US" dirty="0" smtClean="0"/>
+              <a:t>Business </a:t>
+            </a:r>
+            <a:r>
+              <a:rPr lang="en-US" dirty="0"/>
+              <a:t>logic could be factored to one or more </a:t>
+            </a:r>
+            <a:r>
+              <a:rPr lang="en-US" b="1" dirty="0" err="1"/>
+              <a:t>oData</a:t>
+            </a:r>
+            <a:r>
+              <a:rPr lang="en-US" b="1" dirty="0"/>
+              <a:t> Web </a:t>
+            </a:r>
+            <a:r>
+              <a:rPr lang="en-US" b="1" dirty="0" smtClean="0"/>
+              <a:t>Services</a:t>
+            </a:r>
+          </a:p>
+          <a:p>
+            <a:pPr lvl="1"/>
+            <a:r>
+              <a:rPr lang="en-US" dirty="0" smtClean="0"/>
+              <a:t>May leverage </a:t>
+            </a:r>
+            <a:r>
+              <a:rPr lang="en-US" dirty="0"/>
+              <a:t>eDiscovery capabilities of Office 365</a:t>
+            </a:r>
+            <a:r>
+              <a:rPr lang="en-US" dirty="0" smtClean="0"/>
+              <a:t>.</a:t>
+            </a:r>
+            <a:endParaRPr lang="en-US" dirty="0" smtClean="0"/>
+          </a:p>
+          <a:p>
+            <a:r>
+              <a:rPr lang="en-US" dirty="0" smtClean="0"/>
+              <a:t>Challenges</a:t>
+            </a:r>
+            <a:endParaRPr lang="en-US" dirty="0"/>
+          </a:p>
+          <a:p>
+            <a:pPr lvl="1"/>
+            <a:r>
+              <a:rPr lang="en-US" dirty="0"/>
+              <a:t>Although SharePoint 2013 </a:t>
+            </a:r>
+            <a:r>
+              <a:rPr lang="en-US" dirty="0" smtClean="0"/>
+              <a:t>is backwards </a:t>
+            </a:r>
+            <a:r>
+              <a:rPr lang="en-US" dirty="0"/>
+              <a:t>compatible with 2010 workflows, the </a:t>
+            </a:r>
+            <a:r>
+              <a:rPr lang="en-US" dirty="0" smtClean="0"/>
+              <a:t>call to </a:t>
+            </a:r>
+            <a:r>
+              <a:rPr lang="en-US" dirty="0"/>
+              <a:t>HTTP Web Service action is only available </a:t>
+            </a:r>
+            <a:r>
+              <a:rPr lang="en-US" dirty="0" smtClean="0"/>
+              <a:t>for workflows </a:t>
+            </a:r>
+            <a:r>
+              <a:rPr lang="en-US" dirty="0"/>
+              <a:t>built </a:t>
+            </a:r>
+            <a:r>
+              <a:rPr lang="en-US" dirty="0" smtClean="0"/>
+              <a:t>using SharePoint </a:t>
+            </a:r>
+            <a:r>
+              <a:rPr lang="en-US" dirty="0"/>
+              <a:t>2013 declarative workflows</a:t>
+            </a:r>
+            <a:r>
+              <a:rPr lang="en-US" dirty="0" smtClean="0"/>
+              <a:t> </a:t>
+            </a:r>
+            <a:endParaRPr lang="en-US" dirty="0"/>
+          </a:p>
+          <a:p>
+            <a:pPr lvl="1"/>
+            <a:endParaRPr lang="en-US" dirty="0" smtClean="0"/>
+          </a:p>
+          <a:p>
+            <a:pPr lvl="1"/>
+            <a:endParaRPr lang="en-US" dirty="0"/>
+          </a:p>
+        </p:txBody>
+      </p:sp>
+    </p:spTree>
+    <p:extLst>
+      <p:ext uri="{BB962C8B-B14F-4D97-AF65-F5344CB8AC3E}">
+        <p14:creationId xmlns:p14="http://schemas.microsoft.com/office/powerpoint/2010/main" val="1840351170"/>
+      </p:ext>
+    </p:extLst>
+  </p:cSld>
+  <p:clrMapOvr>
+    <a:masterClrMapping/>
+  </p:clrMapOvr>
+  <p:transition>
+    <p:fade/>
+  </p:transition>
+  <p:timing>
+    <p:tnLst>
+      <p:par>
+        <p:cTn id="1" dur="indefinite" restart="never" nodeType="tmRoot"/>
+      </p:par>
+    </p:tnLst>
+  </p:timing>
+</p:sld>
+</file>
+
+<file path=ppt/slides/slide26.xml><?xml version="1.0" encoding="utf-8"?>
+<p:sld xmlns:a="http://schemas.openxmlformats.org/drawingml/2006/main" xmlns:r="http://schemas.openxmlformats.org/officeDocument/2006/relationships" xmlns:p="http://schemas.openxmlformats.org/presentationml/2006/main">
+  <p:cSld>
+    <p:spTree>
+      <p:nvGrpSpPr>
+        <p:cNvPr id="1" name=""/>
+        <p:cNvGrpSpPr/>
+        <p:nvPr/>
+      </p:nvGrpSpPr>
+      <p:grpSpPr>
+        <a:xfrm>
+          <a:off x="0" y="0"/>
+          <a:ext cx="0" cy="0"/>
+          <a:chOff x="0" y="0"/>
+          <a:chExt cx="0" cy="0"/>
+        </a:xfrm>
+      </p:grpSpPr>
+      <p:sp>
+        <p:nvSpPr>
+          <p:cNvPr id="2" name="Title 1"/>
+          <p:cNvSpPr>
+            <a:spLocks noGrp="1"/>
+          </p:cNvSpPr>
+          <p:nvPr>
+            <p:ph type="title"/>
+          </p:nvPr>
+        </p:nvSpPr>
+        <p:spPr>
+          <a:xfrm>
+            <a:off x="3173505" y="992992"/>
+            <a:ext cx="8494619" cy="747897"/>
+          </a:xfrm>
+        </p:spPr>
+        <p:txBody>
+          <a:bodyPr anchor="ctr"/>
+          <a:lstStyle/>
+          <a:p>
+            <a:r>
+              <a:rPr lang="nl-BE" dirty="0" smtClean="0"/>
+              <a:t>News notifications</a:t>
+            </a:r>
+            <a:br>
+              <a:rPr lang="nl-BE" dirty="0" smtClean="0"/>
+            </a:br>
+            <a:r>
+              <a:rPr lang="en-US" sz="3600" dirty="0" err="1" smtClean="0">
+                <a:solidFill>
+                  <a:schemeClr val="accent1"/>
+                </a:solidFill>
+              </a:rPr>
+              <a:t>contoso.sharepoint.newsalerts.wsp</a:t>
+            </a:r>
+            <a:r>
+              <a:rPr lang="en-US" sz="3600" dirty="0">
+                <a:solidFill>
+                  <a:schemeClr val="accent1"/>
+                </a:solidFill>
+              </a:rPr>
+              <a:t/>
+            </a:r>
+            <a:br>
+              <a:rPr lang="en-US" sz="3600" dirty="0">
+                <a:solidFill>
+                  <a:schemeClr val="accent1"/>
+                </a:solidFill>
+              </a:rPr>
+            </a:br>
+            <a:r>
+              <a:rPr lang="en-US" sz="3600" dirty="0">
+                <a:solidFill>
+                  <a:schemeClr val="accent1"/>
+                </a:solidFill>
+              </a:rPr>
+              <a:t/>
+            </a:r>
+            <a:br>
+              <a:rPr lang="en-US" sz="3600" dirty="0">
+                <a:solidFill>
+                  <a:schemeClr val="accent1"/>
+                </a:solidFill>
+              </a:rPr>
+            </a:br>
+            <a:endParaRPr lang="nl-BE" sz="3600" dirty="0">
+              <a:solidFill>
+                <a:schemeClr val="accent1"/>
+              </a:solidFill>
+            </a:endParaRPr>
+          </a:p>
+        </p:txBody>
+      </p:sp>
+      <p:sp>
+        <p:nvSpPr>
+          <p:cNvPr id="11" name="Text Placeholder 10"/>
+          <p:cNvSpPr>
+            <a:spLocks noGrp="1"/>
+          </p:cNvSpPr>
+          <p:nvPr>
+            <p:ph type="body" sz="quarter" idx="10"/>
+          </p:nvPr>
+        </p:nvSpPr>
+        <p:spPr>
+          <a:xfrm>
+            <a:off x="3173505" y="2238374"/>
+            <a:ext cx="8494619" cy="4619626"/>
+          </a:xfrm>
+        </p:spPr>
+        <p:txBody>
+          <a:bodyPr/>
+          <a:lstStyle/>
+          <a:p>
+            <a:r>
+              <a:rPr lang="en-US" dirty="0" smtClean="0"/>
+              <a:t>Current Implementation:</a:t>
+            </a:r>
+            <a:endParaRPr lang="en-US" dirty="0"/>
+          </a:p>
+          <a:p>
+            <a:pPr lvl="1"/>
+            <a:r>
+              <a:rPr lang="en-US" sz="1800" dirty="0" smtClean="0"/>
+              <a:t>The timer job solution has been designed to send </a:t>
+            </a:r>
+            <a:r>
+              <a:rPr lang="en-US" sz="1800" dirty="0" smtClean="0"/>
+              <a:t>notification when a “featured” news article is added</a:t>
+            </a:r>
+          </a:p>
+        </p:txBody>
+      </p:sp>
+      <p:sp>
+        <p:nvSpPr>
+          <p:cNvPr id="4" name="Text Placeholder 6"/>
+          <p:cNvSpPr txBox="1">
+            <a:spLocks/>
+          </p:cNvSpPr>
+          <p:nvPr/>
+        </p:nvSpPr>
+        <p:spPr>
+          <a:xfrm>
+            <a:off x="3173505" y="1243404"/>
+            <a:ext cx="8494619" cy="2043636"/>
+          </a:xfrm>
+          <a:prstGeom prst="rect">
+            <a:avLst/>
+          </a:prstGeom>
+        </p:spPr>
+        <p:txBody>
+          <a:bodyPr/>
+          <a:lstStyle>
+            <a:lvl1pPr marL="339725" marR="0" indent="-339725" algn="l" defTabSz="914363" rtl="0" eaLnBrk="1" fontAlgn="auto" latinLnBrk="0" hangingPunct="1">
+              <a:lnSpc>
+                <a:spcPct val="90000"/>
+              </a:lnSpc>
+              <a:spcBef>
+                <a:spcPct val="20000"/>
+              </a:spcBef>
+              <a:spcAft>
+                <a:spcPts val="0"/>
+              </a:spcAft>
+              <a:buClrTx/>
+              <a:buSzPct val="80000"/>
+              <a:buFont typeface="Arial" pitchFamily="34" charset="0"/>
+              <a:buChar char="•"/>
+              <a:tabLst/>
+              <a:defRPr sz="3600" kern="1200" spc="-70" baseline="0">
+                <a:gradFill>
+                  <a:gsLst>
+                    <a:gs pos="1250">
+                      <a:schemeClr val="bg2"/>
+                    </a:gs>
+                    <a:gs pos="100000">
+                      <a:schemeClr val="bg2"/>
+                    </a:gs>
+                  </a:gsLst>
+                  <a:lin ang="5400000" scaled="0"/>
+                </a:gradFill>
+                <a:latin typeface="+mj-lt"/>
+                <a:ea typeface="+mn-ea"/>
+                <a:cs typeface="+mn-cs"/>
+              </a:defRPr>
+            </a:lvl1pPr>
+            <a:lvl2pPr marL="573088" marR="0" indent="-233363" algn="l" defTabSz="914363" rtl="0" eaLnBrk="1" fontAlgn="auto" latinLnBrk="0" hangingPunct="1">
+              <a:lnSpc>
+                <a:spcPct val="90000"/>
+              </a:lnSpc>
+              <a:spcBef>
+                <a:spcPct val="20000"/>
+              </a:spcBef>
+              <a:spcAft>
+                <a:spcPts val="0"/>
+              </a:spcAft>
+              <a:buClrTx/>
+              <a:buSzPct val="90000"/>
+              <a:buFont typeface="Wingdings" pitchFamily="2" charset="2"/>
+              <a:buChar char=""/>
+              <a:tabLst/>
+              <a:defRPr sz="2400" kern="1200" spc="0" baseline="0">
+                <a:gradFill>
+                  <a:gsLst>
+                    <a:gs pos="1250">
+                      <a:schemeClr val="bg2"/>
+                    </a:gs>
+                    <a:gs pos="100000">
+                      <a:schemeClr val="bg2"/>
+                    </a:gs>
+                  </a:gsLst>
+                  <a:lin ang="5400000" scaled="0"/>
+                </a:gradFill>
+                <a:latin typeface="+mn-lt"/>
+                <a:ea typeface="+mn-ea"/>
+                <a:cs typeface="+mn-cs"/>
+              </a:defRPr>
+            </a:lvl2pPr>
+            <a:lvl3pPr marL="798513" marR="0" indent="-225425" algn="l" defTabSz="914363" rtl="0" eaLnBrk="1" fontAlgn="auto" latinLnBrk="0" hangingPunct="1">
+              <a:lnSpc>
+                <a:spcPct val="90000"/>
+              </a:lnSpc>
+              <a:spcBef>
+                <a:spcPct val="20000"/>
+              </a:spcBef>
+              <a:spcAft>
+                <a:spcPts val="0"/>
+              </a:spcAft>
+              <a:buClrTx/>
+              <a:buSzPct val="90000"/>
+              <a:buFont typeface="Wingdings" pitchFamily="2" charset="2"/>
+              <a:buChar char=""/>
+              <a:tabLst>
+                <a:tab pos="798513" algn="l"/>
+              </a:tabLst>
+              <a:defRPr sz="2400" kern="1200" spc="0" baseline="0">
+                <a:gradFill>
+                  <a:gsLst>
+                    <a:gs pos="1250">
+                      <a:schemeClr val="bg2"/>
+                    </a:gs>
+                    <a:gs pos="100000">
+                      <a:schemeClr val="bg2"/>
+                    </a:gs>
+                  </a:gsLst>
+                  <a:lin ang="5400000" scaled="0"/>
+                </a:gradFill>
+                <a:latin typeface="+mn-lt"/>
+                <a:ea typeface="+mn-ea"/>
+                <a:cs typeface="+mn-cs"/>
+              </a:defRPr>
+            </a:lvl3pPr>
+            <a:lvl4pPr marL="1030288" marR="0" indent="-231775" algn="l" defTabSz="914363" rtl="0" eaLnBrk="1" fontAlgn="auto" latinLnBrk="0" hangingPunct="1">
+              <a:lnSpc>
+                <a:spcPct val="90000"/>
+              </a:lnSpc>
+              <a:spcBef>
+                <a:spcPct val="20000"/>
+              </a:spcBef>
+              <a:spcAft>
+                <a:spcPts val="0"/>
+              </a:spcAft>
+              <a:buClrTx/>
+              <a:buSzPct val="90000"/>
+              <a:buFont typeface="Wingdings" pitchFamily="2" charset="2"/>
+              <a:buChar char=""/>
+              <a:tabLst/>
+              <a:defRPr sz="2000" kern="1200" spc="0" baseline="0">
+                <a:gradFill>
+                  <a:gsLst>
+                    <a:gs pos="1250">
+                      <a:schemeClr val="bg2"/>
+                    </a:gs>
+                    <a:gs pos="100000">
+                      <a:schemeClr val="bg2"/>
+                    </a:gs>
+                  </a:gsLst>
+                  <a:lin ang="5400000" scaled="0"/>
+                </a:gradFill>
+                <a:latin typeface="+mn-lt"/>
+                <a:ea typeface="+mn-ea"/>
+                <a:cs typeface="+mn-cs"/>
+              </a:defRPr>
+            </a:lvl4pPr>
+            <a:lvl5pPr marL="1255713" marR="0" indent="-225425" algn="l" defTabSz="914363" rtl="0" eaLnBrk="1" fontAlgn="auto" latinLnBrk="0" hangingPunct="1">
+              <a:lnSpc>
+                <a:spcPct val="90000"/>
+              </a:lnSpc>
+              <a:spcBef>
+                <a:spcPct val="20000"/>
+              </a:spcBef>
+              <a:spcAft>
+                <a:spcPts val="0"/>
+              </a:spcAft>
+              <a:buClrTx/>
+              <a:buSzPct val="90000"/>
+              <a:buFont typeface="Wingdings" pitchFamily="2" charset="2"/>
+              <a:buChar char=""/>
+              <a:tabLst>
+                <a:tab pos="1255713" algn="l"/>
+              </a:tabLst>
+              <a:defRPr sz="2000" kern="1200" spc="0" baseline="0">
+                <a:gradFill>
+                  <a:gsLst>
+                    <a:gs pos="1250">
+                      <a:schemeClr val="bg2"/>
+                    </a:gs>
+                    <a:gs pos="100000">
+                      <a:schemeClr val="bg2"/>
+                    </a:gs>
+                  </a:gsLst>
+                  <a:lin ang="5400000" scaled="0"/>
+                </a:gradFill>
+                <a:latin typeface="+mn-lt"/>
+                <a:ea typeface="+mn-ea"/>
+                <a:cs typeface="+mn-cs"/>
+              </a:defRPr>
+            </a:lvl5pPr>
+            <a:lvl6pPr marL="2514499" indent="-228591" algn="l" defTabSz="914363" rtl="0" eaLnBrk="1" latinLnBrk="0" hangingPunct="1">
+              <a:spcBef>
+                <a:spcPct val="20000"/>
+              </a:spcBef>
+              <a:buFont typeface="Arial" pitchFamily="34" charset="0"/>
+              <a:buChar char="•"/>
+              <a:defRPr sz="2000" kern="1200">
+                <a:solidFill>
+                  <a:schemeClr val="tx1"/>
+                </a:solidFill>
+                <a:latin typeface="+mn-lt"/>
+                <a:ea typeface="+mn-ea"/>
+                <a:cs typeface="+mn-cs"/>
+              </a:defRPr>
+            </a:lvl6pPr>
+            <a:lvl7pPr marL="2971681" indent="-228591" algn="l" defTabSz="914363" rtl="0" eaLnBrk="1" latinLnBrk="0" hangingPunct="1">
+              <a:spcBef>
+                <a:spcPct val="20000"/>
+              </a:spcBef>
+              <a:buFont typeface="Arial" pitchFamily="34" charset="0"/>
+              <a:buChar char="•"/>
+              <a:defRPr sz="2000" kern="1200">
+                <a:solidFill>
+                  <a:schemeClr val="tx1"/>
+                </a:solidFill>
+                <a:latin typeface="+mn-lt"/>
+                <a:ea typeface="+mn-ea"/>
+                <a:cs typeface="+mn-cs"/>
+              </a:defRPr>
+            </a:lvl7pPr>
+            <a:lvl8pPr marL="3428863" indent="-228591" algn="l" defTabSz="914363" rtl="0" eaLnBrk="1" latinLnBrk="0" hangingPunct="1">
+              <a:spcBef>
+                <a:spcPct val="20000"/>
+              </a:spcBef>
+              <a:buFont typeface="Arial" pitchFamily="34" charset="0"/>
+              <a:buChar char="•"/>
+              <a:defRPr sz="2000" kern="1200">
+                <a:solidFill>
+                  <a:schemeClr val="tx1"/>
+                </a:solidFill>
+                <a:latin typeface="+mn-lt"/>
+                <a:ea typeface="+mn-ea"/>
+                <a:cs typeface="+mn-cs"/>
+              </a:defRPr>
+            </a:lvl8pPr>
+            <a:lvl9pPr marL="3886045" indent="-228591" algn="l" defTabSz="914363" rtl="0" eaLnBrk="1" latinLnBrk="0" hangingPunct="1">
+              <a:spcBef>
+                <a:spcPct val="20000"/>
+              </a:spcBef>
+              <a:buFont typeface="Arial" pitchFamily="34" charset="0"/>
+              <a:buChar char="•"/>
+              <a:defRPr sz="2000" kern="1200">
+                <a:solidFill>
+                  <a:schemeClr val="tx1"/>
+                </a:solidFill>
+                <a:latin typeface="+mn-lt"/>
+                <a:ea typeface="+mn-ea"/>
+                <a:cs typeface="+mn-cs"/>
+              </a:defRPr>
+            </a:lvl9pPr>
+          </a:lstStyle>
+          <a:p>
             <a:endParaRPr lang="en-US" dirty="0" smtClean="0">
               <a:gradFill>
                 <a:gsLst>
@@ -29513,7 +29605,11 @@
             <a:graphicFrameLocks noGrp="1"/>
           </p:cNvGraphicFramePr>
           <p:nvPr>
-            <p:extLst/>
+            <p:extLst>
+              <p:ext uri="{D42A27DB-BD31-4B8C-83A1-F6EECF244321}">
+                <p14:modId xmlns:p14="http://schemas.microsoft.com/office/powerpoint/2010/main" val="283125596"/>
+              </p:ext>
+            </p:extLst>
           </p:nvPr>
         </p:nvGraphicFramePr>
         <p:xfrm>
@@ -29530,7 +29626,7 @@
                 <a:gridCol w="2373524">
                   <a:extLst>
                     <a:ext uri="{9D8B030D-6E8A-4147-A177-3AD203B41FA5}">
-                      <a16:colId xmlns:a16="http://schemas.microsoft.com/office/drawing/2014/main" xmlns="" val="20000"/>
+                      <a16:colId xmlns="" xmlns:a16="http://schemas.microsoft.com/office/drawing/2014/main" val="20000"/>
                     </a:ext>
                   </a:extLst>
                 </a:gridCol>
@@ -29544,7 +29640,7 @@
                       <a:pPr algn="ctr"/>
                       <a:r>
                         <a:rPr lang="en-US" b="1" i="0" dirty="0" smtClean="0"/>
-                        <a:t>Branding</a:t>
+                        <a:t>News Notifications</a:t>
                       </a:r>
                       <a:endParaRPr lang="nl-BE" b="1" i="0" dirty="0"/>
                     </a:p>
@@ -29593,7 +29689,7 @@
                 </a:tc>
                 <a:extLst>
                   <a:ext uri="{0D108BD9-81ED-4DB2-BD59-A6C34878D82A}">
-                    <a16:rowId xmlns:a16="http://schemas.microsoft.com/office/drawing/2014/main" xmlns="" val="10000"/>
+                    <a16:rowId xmlns="" xmlns:a16="http://schemas.microsoft.com/office/drawing/2014/main" val="10000"/>
                   </a:ext>
                 </a:extLst>
               </a:tr>
@@ -29654,7 +29750,7 @@
                 </a:tc>
                 <a:extLst>
                   <a:ext uri="{0D108BD9-81ED-4DB2-BD59-A6C34878D82A}">
-                    <a16:rowId xmlns:a16="http://schemas.microsoft.com/office/drawing/2014/main" xmlns="" val="10001"/>
+                    <a16:rowId xmlns="" xmlns:a16="http://schemas.microsoft.com/office/drawing/2014/main" val="10001"/>
                   </a:ext>
                 </a:extLst>
               </a:tr>
@@ -29724,7 +29820,7 @@
                 </a:tc>
                 <a:extLst>
                   <a:ext uri="{0D108BD9-81ED-4DB2-BD59-A6C34878D82A}">
-                    <a16:rowId xmlns:a16="http://schemas.microsoft.com/office/drawing/2014/main" xmlns="" val="10002"/>
+                    <a16:rowId xmlns="" xmlns:a16="http://schemas.microsoft.com/office/drawing/2014/main" val="10002"/>
                   </a:ext>
                 </a:extLst>
               </a:tr>
@@ -29802,7 +29898,7 @@
                 </a:tc>
                 <a:extLst>
                   <a:ext uri="{0D108BD9-81ED-4DB2-BD59-A6C34878D82A}">
-                    <a16:rowId xmlns:a16="http://schemas.microsoft.com/office/drawing/2014/main" xmlns="" val="10007"/>
+                    <a16:rowId xmlns="" xmlns:a16="http://schemas.microsoft.com/office/drawing/2014/main" val="10007"/>
                   </a:ext>
                 </a:extLst>
               </a:tr>
@@ -30098,8 +30194,8 @@
         </p:nvSpPr>
         <p:spPr>
           <a:xfrm>
-            <a:off x="3173505" y="1740407"/>
-            <a:ext cx="8494619" cy="4619626"/>
+            <a:off x="3173505" y="1531859"/>
+            <a:ext cx="8825990" cy="4596225"/>
           </a:xfrm>
         </p:spPr>
         <p:txBody>
@@ -30107,22 +30203,42 @@
           <a:lstStyle/>
           <a:p>
             <a:r>
-              <a:rPr lang="en-US" dirty="0"/>
-              <a:t>High level requirements:</a:t>
-            </a:r>
+              <a:rPr lang="en-US" dirty="0" smtClean="0"/>
+              <a:t>Current Implementation</a:t>
+            </a:r>
+            <a:endParaRPr lang="en-US" dirty="0"/>
           </a:p>
           <a:p>
             <a:pPr lvl="1"/>
             <a:r>
               <a:rPr lang="en-US" dirty="0" smtClean="0"/>
-              <a:t>Allow users to search experts based on their years of experience and past projects.</a:t>
+              <a:t>The solution has </a:t>
+            </a:r>
+            <a:r>
+              <a:rPr lang="en-US" dirty="0" smtClean="0"/>
+              <a:t>been designed to:</a:t>
             </a:r>
           </a:p>
           <a:p>
             <a:pPr lvl="1"/>
             <a:r>
               <a:rPr lang="en-US" dirty="0" smtClean="0"/>
-              <a:t>Allow the users to be able to communicate with the experts using a tool.</a:t>
+              <a:t>Allow </a:t>
+            </a:r>
+            <a:r>
+              <a:rPr lang="en-US" dirty="0" smtClean="0"/>
+              <a:t>users to search experts based on their years of experience and past projects.</a:t>
+            </a:r>
+          </a:p>
+          <a:p>
+            <a:pPr lvl="1"/>
+            <a:r>
+              <a:rPr lang="en-US" dirty="0" smtClean="0"/>
+              <a:t>Allow the users to be able to communicate with the experts using a </a:t>
+            </a:r>
+            <a:r>
+              <a:rPr lang="en-US" dirty="0" smtClean="0"/>
+              <a:t>custom user interface.</a:t>
             </a:r>
             <a:endParaRPr lang="en-US" dirty="0"/>
           </a:p>
@@ -30451,7 +30567,7 @@
                 <a:gridCol w="2373524">
                   <a:extLst>
                     <a:ext uri="{9D8B030D-6E8A-4147-A177-3AD203B41FA5}">
-                      <a16:colId xmlns:a16="http://schemas.microsoft.com/office/drawing/2014/main" xmlns="" val="20000"/>
+                      <a16:colId xmlns="" xmlns:a16="http://schemas.microsoft.com/office/drawing/2014/main" val="20000"/>
                     </a:ext>
                   </a:extLst>
                 </a:gridCol>
@@ -30514,7 +30630,7 @@
                 </a:tc>
                 <a:extLst>
                   <a:ext uri="{0D108BD9-81ED-4DB2-BD59-A6C34878D82A}">
-                    <a16:rowId xmlns:a16="http://schemas.microsoft.com/office/drawing/2014/main" xmlns="" val="10000"/>
+                    <a16:rowId xmlns="" xmlns:a16="http://schemas.microsoft.com/office/drawing/2014/main" val="10000"/>
                   </a:ext>
                 </a:extLst>
               </a:tr>
@@ -30575,7 +30691,7 @@
                 </a:tc>
                 <a:extLst>
                   <a:ext uri="{0D108BD9-81ED-4DB2-BD59-A6C34878D82A}">
-                    <a16:rowId xmlns:a16="http://schemas.microsoft.com/office/drawing/2014/main" xmlns="" val="10001"/>
+                    <a16:rowId xmlns="" xmlns:a16="http://schemas.microsoft.com/office/drawing/2014/main" val="10001"/>
                   </a:ext>
                 </a:extLst>
               </a:tr>
@@ -30645,7 +30761,7 @@
                 </a:tc>
                 <a:extLst>
                   <a:ext uri="{0D108BD9-81ED-4DB2-BD59-A6C34878D82A}">
-                    <a16:rowId xmlns:a16="http://schemas.microsoft.com/office/drawing/2014/main" xmlns="" val="10002"/>
+                    <a16:rowId xmlns="" xmlns:a16="http://schemas.microsoft.com/office/drawing/2014/main" val="10002"/>
                   </a:ext>
                 </a:extLst>
               </a:tr>
@@ -30723,7 +30839,7 @@
                 </a:tc>
                 <a:extLst>
                   <a:ext uri="{0D108BD9-81ED-4DB2-BD59-A6C34878D82A}">
-                    <a16:rowId xmlns:a16="http://schemas.microsoft.com/office/drawing/2014/main" xmlns="" val="10007"/>
+                    <a16:rowId xmlns="" xmlns:a16="http://schemas.microsoft.com/office/drawing/2014/main" val="10007"/>
                   </a:ext>
                 </a:extLst>
               </a:tr>
@@ -30881,15 +30997,52 @@
           <a:lstStyle/>
           <a:p>
             <a:r>
-              <a:rPr lang="en-US" dirty="0"/>
-              <a:t>High level requirements:</a:t>
-            </a:r>
+              <a:rPr lang="en-US" dirty="0" smtClean="0"/>
+              <a:t>Current Implementation:</a:t>
+            </a:r>
+          </a:p>
+          <a:p>
+            <a:r>
+              <a:rPr lang="en-US" sz="2000" spc="0" dirty="0">
+                <a:gradFill>
+                  <a:gsLst>
+                    <a:gs pos="1250">
+                      <a:schemeClr val="bg2"/>
+                    </a:gs>
+                    <a:gs pos="100000">
+                      <a:schemeClr val="bg2"/>
+                    </a:gs>
+                  </a:gsLst>
+                  <a:lin ang="5400000" scaled="0"/>
+                </a:gradFill>
+                <a:latin typeface="+mn-lt"/>
+              </a:rPr>
+              <a:t>The location finder solution allows:</a:t>
+            </a:r>
+            <a:endParaRPr lang="en-US" sz="2000" spc="0" dirty="0">
+              <a:gradFill>
+                <a:gsLst>
+                  <a:gs pos="1250">
+                    <a:schemeClr val="bg2"/>
+                  </a:gs>
+                  <a:gs pos="100000">
+                    <a:schemeClr val="bg2"/>
+                  </a:gs>
+                </a:gsLst>
+                <a:lin ang="5400000" scaled="0"/>
+              </a:gradFill>
+              <a:latin typeface="+mn-lt"/>
+            </a:endParaRPr>
           </a:p>
           <a:p>
             <a:pPr lvl="1"/>
             <a:r>
               <a:rPr lang="en-US" dirty="0" smtClean="0"/>
-              <a:t>Should allow users to search for </a:t>
+              <a:t>Users to </a:t>
+            </a:r>
+            <a:r>
+              <a:rPr lang="en-US" dirty="0" smtClean="0"/>
+              <a:t>search for </a:t>
             </a:r>
             <a:r>
               <a:rPr lang="en-US" dirty="0" err="1" smtClean="0"/>
@@ -30904,7 +31057,11 @@
             <a:pPr lvl="1"/>
             <a:r>
               <a:rPr lang="en-US" dirty="0" smtClean="0"/>
-              <a:t>Should map the locations on interactive Bing Map</a:t>
+              <a:t>Maps the </a:t>
+            </a:r>
+            <a:r>
+              <a:rPr lang="en-US" dirty="0" smtClean="0"/>
+              <a:t>locations on interactive Bing Map</a:t>
             </a:r>
             <a:endParaRPr lang="en-US" dirty="0"/>
           </a:p>
@@ -30977,7 +31134,7 @@
                 <a:gridCol w="2373524">
                   <a:extLst>
                     <a:ext uri="{9D8B030D-6E8A-4147-A177-3AD203B41FA5}">
-                      <a16:colId xmlns:a16="http://schemas.microsoft.com/office/drawing/2014/main" xmlns="" val="20000"/>
+                      <a16:colId xmlns="" xmlns:a16="http://schemas.microsoft.com/office/drawing/2014/main" val="20000"/>
                     </a:ext>
                   </a:extLst>
                 </a:gridCol>
@@ -31040,7 +31197,7 @@
                 </a:tc>
                 <a:extLst>
                   <a:ext uri="{0D108BD9-81ED-4DB2-BD59-A6C34878D82A}">
-                    <a16:rowId xmlns:a16="http://schemas.microsoft.com/office/drawing/2014/main" xmlns="" val="10000"/>
+                    <a16:rowId xmlns="" xmlns:a16="http://schemas.microsoft.com/office/drawing/2014/main" val="10000"/>
                   </a:ext>
                 </a:extLst>
               </a:tr>
@@ -31101,7 +31258,7 @@
                 </a:tc>
                 <a:extLst>
                   <a:ext uri="{0D108BD9-81ED-4DB2-BD59-A6C34878D82A}">
-                    <a16:rowId xmlns:a16="http://schemas.microsoft.com/office/drawing/2014/main" xmlns="" val="10001"/>
+                    <a16:rowId xmlns="" xmlns:a16="http://schemas.microsoft.com/office/drawing/2014/main" val="10001"/>
                   </a:ext>
                 </a:extLst>
               </a:tr>
@@ -31179,7 +31336,7 @@
                 </a:tc>
                 <a:extLst>
                   <a:ext uri="{0D108BD9-81ED-4DB2-BD59-A6C34878D82A}">
-                    <a16:rowId xmlns:a16="http://schemas.microsoft.com/office/drawing/2014/main" xmlns="" val="10002"/>
+                    <a16:rowId xmlns="" xmlns:a16="http://schemas.microsoft.com/office/drawing/2014/main" val="10002"/>
                   </a:ext>
                 </a:extLst>
               </a:tr>
@@ -31257,7 +31414,7 @@
                 </a:tc>
                 <a:extLst>
                   <a:ext uri="{0D108BD9-81ED-4DB2-BD59-A6C34878D82A}">
-                    <a16:rowId xmlns:a16="http://schemas.microsoft.com/office/drawing/2014/main" xmlns="" val="10007"/>
+                    <a16:rowId xmlns="" xmlns:a16="http://schemas.microsoft.com/office/drawing/2014/main" val="10007"/>
                   </a:ext>
                 </a:extLst>
               </a:tr>
@@ -31664,7 +31821,7 @@
         </p:nvSpPr>
         <p:spPr>
           <a:xfrm>
-            <a:off x="3173505" y="1874519"/>
+            <a:off x="3173504" y="1698056"/>
             <a:ext cx="8494619" cy="4619626"/>
           </a:xfrm>
         </p:spPr>
@@ -31673,9 +31830,42 @@
           <a:lstStyle/>
           <a:p>
             <a:r>
-              <a:rPr lang="en-US" dirty="0"/>
-              <a:t>High level requirements:</a:t>
-            </a:r>
+              <a:rPr lang="en-US" dirty="0" smtClean="0"/>
+              <a:t>Current Implementation:</a:t>
+            </a:r>
+          </a:p>
+          <a:p>
+            <a:r>
+              <a:rPr lang="en-US" sz="2000" spc="0" dirty="0">
+                <a:gradFill>
+                  <a:gsLst>
+                    <a:gs pos="1250">
+                      <a:schemeClr val="bg2"/>
+                    </a:gs>
+                    <a:gs pos="100000">
+                      <a:schemeClr val="bg2"/>
+                    </a:gs>
+                  </a:gsLst>
+                  <a:lin ang="5400000" scaled="0"/>
+                </a:gradFill>
+                <a:latin typeface="+mn-lt"/>
+              </a:rPr>
+              <a:t>The solution does the following:</a:t>
+            </a:r>
+            <a:endParaRPr lang="en-US" sz="2000" spc="0" dirty="0">
+              <a:gradFill>
+                <a:gsLst>
+                  <a:gs pos="1250">
+                    <a:schemeClr val="bg2"/>
+                  </a:gs>
+                  <a:gs pos="100000">
+                    <a:schemeClr val="bg2"/>
+                  </a:gs>
+                </a:gsLst>
+                <a:lin ang="5400000" scaled="0"/>
+              </a:gradFill>
+              <a:latin typeface="+mn-lt"/>
+            </a:endParaRPr>
           </a:p>
           <a:p>
             <a:pPr lvl="1"/>
@@ -32048,7 +32238,7 @@
                 <a:gridCol w="2373524">
                   <a:extLst>
                     <a:ext uri="{9D8B030D-6E8A-4147-A177-3AD203B41FA5}">
-                      <a16:colId xmlns:a16="http://schemas.microsoft.com/office/drawing/2014/main" xmlns="" val="20000"/>
+                      <a16:colId xmlns="" xmlns:a16="http://schemas.microsoft.com/office/drawing/2014/main" val="20000"/>
                     </a:ext>
                   </a:extLst>
                 </a:gridCol>
@@ -32111,7 +32301,7 @@
                 </a:tc>
                 <a:extLst>
                   <a:ext uri="{0D108BD9-81ED-4DB2-BD59-A6C34878D82A}">
-                    <a16:rowId xmlns:a16="http://schemas.microsoft.com/office/drawing/2014/main" xmlns="" val="10000"/>
+                    <a16:rowId xmlns="" xmlns:a16="http://schemas.microsoft.com/office/drawing/2014/main" val="10000"/>
                   </a:ext>
                 </a:extLst>
               </a:tr>
@@ -32172,7 +32362,7 @@
                 </a:tc>
                 <a:extLst>
                   <a:ext uri="{0D108BD9-81ED-4DB2-BD59-A6C34878D82A}">
-                    <a16:rowId xmlns:a16="http://schemas.microsoft.com/office/drawing/2014/main" xmlns="" val="10001"/>
+                    <a16:rowId xmlns="" xmlns:a16="http://schemas.microsoft.com/office/drawing/2014/main" val="10001"/>
                   </a:ext>
                 </a:extLst>
               </a:tr>
@@ -32242,7 +32432,7 @@
                 </a:tc>
                 <a:extLst>
                   <a:ext uri="{0D108BD9-81ED-4DB2-BD59-A6C34878D82A}">
-                    <a16:rowId xmlns:a16="http://schemas.microsoft.com/office/drawing/2014/main" xmlns="" val="10002"/>
+                    <a16:rowId xmlns="" xmlns:a16="http://schemas.microsoft.com/office/drawing/2014/main" val="10002"/>
                   </a:ext>
                 </a:extLst>
               </a:tr>
@@ -32320,7 +32510,7 @@
                 </a:tc>
                 <a:extLst>
                   <a:ext uri="{0D108BD9-81ED-4DB2-BD59-A6C34878D82A}">
-                    <a16:rowId xmlns:a16="http://schemas.microsoft.com/office/drawing/2014/main" xmlns="" val="10007"/>
+                    <a16:rowId xmlns="" xmlns:a16="http://schemas.microsoft.com/office/drawing/2014/main" val="10007"/>
                   </a:ext>
                 </a:extLst>
               </a:tr>
@@ -50401,6 +50591,36 @@
 </file>
 
 <file path=customXml/item3.xml><?xml version="1.0" encoding="utf-8"?>
+<?mso-contentType ?>
+<FormTemplates xmlns="http://schemas.microsoft.com/sharepoint/v3/contenttype/forms">
+  <Display>DocumentLibraryForm</Display>
+  <Edit>DocumentLibraryForm</Edit>
+  <New>DocumentLibraryForm</New>
+</FormTemplates>
+</file>
+
+<file path=customXml/item4.xml><?xml version="1.0" encoding="utf-8"?>
+<Control xmlns="http://schemas.microsoft.com/VisualStudio/2011/storyboarding/control">
+  <Id Name="System.Storyboarding.Backgrounds.WebBrowser" Revision="1" Stencil="System.Storyboarding.Backgrounds" StencilVersion="0.1"/>
+</Control>
+</file>
+
+<file path=customXml/item5.xml><?xml version="1.0" encoding="utf-8"?>
+<p:properties xmlns:p="http://schemas.microsoft.com/office/2006/metadata/properties" xmlns:xsi="http://www.w3.org/2001/XMLSchema-instance" xmlns:pc="http://schemas.microsoft.com/office/infopath/2007/PartnerControls">
+  <documentManagement>
+    <SharedWithUsers xmlns="5ec9502b-addf-4716-883a-9e6742fd5109">
+      <UserInfo>
+        <DisplayName/>
+        <AccountId xsi:nil="true"/>
+        <AccountType/>
+      </UserInfo>
+    </SharedWithUsers>
+    <SharingHintHash xmlns="5ec9502b-addf-4716-883a-9e6742fd5109">-223225823</SharingHintHash>
+  </documentManagement>
+</p:properties>
+</file>
+
+<file path=customXml/item6.xml><?xml version="1.0" encoding="utf-8"?>
 <ct:contentTypeSchema xmlns:ct="http://schemas.microsoft.com/office/2006/metadata/contentType" xmlns:ma="http://schemas.microsoft.com/office/2006/metadata/properties/metaAttributes" ct:_="" ma:_="" ma:contentTypeName="Document" ma:contentTypeID="0x010100DD7BFE2324FCFB49A665688E9D54E8DB" ma:contentTypeVersion="2" ma:contentTypeDescription="Create a new document." ma:contentTypeScope="" ma:versionID="d40ecbfa05608dbb8df02efb84158178">
   <xsd:schema xmlns:xsd="http://www.w3.org/2001/XMLSchema" xmlns:xs="http://www.w3.org/2001/XMLSchema" xmlns:p="http://schemas.microsoft.com/office/2006/metadata/properties" xmlns:ns2="5ec9502b-addf-4716-883a-9e6742fd5109" targetNamespace="http://schemas.microsoft.com/office/2006/metadata/properties" ma:root="true" ma:fieldsID="c8929b4bbf02ed04f4fe894b226e94c0" ns2:_="">
     <xsd:import namespace="5ec9502b-addf-4716-883a-9e6742fd5109"/>
@@ -50546,37 +50766,15 @@
 </ct:contentTypeSchema>
 </file>
 
-<file path=customXml/item4.xml><?xml version="1.0" encoding="utf-8"?>
-<p:properties xmlns:p="http://schemas.microsoft.com/office/2006/metadata/properties" xmlns:xsi="http://www.w3.org/2001/XMLSchema-instance" xmlns:pc="http://schemas.microsoft.com/office/infopath/2007/PartnerControls">
-  <documentManagement>
-    <SharedWithUsers xmlns="5ec9502b-addf-4716-883a-9e6742fd5109">
-      <UserInfo>
-        <DisplayName/>
-        <AccountId xsi:nil="true"/>
-        <AccountType/>
-      </UserInfo>
-    </SharedWithUsers>
-    <SharingHintHash xmlns="5ec9502b-addf-4716-883a-9e6742fd5109">-223225823</SharingHintHash>
-  </documentManagement>
-</p:properties>
+<file path=customXml/itemProps1.xml><?xml version="1.0" encoding="utf-8"?>
+<ds:datastoreItem xmlns:ds="http://schemas.openxmlformats.org/officeDocument/2006/customXml" ds:itemID="{6769EEFD-0F61-4AA2-AE02-4E16ED5BCFE8}">
+  <ds:schemaRefs>
+    <ds:schemaRef ds:uri="http://schemas.microsoft.com/VisualStudio/2011/storyboarding/control"/>
+  </ds:schemaRefs>
+</ds:datastoreItem>
 </file>
 
-<file path=customXml/item5.xml><?xml version="1.0" encoding="utf-8"?>
-<Control xmlns="http://schemas.microsoft.com/VisualStudio/2011/storyboarding/control">
-  <Id Name="System.Storyboarding.Backgrounds.WebBrowser" Revision="1" Stencil="System.Storyboarding.Backgrounds" StencilVersion="0.1"/>
-</Control>
-</file>
-
-<file path=customXml/item6.xml><?xml version="1.0" encoding="utf-8"?>
-<?mso-contentType ?>
-<FormTemplates xmlns="http://schemas.microsoft.com/sharepoint/v3/contenttype/forms">
-  <Display>DocumentLibraryForm</Display>
-  <Edit>DocumentLibraryForm</Edit>
-  <New>DocumentLibraryForm</New>
-</FormTemplates>
-</file>
-
-<file path=customXml/itemProps1.xml><?xml version="1.0" encoding="utf-8"?>
+<file path=customXml/itemProps2.xml><?xml version="1.0" encoding="utf-8"?>
 <ds:datastoreItem xmlns:ds="http://schemas.openxmlformats.org/officeDocument/2006/customXml" ds:itemID="{57ED2E3B-EB43-4252-8C73-98EA6ACC344E}">
   <ds:schemaRefs>
     <ds:schemaRef ds:uri="http://schemas.microsoft.com/VisualStudio/2011/storyboarding/control"/>
@@ -50584,15 +50782,39 @@
 </ds:datastoreItem>
 </file>
 
-<file path=customXml/itemProps2.xml><?xml version="1.0" encoding="utf-8"?>
-<ds:datastoreItem xmlns:ds="http://schemas.openxmlformats.org/officeDocument/2006/customXml" ds:itemID="{6769EEFD-0F61-4AA2-AE02-4E16ED5BCFE8}">
+<file path=customXml/itemProps3.xml><?xml version="1.0" encoding="utf-8"?>
+<ds:datastoreItem xmlns:ds="http://schemas.openxmlformats.org/officeDocument/2006/customXml" ds:itemID="{B4606E04-852E-4880-8CD1-0B186F4087B1}">
+  <ds:schemaRefs>
+    <ds:schemaRef ds:uri="http://schemas.microsoft.com/sharepoint/v3/contenttype/forms"/>
+  </ds:schemaRefs>
+</ds:datastoreItem>
+</file>
+
+<file path=customXml/itemProps4.xml><?xml version="1.0" encoding="utf-8"?>
+<ds:datastoreItem xmlns:ds="http://schemas.openxmlformats.org/officeDocument/2006/customXml" ds:itemID="{CE030D2D-A334-4C40-95AD-E97580D89B11}">
   <ds:schemaRefs>
     <ds:schemaRef ds:uri="http://schemas.microsoft.com/VisualStudio/2011/storyboarding/control"/>
   </ds:schemaRefs>
 </ds:datastoreItem>
 </file>
 
-<file path=customXml/itemProps3.xml><?xml version="1.0" encoding="utf-8"?>
+<file path=customXml/itemProps5.xml><?xml version="1.0" encoding="utf-8"?>
+<ds:datastoreItem xmlns:ds="http://schemas.openxmlformats.org/officeDocument/2006/customXml" ds:itemID="{F1AEA8A7-A694-4DB0-82AB-EF48F2E9B6F9}">
+  <ds:schemaRefs>
+    <ds:schemaRef ds:uri="http://schemas.microsoft.com/office/2006/metadata/properties"/>
+    <ds:schemaRef ds:uri="http://purl.org/dc/terms/"/>
+    <ds:schemaRef ds:uri="http://schemas.openxmlformats.org/package/2006/metadata/core-properties"/>
+    <ds:schemaRef ds:uri="5ec9502b-addf-4716-883a-9e6742fd5109"/>
+    <ds:schemaRef ds:uri="http://schemas.microsoft.com/office/2006/documentManagement/types"/>
+    <ds:schemaRef ds:uri="http://schemas.microsoft.com/office/infopath/2007/PartnerControls"/>
+    <ds:schemaRef ds:uri="http://purl.org/dc/elements/1.1/"/>
+    <ds:schemaRef ds:uri="http://www.w3.org/XML/1998/namespace"/>
+    <ds:schemaRef ds:uri="http://purl.org/dc/dcmitype/"/>
+  </ds:schemaRefs>
+</ds:datastoreItem>
+</file>
+
+<file path=customXml/itemProps6.xml><?xml version="1.0" encoding="utf-8"?>
 <ds:datastoreItem xmlns:ds="http://schemas.openxmlformats.org/officeDocument/2006/customXml" ds:itemID="{F79724C6-F6AC-4965-8DDA-67169DE5A52B}">
   <ds:schemaRefs>
     <ds:schemaRef ds:uri="http://schemas.microsoft.com/office/2006/metadata/contentType"/>
@@ -50608,36 +50830,4 @@
     <ds:schemaRef ds:uri="http://schemas.microsoft.com/internal/obd"/>
   </ds:schemaRefs>
 </ds:datastoreItem>
-</file>
-
-<file path=customXml/itemProps4.xml><?xml version="1.0" encoding="utf-8"?>
-<ds:datastoreItem xmlns:ds="http://schemas.openxmlformats.org/officeDocument/2006/customXml" ds:itemID="{F1AEA8A7-A694-4DB0-82AB-EF48F2E9B6F9}">
-  <ds:schemaRefs>
-    <ds:schemaRef ds:uri="http://schemas.microsoft.com/office/2006/metadata/properties"/>
-    <ds:schemaRef ds:uri="http://purl.org/dc/terms/"/>
-    <ds:schemaRef ds:uri="http://schemas.openxmlformats.org/package/2006/metadata/core-properties"/>
-    <ds:schemaRef ds:uri="5ec9502b-addf-4716-883a-9e6742fd5109"/>
-    <ds:schemaRef ds:uri="http://schemas.microsoft.com/office/2006/documentManagement/types"/>
-    <ds:schemaRef ds:uri="http://schemas.microsoft.com/office/infopath/2007/PartnerControls"/>
-    <ds:schemaRef ds:uri="http://purl.org/dc/elements/1.1/"/>
-    <ds:schemaRef ds:uri="http://www.w3.org/XML/1998/namespace"/>
-    <ds:schemaRef ds:uri="http://purl.org/dc/dcmitype/"/>
-  </ds:schemaRefs>
-</ds:datastoreItem>
-</file>
-
-<file path=customXml/itemProps5.xml><?xml version="1.0" encoding="utf-8"?>
-<ds:datastoreItem xmlns:ds="http://schemas.openxmlformats.org/officeDocument/2006/customXml" ds:itemID="{CE030D2D-A334-4C40-95AD-E97580D89B11}">
-  <ds:schemaRefs>
-    <ds:schemaRef ds:uri="http://schemas.microsoft.com/VisualStudio/2011/storyboarding/control"/>
-  </ds:schemaRefs>
-</ds:datastoreItem>
-</file>
-
-<file path=customXml/itemProps6.xml><?xml version="1.0" encoding="utf-8"?>
-<ds:datastoreItem xmlns:ds="http://schemas.openxmlformats.org/officeDocument/2006/customXml" ds:itemID="{B4606E04-852E-4880-8CD1-0B186F4087B1}">
-  <ds:schemaRefs>
-    <ds:schemaRef ds:uri="http://schemas.microsoft.com/sharepoint/v3/contenttype/forms"/>
-  </ds:schemaRefs>
-</ds:datastoreItem>
 </file>
</xml_diff>

<commit_message>
Updates to Sample documents
</commit_message>
<xml_diff>
--- a/PnP Transformation Process/Samples/PnP Transformation - Solution Assessment Report - Contoso.pptx
+++ b/PnP Transformation Process/Samples/PnP Transformation - Solution Assessment Report - Contoso.pptx
@@ -17596,7 +17596,7 @@
             <a:pPr fontAlgn="b"/>
             <a:r>
               <a:rPr lang="en-US" sz="2000" b="1" dirty="0" err="1" smtClean="0"/>
-              <a:t>contoso.sharepoint.libraryreceivers.wsp</a:t>
+              <a:t>contoso.sharepoint.eventreceivers.wsp</a:t>
             </a:r>
             <a:endParaRPr lang="en-US" sz="2000" b="1" dirty="0" smtClean="0"/>
           </a:p>
@@ -19673,7 +19673,7 @@
           <p:nvPr>
             <p:extLst>
               <p:ext uri="{D42A27DB-BD31-4B8C-83A1-F6EECF244321}">
-                <p14:modId xmlns:p14="http://schemas.microsoft.com/office/powerpoint/2010/main" val="791289138"/>
+                <p14:modId xmlns:p14="http://schemas.microsoft.com/office/powerpoint/2010/main" val="35802836"/>
               </p:ext>
             </p:extLst>
           </p:nvPr>
@@ -20323,7 +20323,7 @@
                           <a:ea typeface="+mn-ea"/>
                           <a:cs typeface="+mn-cs"/>
                         </a:rPr>
-                        <a:t>contoso.sharepoint.receivers.wsp</a:t>
+                        <a:t>contoso.sharepoint.eventreceivers.wsp</a:t>
                       </a:r>
                       <a:endParaRPr lang="en-US" sz="2400" b="0" i="0" u="none" strike="noStrike" dirty="0">
                         <a:solidFill>
@@ -21817,7 +21817,7 @@
           <p:nvPr>
             <p:extLst>
               <p:ext uri="{D42A27DB-BD31-4B8C-83A1-F6EECF244321}">
-                <p14:modId xmlns:p14="http://schemas.microsoft.com/office/powerpoint/2010/main" val="549470318"/>
+                <p14:modId xmlns:p14="http://schemas.microsoft.com/office/powerpoint/2010/main" val="2499006981"/>
               </p:ext>
             </p:extLst>
           </p:nvPr>
@@ -22216,7 +22216,7 @@
                     <a:p>
                       <a:pPr algn="l" fontAlgn="b"/>
                       <a:r>
-                        <a:rPr lang="en-US" sz="2000" kern="1200" dirty="0" err="1" smtClean="0">
+                        <a:rPr lang="en-US" sz="2000" kern="1200" smtClean="0">
                           <a:solidFill>
                             <a:schemeClr val="dk1"/>
                           </a:solidFill>
@@ -22225,7 +22225,7 @@
                           <a:ea typeface="+mn-ea"/>
                           <a:cs typeface="+mn-cs"/>
                         </a:rPr>
-                        <a:t>fabricam.locationfinder.wsp</a:t>
+                        <a:t>fabrikam.locationfinder.wsp</a:t>
                       </a:r>
                       <a:endParaRPr lang="en-US" sz="2000" kern="1200" dirty="0">
                         <a:solidFill>

</xml_diff>

<commit_message>
Changes to sample documents
</commit_message>
<xml_diff>
--- a/PnP Transformation Process/Samples/PnP Transformation - Solution Assessment Report - Contoso.pptx
+++ b/PnP Transformation Process/Samples/PnP Transformation - Solution Assessment Report - Contoso.pptx
@@ -5780,27 +5780,11 @@
           <a:p>
             <a:r>
               <a:rPr lang="en-NZ" dirty="0" smtClean="0"/>
-              <a:t>Migration helper solution cannot be </a:t>
-            </a:r>
-            <a:r>
-              <a:rPr lang="en-NZ" dirty="0" smtClean="0"/>
-              <a:t>transformed since it requires installation on SharePoint farm. </a:t>
-            </a:r>
-            <a:r>
-              <a:rPr lang="en-NZ" dirty="0" smtClean="0"/>
-              <a:t>Contoso needs to evaluate</a:t>
+              <a:t>Migration helper solution cannot be transformed since it requires installation on SharePoint farm. Contoso needs to evaluate</a:t>
             </a:r>
             <a:r>
               <a:rPr lang="en-NZ" baseline="0" dirty="0" smtClean="0"/>
-              <a:t> other third party offerings that </a:t>
-            </a:r>
-            <a:r>
-              <a:rPr lang="en-NZ" baseline="0" dirty="0" smtClean="0"/>
-              <a:t>can be installed on a client machine and make </a:t>
-            </a:r>
-            <a:r>
-              <a:rPr lang="en-NZ" baseline="0" dirty="0" smtClean="0"/>
-              <a:t>use of SharePoint web service to migrate data.</a:t>
+              <a:t> other third party offerings that can be installed on a client machine and make use of SharePoint web service to migrate data.</a:t>
             </a:r>
             <a:endParaRPr lang="en-NZ" dirty="0"/>
           </a:p>
@@ -24540,13 +24524,8 @@
             <a:pPr lvl="1"/>
             <a:r>
               <a:rPr lang="en-US" dirty="0" smtClean="0"/>
-              <a:t>Use out of the box structural </a:t>
-            </a:r>
-            <a:r>
-              <a:rPr lang="en-US" dirty="0" smtClean="0"/>
-              <a:t>navigation with a custom stylesheet</a:t>
-            </a:r>
-            <a:endParaRPr lang="en-US" dirty="0" smtClean="0"/>
+              <a:t>Use out of the box structural navigation with a custom stylesheet</a:t>
+            </a:r>
           </a:p>
           <a:p>
             <a:pPr lvl="1"/>
@@ -25244,19 +25223,19 @@
           <a:p>
             <a:pPr lvl="1"/>
             <a:r>
+              <a:rPr lang="en-US" dirty="0"/>
+              <a:t>There’s no easy way to remove the declarative custom list definition: currently the only option is to recreate the list and copy over the data</a:t>
+            </a:r>
+          </a:p>
+          <a:p>
+            <a:pPr lvl="1"/>
+            <a:r>
               <a:rPr lang="en-US" dirty="0" smtClean="0"/>
-              <a:t>Too </a:t>
+              <a:t>Need </a:t>
             </a:r>
             <a:r>
               <a:rPr lang="en-US" dirty="0"/>
-              <a:t>many list definitions for the project sites will have a big migration impact (will take time to process)</a:t>
-            </a:r>
-          </a:p>
-          <a:p>
-            <a:pPr lvl="1"/>
-            <a:r>
-              <a:rPr lang="en-US" dirty="0"/>
-              <a:t>Need to update all existing sites (branding) and pages (new page layouts) which will require proper tooling </a:t>
+              <a:t>to update all existing sites (branding) and pages (new page layouts) which will require proper tooling </a:t>
             </a:r>
           </a:p>
           <a:p>
@@ -25980,11 +25959,7 @@
           <a:p>
             <a:r>
               <a:rPr lang="en-US" dirty="0" smtClean="0"/>
-              <a:t>Requirements and Current </a:t>
-            </a:r>
-            <a:r>
-              <a:rPr lang="en-US" dirty="0" smtClean="0"/>
-              <a:t>implementation:</a:t>
+              <a:t>Requirements and Current implementation:</a:t>
             </a:r>
             <a:endParaRPr lang="en-US" dirty="0"/>
           </a:p>
@@ -26029,15 +26004,7 @@
             <a:pPr lvl="2"/>
             <a:r>
               <a:rPr lang="en-US" sz="1800" dirty="0" smtClean="0"/>
-              <a:t>Hides the sites </a:t>
-            </a:r>
-            <a:r>
-              <a:rPr lang="en-US" sz="1800" dirty="0" smtClean="0"/>
-              <a:t>provisioned or requested </a:t>
-            </a:r>
-            <a:r>
-              <a:rPr lang="en-US" sz="1800" dirty="0" smtClean="0"/>
-              <a:t>by other users</a:t>
+              <a:t>Hides the sites provisioned or requested by other users</a:t>
             </a:r>
           </a:p>
           <a:p>
@@ -27868,11 +27835,7 @@
           <a:p>
             <a:r>
               <a:rPr lang="en-US" dirty="0" smtClean="0"/>
-              <a:t>Requirements and Current </a:t>
-            </a:r>
-            <a:r>
-              <a:rPr lang="en-US" dirty="0" smtClean="0"/>
-              <a:t>Implementation:</a:t>
+              <a:t>Requirements and Current Implementation:</a:t>
             </a:r>
             <a:endParaRPr lang="en-US" dirty="0"/>
           </a:p>
@@ -27909,19 +27872,7 @@
             <a:pPr lvl="2"/>
             <a:r>
               <a:rPr lang="en-US" sz="1800" dirty="0" smtClean="0"/>
-              <a:t>Kicks off </a:t>
-            </a:r>
-            <a:r>
-              <a:rPr lang="en-US" sz="1800" dirty="0" smtClean="0"/>
-              <a:t>a IMP workflow </a:t>
-            </a:r>
-            <a:r>
-              <a:rPr lang="en-US" sz="1800" dirty="0" smtClean="0"/>
-              <a:t>when the document </a:t>
-            </a:r>
-            <a:r>
-              <a:rPr lang="en-US" sz="1800" dirty="0" smtClean="0"/>
-              <a:t>expires</a:t>
+              <a:t>Kicks off a IMP workflow when the document expires</a:t>
             </a:r>
           </a:p>
           <a:p>
@@ -27938,7 +27889,6 @@
               <a:rPr lang="en-US" sz="1800" dirty="0" smtClean="0"/>
               <a:t>format (websites, documents, emails)</a:t>
             </a:r>
-            <a:endParaRPr lang="en-US" sz="1800" dirty="0" smtClean="0"/>
           </a:p>
           <a:p>
             <a:r>
@@ -29012,41 +28962,7 @@
                 </a:gradFill>
                 <a:latin typeface="+mn-lt"/>
               </a:rPr>
-              <a:t>Receivers </a:t>
-            </a:r>
-            <a:r>
-              <a:rPr lang="en-US" sz="2000" spc="0" dirty="0" smtClean="0">
-                <a:gradFill>
-                  <a:gsLst>
-                    <a:gs pos="1250">
-                      <a:srgbClr val="797A7D"/>
-                    </a:gs>
-                    <a:gs pos="100000">
-                      <a:srgbClr val="797A7D"/>
-                    </a:gs>
-                  </a:gsLst>
-                  <a:lin ang="5400000" scaled="0"/>
-                </a:gradFill>
-                <a:latin typeface="+mn-lt"/>
-              </a:rPr>
-              <a:t>have been created to capture </a:t>
-            </a:r>
-            <a:r>
-              <a:rPr lang="en-US" sz="2000" spc="0" dirty="0" smtClean="0">
-                <a:gradFill>
-                  <a:gsLst>
-                    <a:gs pos="1250">
-                      <a:srgbClr val="797A7D"/>
-                    </a:gs>
-                    <a:gs pos="100000">
-                      <a:srgbClr val="797A7D"/>
-                    </a:gs>
-                  </a:gsLst>
-                  <a:lin ang="5400000" scaled="0"/>
-                </a:gradFill>
-                <a:latin typeface="+mn-lt"/>
-              </a:rPr>
-              <a:t>list metadata on document uploads</a:t>
+              <a:t>Receivers have been created to capture list metadata on document uploads</a:t>
             </a:r>
             <a:endParaRPr lang="en-NZ" sz="2000" spc="0" dirty="0">
               <a:gradFill>
@@ -29080,39 +28996,8 @@
                 </a:gradFill>
                 <a:latin typeface="+mn-lt"/>
               </a:rPr>
-              <a:t>Custom security is applied on </a:t>
-            </a:r>
-            <a:r>
-              <a:rPr lang="en-US" sz="2000" spc="0" dirty="0" smtClean="0">
-                <a:gradFill>
-                  <a:gsLst>
-                    <a:gs pos="1250">
-                      <a:srgbClr val="797A7D"/>
-                    </a:gs>
-                    <a:gs pos="100000">
-                      <a:srgbClr val="797A7D"/>
-                    </a:gs>
-                  </a:gsLst>
-                  <a:lin ang="5400000" scaled="0"/>
-                </a:gradFill>
-                <a:latin typeface="+mn-lt"/>
-              </a:rPr>
-              <a:t>site creation</a:t>
-            </a:r>
-            <a:endParaRPr lang="en-US" sz="2000" spc="0" dirty="0" smtClean="0">
-              <a:gradFill>
-                <a:gsLst>
-                  <a:gs pos="1250">
-                    <a:srgbClr val="797A7D"/>
-                  </a:gs>
-                  <a:gs pos="100000">
-                    <a:srgbClr val="797A7D"/>
-                  </a:gs>
-                </a:gsLst>
-                <a:lin ang="5400000" scaled="0"/>
-              </a:gradFill>
-              <a:latin typeface="+mn-lt"/>
-            </a:endParaRPr>
+              <a:t>Custom security is applied on site creation</a:t>
+            </a:r>
           </a:p>
           <a:p>
             <a:pPr lvl="0"/>
@@ -29208,23 +29093,7 @@
                   <a:lin ang="5400000" scaled="0"/>
                 </a:gradFill>
               </a:rPr>
-              <a:t>Remote event receivers can be used that can be invoked through a provider hosted app</a:t>
-            </a:r>
-            <a:r>
-              <a:rPr lang="en-US" dirty="0" smtClean="0">
-                <a:gradFill>
-                  <a:gsLst>
-                    <a:gs pos="1250">
-                      <a:srgbClr val="797A7D"/>
-                    </a:gs>
-                    <a:gs pos="100000">
-                      <a:srgbClr val="797A7D"/>
-                    </a:gs>
-                  </a:gsLst>
-                  <a:lin ang="5400000" scaled="0"/>
-                </a:gradFill>
-              </a:rPr>
-              <a:t>.</a:t>
+              <a:t>Remote event receivers can be used that can be invoked through a provider hosted app.</a:t>
             </a:r>
           </a:p>
           <a:p>
@@ -30020,11 +29889,7 @@
           <a:p>
             <a:r>
               <a:rPr lang="en-US" dirty="0" smtClean="0"/>
-              <a:t>Requirements and Current </a:t>
-            </a:r>
-            <a:r>
-              <a:rPr lang="en-US" dirty="0" smtClean="0"/>
-              <a:t>Implementation:</a:t>
+              <a:t>Requirements and Current Implementation:</a:t>
             </a:r>
             <a:endParaRPr lang="en-US" dirty="0"/>
           </a:p>
@@ -30049,21 +29914,12 @@
               <a:rPr lang="en-US" dirty="0" smtClean="0"/>
               <a:t>Web part can be configured to see safety incidents even from other units/departments</a:t>
             </a:r>
-            <a:endParaRPr lang="en-US" dirty="0" smtClean="0"/>
           </a:p>
           <a:p>
             <a:pPr lvl="2"/>
             <a:r>
               <a:rPr lang="en-US" dirty="0" smtClean="0"/>
-              <a:t>Allow users to view safety news from </a:t>
-            </a:r>
-            <a:r>
-              <a:rPr lang="en-US" dirty="0" smtClean="0"/>
-              <a:t>mobile devices</a:t>
-            </a:r>
-            <a:r>
-              <a:rPr lang="en-US" dirty="0" smtClean="0"/>
-              <a:t>.</a:t>
+              <a:t>Allow users to view safety news from mobile devices.</a:t>
             </a:r>
           </a:p>
           <a:p>
@@ -30979,11 +30835,7 @@
           <a:p>
             <a:r>
               <a:rPr lang="en-US" dirty="0" smtClean="0"/>
-              <a:t>Requirements and Current </a:t>
-            </a:r>
-            <a:r>
-              <a:rPr lang="en-US" dirty="0" smtClean="0"/>
-              <a:t>Implementation:</a:t>
+              <a:t>Requirements and Current Implementation:</a:t>
             </a:r>
             <a:endParaRPr lang="en-US" dirty="0"/>
           </a:p>
@@ -31003,39 +30855,7 @@
                   <a:lin ang="5400000" scaled="0"/>
                 </a:gradFill>
               </a:rPr>
-              <a:t>Email notification is sent to employees in the event of a major </a:t>
-            </a:r>
-            <a:r>
-              <a:rPr lang="en-US" dirty="0">
-                <a:gradFill>
-                  <a:gsLst>
-                    <a:gs pos="1250">
-                      <a:srgbClr val="797A7D"/>
-                    </a:gs>
-                    <a:gs pos="100000">
-                      <a:srgbClr val="797A7D"/>
-                    </a:gs>
-                  </a:gsLst>
-                  <a:lin ang="5400000" scaled="0"/>
-                </a:gradFill>
-              </a:rPr>
-              <a:t>safety </a:t>
-            </a:r>
-            <a:r>
-              <a:rPr lang="en-US" dirty="0">
-                <a:gradFill>
-                  <a:gsLst>
-                    <a:gs pos="1250">
-                      <a:srgbClr val="797A7D"/>
-                    </a:gs>
-                    <a:gs pos="100000">
-                      <a:srgbClr val="797A7D"/>
-                    </a:gs>
-                  </a:gsLst>
-                  <a:lin ang="5400000" scaled="0"/>
-                </a:gradFill>
-              </a:rPr>
-              <a:t>incident</a:t>
+              <a:t>Email notification is sent to employees in the event of a major safety incident</a:t>
             </a:r>
           </a:p>
           <a:p>
@@ -32028,11 +31848,7 @@
             <a:pPr lvl="1"/>
             <a:r>
               <a:rPr lang="en-US" dirty="0" smtClean="0"/>
-              <a:t>Allow users to search experts based on their years of experience and past projects</a:t>
-            </a:r>
-            <a:r>
-              <a:rPr lang="en-US" dirty="0" smtClean="0"/>
-              <a:t>.</a:t>
+              <a:t>Allow users to search experts based on their years of experience and past projects.</a:t>
             </a:r>
           </a:p>
           <a:p>
@@ -32041,17 +31857,12 @@
               <a:rPr lang="en-US" dirty="0" smtClean="0"/>
               <a:t>The custom web part queries the SharePoint user profile,</a:t>
             </a:r>
-            <a:endParaRPr lang="en-US" dirty="0" smtClean="0"/>
           </a:p>
           <a:p>
             <a:pPr lvl="1"/>
             <a:r>
               <a:rPr lang="en-US" dirty="0" smtClean="0"/>
-              <a:t>Allow the users to be able to communicate with the experts using </a:t>
-            </a:r>
-            <a:r>
-              <a:rPr lang="en-US" dirty="0" smtClean="0"/>
-              <a:t>SharePoint social.</a:t>
+              <a:t>Allows the users to be able to communicate with the experts using SharePoint social.</a:t>
             </a:r>
             <a:endParaRPr lang="en-US" dirty="0"/>
           </a:p>
@@ -32073,15 +31884,7 @@
             <a:pPr lvl="1"/>
             <a:r>
               <a:rPr lang="en-US" dirty="0" smtClean="0"/>
-              <a:t>The People search provides integration with Lync which can then be used to communicate with the </a:t>
-            </a:r>
-            <a:r>
-              <a:rPr lang="en-US" dirty="0" smtClean="0"/>
-              <a:t>experts </a:t>
-            </a:r>
-            <a:r>
-              <a:rPr lang="en-US" dirty="0" smtClean="0"/>
-              <a:t>using messaging or voice call.</a:t>
+              <a:t>The People search provides integration with Lync which can then be used to communicate with the experts using messaging or voice call.</a:t>
             </a:r>
             <a:endParaRPr lang="en-US" dirty="0"/>
           </a:p>
@@ -32811,11 +32614,7 @@
           <a:p>
             <a:r>
               <a:rPr lang="en-US" dirty="0" smtClean="0"/>
-              <a:t>Requirements and Current </a:t>
-            </a:r>
-            <a:r>
-              <a:rPr lang="en-US" dirty="0" smtClean="0"/>
-              <a:t>Implementation:</a:t>
+              <a:t>Requirements and Current Implementation:</a:t>
             </a:r>
           </a:p>
           <a:p>
@@ -32849,11 +32648,7 @@
             </a:r>
             <a:r>
               <a:rPr lang="en-US" dirty="0" smtClean="0"/>
-              <a:t> </a:t>
-            </a:r>
-            <a:r>
-              <a:rPr lang="en-US" dirty="0" smtClean="0"/>
-              <a:t>outlets</a:t>
+              <a:t> outlets</a:t>
             </a:r>
           </a:p>
           <a:p>
@@ -32862,7 +32657,6 @@
               <a:rPr lang="en-US" dirty="0" smtClean="0"/>
               <a:t>The outlet locations are stored in a list</a:t>
             </a:r>
-            <a:endParaRPr lang="en-US" dirty="0" smtClean="0"/>
           </a:p>
           <a:p>
             <a:pPr lvl="1"/>
@@ -32886,11 +32680,7 @@
             <a:pPr lvl="1"/>
             <a:r>
               <a:rPr lang="en-US" dirty="0" smtClean="0"/>
-              <a:t>Use search display templates to return search results</a:t>
-            </a:r>
-            <a:r>
-              <a:rPr lang="en-US" dirty="0" smtClean="0"/>
-              <a:t>.</a:t>
+              <a:t>Use search display templates to return search results.</a:t>
             </a:r>
           </a:p>
           <a:p>
@@ -33776,11 +33566,7 @@
             <a:pPr lvl="1"/>
             <a:r>
               <a:rPr lang="en-US" dirty="0" smtClean="0"/>
-              <a:t>Provides information on popular </a:t>
-            </a:r>
-            <a:r>
-              <a:rPr lang="en-US" dirty="0" smtClean="0"/>
-              <a:t>content</a:t>
+              <a:t>Provides information on popular content</a:t>
             </a:r>
           </a:p>
           <a:p>
@@ -52386,48 +52172,6 @@
 </file>
 
 <file path=customXml/item1.xml><?xml version="1.0" encoding="utf-8"?>
-<Control xmlns="http://schemas.microsoft.com/VisualStudio/2011/storyboarding/control">
-  <Id Name="System.Storyboarding.Backgrounds.WebBrowser" Revision="1" Stencil="System.Storyboarding.Backgrounds" StencilVersion="0.1"/>
-</Control>
-</file>
-
-<file path=customXml/item2.xml><?xml version="1.0" encoding="utf-8"?>
-<Control xmlns="http://schemas.microsoft.com/VisualStudio/2011/storyboarding/control">
-  <Id Name="System.Storyboarding.Backgrounds.WebBrowser" Revision="1" Stencil="System.Storyboarding.Backgrounds" StencilVersion="0.1"/>
-</Control>
-</file>
-
-<file path=customXml/item3.xml><?xml version="1.0" encoding="utf-8"?>
-<?mso-contentType ?>
-<FormTemplates xmlns="http://schemas.microsoft.com/sharepoint/v3/contenttype/forms">
-  <Display>DocumentLibraryForm</Display>
-  <Edit>DocumentLibraryForm</Edit>
-  <New>DocumentLibraryForm</New>
-</FormTemplates>
-</file>
-
-<file path=customXml/item4.xml><?xml version="1.0" encoding="utf-8"?>
-<Control xmlns="http://schemas.microsoft.com/VisualStudio/2011/storyboarding/control">
-  <Id Name="System.Storyboarding.Backgrounds.WebBrowser" Revision="1" Stencil="System.Storyboarding.Backgrounds" StencilVersion="0.1"/>
-</Control>
-</file>
-
-<file path=customXml/item5.xml><?xml version="1.0" encoding="utf-8"?>
-<p:properties xmlns:p="http://schemas.microsoft.com/office/2006/metadata/properties" xmlns:xsi="http://www.w3.org/2001/XMLSchema-instance" xmlns:pc="http://schemas.microsoft.com/office/infopath/2007/PartnerControls">
-  <documentManagement>
-    <SharedWithUsers xmlns="5ec9502b-addf-4716-883a-9e6742fd5109">
-      <UserInfo>
-        <DisplayName/>
-        <AccountId xsi:nil="true"/>
-        <AccountType/>
-      </UserInfo>
-    </SharedWithUsers>
-    <SharingHintHash xmlns="5ec9502b-addf-4716-883a-9e6742fd5109">-223225823</SharingHintHash>
-  </documentManagement>
-</p:properties>
-</file>
-
-<file path=customXml/item6.xml><?xml version="1.0" encoding="utf-8"?>
 <ct:contentTypeSchema xmlns:ct="http://schemas.microsoft.com/office/2006/metadata/contentType" xmlns:ma="http://schemas.microsoft.com/office/2006/metadata/properties/metaAttributes" ct:_="" ma:_="" ma:contentTypeName="Document" ma:contentTypeID="0x010100DD7BFE2324FCFB49A665688E9D54E8DB" ma:contentTypeVersion="2" ma:contentTypeDescription="Create a new document." ma:contentTypeScope="" ma:versionID="d40ecbfa05608dbb8df02efb84158178">
   <xsd:schema xmlns:xsd="http://www.w3.org/2001/XMLSchema" xmlns:xs="http://www.w3.org/2001/XMLSchema" xmlns:p="http://schemas.microsoft.com/office/2006/metadata/properties" xmlns:ns2="5ec9502b-addf-4716-883a-9e6742fd5109" targetNamespace="http://schemas.microsoft.com/office/2006/metadata/properties" ma:root="true" ma:fieldsID="c8929b4bbf02ed04f4fe894b226e94c0" ns2:_="">
     <xsd:import namespace="5ec9502b-addf-4716-883a-9e6742fd5109"/>
@@ -52573,55 +52317,49 @@
 </ct:contentTypeSchema>
 </file>
 
-<file path=customXml/itemProps1.xml><?xml version="1.0" encoding="utf-8"?>
-<ds:datastoreItem xmlns:ds="http://schemas.openxmlformats.org/officeDocument/2006/customXml" ds:itemID="{6769EEFD-0F61-4AA2-AE02-4E16ED5BCFE8}">
-  <ds:schemaRefs>
-    <ds:schemaRef ds:uri="http://schemas.microsoft.com/VisualStudio/2011/storyboarding/control"/>
-  </ds:schemaRefs>
-</ds:datastoreItem>
+<file path=customXml/item2.xml><?xml version="1.0" encoding="utf-8"?>
+<Control xmlns="http://schemas.microsoft.com/VisualStudio/2011/storyboarding/control">
+  <Id Name="System.Storyboarding.Backgrounds.WebBrowser" Revision="1" Stencil="System.Storyboarding.Backgrounds" StencilVersion="0.1"/>
+</Control>
 </file>
 
-<file path=customXml/itemProps2.xml><?xml version="1.0" encoding="utf-8"?>
-<ds:datastoreItem xmlns:ds="http://schemas.openxmlformats.org/officeDocument/2006/customXml" ds:itemID="{57ED2E3B-EB43-4252-8C73-98EA6ACC344E}">
-  <ds:schemaRefs>
-    <ds:schemaRef ds:uri="http://schemas.microsoft.com/VisualStudio/2011/storyboarding/control"/>
-  </ds:schemaRefs>
-</ds:datastoreItem>
+<file path=customXml/item3.xml><?xml version="1.0" encoding="utf-8"?>
+<Control xmlns="http://schemas.microsoft.com/VisualStudio/2011/storyboarding/control">
+  <Id Name="System.Storyboarding.Backgrounds.WebBrowser" Revision="1" Stencil="System.Storyboarding.Backgrounds" StencilVersion="0.1"/>
+</Control>
 </file>
 
-<file path=customXml/itemProps3.xml><?xml version="1.0" encoding="utf-8"?>
-<ds:datastoreItem xmlns:ds="http://schemas.openxmlformats.org/officeDocument/2006/customXml" ds:itemID="{B4606E04-852E-4880-8CD1-0B186F4087B1}">
-  <ds:schemaRefs>
-    <ds:schemaRef ds:uri="http://schemas.microsoft.com/sharepoint/v3/contenttype/forms"/>
-  </ds:schemaRefs>
-</ds:datastoreItem>
+<file path=customXml/item4.xml><?xml version="1.0" encoding="utf-8"?>
+<?mso-contentType ?>
+<FormTemplates xmlns="http://schemas.microsoft.com/sharepoint/v3/contenttype/forms">
+  <Display>DocumentLibraryForm</Display>
+  <Edit>DocumentLibraryForm</Edit>
+  <New>DocumentLibraryForm</New>
+</FormTemplates>
 </file>
 
-<file path=customXml/itemProps4.xml><?xml version="1.0" encoding="utf-8"?>
-<ds:datastoreItem xmlns:ds="http://schemas.openxmlformats.org/officeDocument/2006/customXml" ds:itemID="{CE030D2D-A334-4C40-95AD-E97580D89B11}">
-  <ds:schemaRefs>
-    <ds:schemaRef ds:uri="http://schemas.microsoft.com/VisualStudio/2011/storyboarding/control"/>
-  </ds:schemaRefs>
-</ds:datastoreItem>
+<file path=customXml/item5.xml><?xml version="1.0" encoding="utf-8"?>
+<Control xmlns="http://schemas.microsoft.com/VisualStudio/2011/storyboarding/control">
+  <Id Name="System.Storyboarding.Backgrounds.WebBrowser" Revision="1" Stencil="System.Storyboarding.Backgrounds" StencilVersion="0.1"/>
+</Control>
 </file>
 
-<file path=customXml/itemProps5.xml><?xml version="1.0" encoding="utf-8"?>
-<ds:datastoreItem xmlns:ds="http://schemas.openxmlformats.org/officeDocument/2006/customXml" ds:itemID="{F1AEA8A7-A694-4DB0-82AB-EF48F2E9B6F9}">
-  <ds:schemaRefs>
-    <ds:schemaRef ds:uri="http://schemas.microsoft.com/office/2006/metadata/properties"/>
-    <ds:schemaRef ds:uri="http://purl.org/dc/terms/"/>
-    <ds:schemaRef ds:uri="http://schemas.openxmlformats.org/package/2006/metadata/core-properties"/>
-    <ds:schemaRef ds:uri="5ec9502b-addf-4716-883a-9e6742fd5109"/>
-    <ds:schemaRef ds:uri="http://schemas.microsoft.com/office/2006/documentManagement/types"/>
-    <ds:schemaRef ds:uri="http://schemas.microsoft.com/office/infopath/2007/PartnerControls"/>
-    <ds:schemaRef ds:uri="http://purl.org/dc/elements/1.1/"/>
-    <ds:schemaRef ds:uri="http://www.w3.org/XML/1998/namespace"/>
-    <ds:schemaRef ds:uri="http://purl.org/dc/dcmitype/"/>
-  </ds:schemaRefs>
-</ds:datastoreItem>
+<file path=customXml/item6.xml><?xml version="1.0" encoding="utf-8"?>
+<p:properties xmlns:p="http://schemas.microsoft.com/office/2006/metadata/properties" xmlns:xsi="http://www.w3.org/2001/XMLSchema-instance" xmlns:pc="http://schemas.microsoft.com/office/infopath/2007/PartnerControls">
+  <documentManagement>
+    <SharedWithUsers xmlns="5ec9502b-addf-4716-883a-9e6742fd5109">
+      <UserInfo>
+        <DisplayName/>
+        <AccountId xsi:nil="true"/>
+        <AccountType/>
+      </UserInfo>
+    </SharedWithUsers>
+    <SharingHintHash xmlns="5ec9502b-addf-4716-883a-9e6742fd5109">-223225823</SharingHintHash>
+  </documentManagement>
+</p:properties>
 </file>
 
-<file path=customXml/itemProps6.xml><?xml version="1.0" encoding="utf-8"?>
+<file path=customXml/itemProps1.xml><?xml version="1.0" encoding="utf-8"?>
 <ds:datastoreItem xmlns:ds="http://schemas.openxmlformats.org/officeDocument/2006/customXml" ds:itemID="{F79724C6-F6AC-4965-8DDA-67169DE5A52B}">
   <ds:schemaRefs>
     <ds:schemaRef ds:uri="http://schemas.microsoft.com/office/2006/metadata/contentType"/>
@@ -52637,4 +52375,52 @@
     <ds:schemaRef ds:uri="http://schemas.microsoft.com/internal/obd"/>
   </ds:schemaRefs>
 </ds:datastoreItem>
+</file>
+
+<file path=customXml/itemProps2.xml><?xml version="1.0" encoding="utf-8"?>
+<ds:datastoreItem xmlns:ds="http://schemas.openxmlformats.org/officeDocument/2006/customXml" ds:itemID="{6769EEFD-0F61-4AA2-AE02-4E16ED5BCFE8}">
+  <ds:schemaRefs>
+    <ds:schemaRef ds:uri="http://schemas.microsoft.com/VisualStudio/2011/storyboarding/control"/>
+  </ds:schemaRefs>
+</ds:datastoreItem>
+</file>
+
+<file path=customXml/itemProps3.xml><?xml version="1.0" encoding="utf-8"?>
+<ds:datastoreItem xmlns:ds="http://schemas.openxmlformats.org/officeDocument/2006/customXml" ds:itemID="{57ED2E3B-EB43-4252-8C73-98EA6ACC344E}">
+  <ds:schemaRefs>
+    <ds:schemaRef ds:uri="http://schemas.microsoft.com/VisualStudio/2011/storyboarding/control"/>
+  </ds:schemaRefs>
+</ds:datastoreItem>
+</file>
+
+<file path=customXml/itemProps4.xml><?xml version="1.0" encoding="utf-8"?>
+<ds:datastoreItem xmlns:ds="http://schemas.openxmlformats.org/officeDocument/2006/customXml" ds:itemID="{B4606E04-852E-4880-8CD1-0B186F4087B1}">
+  <ds:schemaRefs>
+    <ds:schemaRef ds:uri="http://schemas.microsoft.com/sharepoint/v3/contenttype/forms"/>
+  </ds:schemaRefs>
+</ds:datastoreItem>
+</file>
+
+<file path=customXml/itemProps5.xml><?xml version="1.0" encoding="utf-8"?>
+<ds:datastoreItem xmlns:ds="http://schemas.openxmlformats.org/officeDocument/2006/customXml" ds:itemID="{CE030D2D-A334-4C40-95AD-E97580D89B11}">
+  <ds:schemaRefs>
+    <ds:schemaRef ds:uri="http://schemas.microsoft.com/VisualStudio/2011/storyboarding/control"/>
+  </ds:schemaRefs>
+</ds:datastoreItem>
+</file>
+
+<file path=customXml/itemProps6.xml><?xml version="1.0" encoding="utf-8"?>
+<ds:datastoreItem xmlns:ds="http://schemas.openxmlformats.org/officeDocument/2006/customXml" ds:itemID="{F1AEA8A7-A694-4DB0-82AB-EF48F2E9B6F9}">
+  <ds:schemaRefs>
+    <ds:schemaRef ds:uri="http://schemas.microsoft.com/office/2006/metadata/properties"/>
+    <ds:schemaRef ds:uri="http://purl.org/dc/terms/"/>
+    <ds:schemaRef ds:uri="http://schemas.openxmlformats.org/package/2006/metadata/core-properties"/>
+    <ds:schemaRef ds:uri="5ec9502b-addf-4716-883a-9e6742fd5109"/>
+    <ds:schemaRef ds:uri="http://schemas.microsoft.com/office/2006/documentManagement/types"/>
+    <ds:schemaRef ds:uri="http://schemas.microsoft.com/office/infopath/2007/PartnerControls"/>
+    <ds:schemaRef ds:uri="http://purl.org/dc/elements/1.1/"/>
+    <ds:schemaRef ds:uri="http://www.w3.org/XML/1998/namespace"/>
+    <ds:schemaRef ds:uri="http://purl.org/dc/dcmitype/"/>
+  </ds:schemaRefs>
+</ds:datastoreItem>
 </file>
</xml_diff>